<commit_message>
Decision tree images seperated
</commit_message>
<xml_diff>
--- a/Model/Decision-making/Situation sketch.pptx
+++ b/Model/Decision-making/Situation sketch.pptx
@@ -133,7 +133,7 @@
 <file path=ppt/revisionInfo.xml><?xml version="1.0" encoding="utf-8"?>
 <p1510:revInfo xmlns:a="http://schemas.openxmlformats.org/drawingml/2006/main" xmlns:r="http://schemas.openxmlformats.org/officeDocument/2006/relationships" xmlns:p1510="http://schemas.microsoft.com/office/powerpoint/2015/10/main">
   <p1510:revLst>
-    <p1510:client id="{C4BFD186-317F-4916-988F-5AEA2A5F5499}" v="1771" dt="2018-06-11T11:44:27.464"/>
+    <p1510:client id="{C4BFD186-317F-4916-988F-5AEA2A5F5499}" v="1775" dt="2018-06-13T12:52:10.787"/>
   </p1510:revLst>
 </p1510:revInfo>
 </file>
@@ -143,7 +143,7 @@
   <pc:docChgLst>
     <pc:chgData name="Ingmar Wever" userId="1d4f24f3f093ab16" providerId="LiveId" clId="{C4BFD186-317F-4916-988F-5AEA2A5F5499}"/>
     <pc:docChg chg="undo custSel addSld delSld modSld sldOrd">
-      <pc:chgData name="Ingmar Wever" userId="1d4f24f3f093ab16" providerId="LiveId" clId="{C4BFD186-317F-4916-988F-5AEA2A5F5499}" dt="2018-06-11T11:44:27.464" v="1767" actId="1076"/>
+      <pc:chgData name="Ingmar Wever" userId="1d4f24f3f093ab16" providerId="LiveId" clId="{C4BFD186-317F-4916-988F-5AEA2A5F5499}" dt="2018-06-13T12:52:10.787" v="1771" actId="2696"/>
       <pc:docMkLst>
         <pc:docMk/>
       </pc:docMkLst>
@@ -735,6 +735,20 @@
           </ac:cxnSpMkLst>
         </pc:cxnChg>
       </pc:sldChg>
+      <pc:sldChg chg="add del">
+        <pc:chgData name="Ingmar Wever" userId="1d4f24f3f093ab16" providerId="LiveId" clId="{C4BFD186-317F-4916-988F-5AEA2A5F5499}" dt="2018-06-13T12:52:10.787" v="1771" actId="2696"/>
+        <pc:sldMkLst>
+          <pc:docMk/>
+          <pc:sldMk cId="394742876" sldId="261"/>
+        </pc:sldMkLst>
+      </pc:sldChg>
+      <pc:sldChg chg="add del">
+        <pc:chgData name="Ingmar Wever" userId="1d4f24f3f093ab16" providerId="LiveId" clId="{C4BFD186-317F-4916-988F-5AEA2A5F5499}" dt="2018-06-13T12:31:45.062" v="1769" actId="2696"/>
+        <pc:sldMkLst>
+          <pc:docMk/>
+          <pc:sldMk cId="2762307694" sldId="261"/>
+        </pc:sldMkLst>
+      </pc:sldChg>
     </pc:docChg>
   </pc:docChgLst>
 </pc:chgInfo>
@@ -822,7 +836,7 @@
           <a:p>
             <a:fld id="{CB03585E-2D59-44D4-88D9-8305F9AFB8D0}" type="datetimeFigureOut">
               <a:rPr lang="nl-NL" smtClean="0"/>
-              <a:t>11-6-2018</a:t>
+              <a:t>13-6-2018</a:t>
             </a:fld>
             <a:endParaRPr lang="nl-NL"/>
           </a:p>
@@ -1220,7 +1234,7 @@
           <a:p>
             <a:fld id="{D7D96FC9-A980-4A1F-B9C4-051618DF5BCE}" type="datetimeFigureOut">
               <a:rPr lang="nl-NL" smtClean="0"/>
-              <a:t>11-6-2018</a:t>
+              <a:t>13-6-2018</a:t>
             </a:fld>
             <a:endParaRPr lang="nl-NL"/>
           </a:p>
@@ -1390,7 +1404,7 @@
           <a:p>
             <a:fld id="{D7D96FC9-A980-4A1F-B9C4-051618DF5BCE}" type="datetimeFigureOut">
               <a:rPr lang="nl-NL" smtClean="0"/>
-              <a:t>11-6-2018</a:t>
+              <a:t>13-6-2018</a:t>
             </a:fld>
             <a:endParaRPr lang="nl-NL"/>
           </a:p>
@@ -1570,7 +1584,7 @@
           <a:p>
             <a:fld id="{D7D96FC9-A980-4A1F-B9C4-051618DF5BCE}" type="datetimeFigureOut">
               <a:rPr lang="nl-NL" smtClean="0"/>
-              <a:t>11-6-2018</a:t>
+              <a:t>13-6-2018</a:t>
             </a:fld>
             <a:endParaRPr lang="nl-NL"/>
           </a:p>
@@ -1740,7 +1754,7 @@
           <a:p>
             <a:fld id="{D7D96FC9-A980-4A1F-B9C4-051618DF5BCE}" type="datetimeFigureOut">
               <a:rPr lang="nl-NL" smtClean="0"/>
-              <a:t>11-6-2018</a:t>
+              <a:t>13-6-2018</a:t>
             </a:fld>
             <a:endParaRPr lang="nl-NL"/>
           </a:p>
@@ -1984,7 +1998,7 @@
           <a:p>
             <a:fld id="{D7D96FC9-A980-4A1F-B9C4-051618DF5BCE}" type="datetimeFigureOut">
               <a:rPr lang="nl-NL" smtClean="0"/>
-              <a:t>11-6-2018</a:t>
+              <a:t>13-6-2018</a:t>
             </a:fld>
             <a:endParaRPr lang="nl-NL"/>
           </a:p>
@@ -2216,7 +2230,7 @@
           <a:p>
             <a:fld id="{D7D96FC9-A980-4A1F-B9C4-051618DF5BCE}" type="datetimeFigureOut">
               <a:rPr lang="nl-NL" smtClean="0"/>
-              <a:t>11-6-2018</a:t>
+              <a:t>13-6-2018</a:t>
             </a:fld>
             <a:endParaRPr lang="nl-NL"/>
           </a:p>
@@ -2583,7 +2597,7 @@
           <a:p>
             <a:fld id="{D7D96FC9-A980-4A1F-B9C4-051618DF5BCE}" type="datetimeFigureOut">
               <a:rPr lang="nl-NL" smtClean="0"/>
-              <a:t>11-6-2018</a:t>
+              <a:t>13-6-2018</a:t>
             </a:fld>
             <a:endParaRPr lang="nl-NL"/>
           </a:p>
@@ -2701,7 +2715,7 @@
           <a:p>
             <a:fld id="{D7D96FC9-A980-4A1F-B9C4-051618DF5BCE}" type="datetimeFigureOut">
               <a:rPr lang="nl-NL" smtClean="0"/>
-              <a:t>11-6-2018</a:t>
+              <a:t>13-6-2018</a:t>
             </a:fld>
             <a:endParaRPr lang="nl-NL"/>
           </a:p>
@@ -2796,7 +2810,7 @@
           <a:p>
             <a:fld id="{D7D96FC9-A980-4A1F-B9C4-051618DF5BCE}" type="datetimeFigureOut">
               <a:rPr lang="nl-NL" smtClean="0"/>
-              <a:t>11-6-2018</a:t>
+              <a:t>13-6-2018</a:t>
             </a:fld>
             <a:endParaRPr lang="nl-NL"/>
           </a:p>
@@ -3073,7 +3087,7 @@
           <a:p>
             <a:fld id="{D7D96FC9-A980-4A1F-B9C4-051618DF5BCE}" type="datetimeFigureOut">
               <a:rPr lang="nl-NL" smtClean="0"/>
-              <a:t>11-6-2018</a:t>
+              <a:t>13-6-2018</a:t>
             </a:fld>
             <a:endParaRPr lang="nl-NL"/>
           </a:p>
@@ -3330,7 +3344,7 @@
           <a:p>
             <a:fld id="{D7D96FC9-A980-4A1F-B9C4-051618DF5BCE}" type="datetimeFigureOut">
               <a:rPr lang="nl-NL" smtClean="0"/>
-              <a:t>11-6-2018</a:t>
+              <a:t>13-6-2018</a:t>
             </a:fld>
             <a:endParaRPr lang="nl-NL"/>
           </a:p>
@@ -3543,7 +3557,7 @@
           <a:p>
             <a:fld id="{D7D96FC9-A980-4A1F-B9C4-051618DF5BCE}" type="datetimeFigureOut">
               <a:rPr lang="nl-NL" smtClean="0"/>
-              <a:t>11-6-2018</a:t>
+              <a:t>13-6-2018</a:t>
             </a:fld>
             <a:endParaRPr lang="nl-NL"/>
           </a:p>

</xml_diff>

<commit_message>
Veel veranderd in rapport, steeds meer omgezet in leesbare tekst
</commit_message>
<xml_diff>
--- a/Model/Decision-making/Situation sketch.pptx
+++ b/Model/Decision-making/Situation sketch.pptx
@@ -5,14 +5,15 @@
     <p:sldMasterId id="2147483660" r:id="rId1"/>
   </p:sldMasterIdLst>
   <p:notesMasterIdLst>
-    <p:notesMasterId r:id="rId7"/>
+    <p:notesMasterId r:id="rId8"/>
   </p:notesMasterIdLst>
   <p:sldIdLst>
     <p:sldId id="260" r:id="rId2"/>
-    <p:sldId id="256" r:id="rId3"/>
-    <p:sldId id="259" r:id="rId4"/>
-    <p:sldId id="257" r:id="rId5"/>
-    <p:sldId id="258" r:id="rId6"/>
+    <p:sldId id="261" r:id="rId3"/>
+    <p:sldId id="256" r:id="rId4"/>
+    <p:sldId id="259" r:id="rId5"/>
+    <p:sldId id="257" r:id="rId6"/>
+    <p:sldId id="258" r:id="rId7"/>
   </p:sldIdLst>
   <p:sldSz cx="9906000" cy="6858000" type="A4"/>
   <p:notesSz cx="6858000" cy="9144000"/>
@@ -133,7 +134,7 @@
 <file path=ppt/revisionInfo.xml><?xml version="1.0" encoding="utf-8"?>
 <p1510:revInfo xmlns:a="http://schemas.openxmlformats.org/drawingml/2006/main" xmlns:r="http://schemas.openxmlformats.org/officeDocument/2006/relationships" xmlns:p1510="http://schemas.microsoft.com/office/powerpoint/2015/10/main">
   <p1510:revLst>
-    <p1510:client id="{C4BFD186-317F-4916-988F-5AEA2A5F5499}" v="1775" dt="2018-06-13T12:52:10.787"/>
+    <p1510:client id="{D4E84672-117F-4C87-8B61-4180CFBDF8A8}" v="1" dt="2018-07-11T12:24:39.509"/>
   </p1510:revLst>
 </p1510:revInfo>
 </file>
@@ -735,18 +736,20 @@
           </ac:cxnSpMkLst>
         </pc:cxnChg>
       </pc:sldChg>
-      <pc:sldChg chg="add del">
-        <pc:chgData name="Ingmar Wever" userId="1d4f24f3f093ab16" providerId="LiveId" clId="{C4BFD186-317F-4916-988F-5AEA2A5F5499}" dt="2018-06-13T12:52:10.787" v="1771" actId="2696"/>
+    </pc:docChg>
+  </pc:docChgLst>
+  <pc:docChgLst>
+    <pc:chgData name="Ingmar Wever" userId="1d4f24f3f093ab16" providerId="LiveId" clId="{D4E84672-117F-4C87-8B61-4180CFBDF8A8}"/>
+    <pc:docChg chg="addSld modSld">
+      <pc:chgData name="Ingmar Wever" userId="1d4f24f3f093ab16" providerId="LiveId" clId="{D4E84672-117F-4C87-8B61-4180CFBDF8A8}" dt="2018-07-11T12:24:39.507" v="0"/>
+      <pc:docMkLst>
+        <pc:docMk/>
+      </pc:docMkLst>
+      <pc:sldChg chg="add">
+        <pc:chgData name="Ingmar Wever" userId="1d4f24f3f093ab16" providerId="LiveId" clId="{D4E84672-117F-4C87-8B61-4180CFBDF8A8}" dt="2018-07-11T12:24:39.507" v="0"/>
         <pc:sldMkLst>
           <pc:docMk/>
-          <pc:sldMk cId="394742876" sldId="261"/>
-        </pc:sldMkLst>
-      </pc:sldChg>
-      <pc:sldChg chg="add del">
-        <pc:chgData name="Ingmar Wever" userId="1d4f24f3f093ab16" providerId="LiveId" clId="{C4BFD186-317F-4916-988F-5AEA2A5F5499}" dt="2018-06-13T12:31:45.062" v="1769" actId="2696"/>
-        <pc:sldMkLst>
-          <pc:docMk/>
-          <pc:sldMk cId="2762307694" sldId="261"/>
+          <pc:sldMk cId="4087975967" sldId="261"/>
         </pc:sldMkLst>
       </pc:sldChg>
     </pc:docChg>
@@ -836,7 +839,7 @@
           <a:p>
             <a:fld id="{CB03585E-2D59-44D4-88D9-8305F9AFB8D0}" type="datetimeFigureOut">
               <a:rPr lang="nl-NL" smtClean="0"/>
-              <a:t>13-6-2018</a:t>
+              <a:t>11-7-2018</a:t>
             </a:fld>
             <a:endParaRPr lang="nl-NL"/>
           </a:p>
@@ -1234,7 +1237,7 @@
           <a:p>
             <a:fld id="{D7D96FC9-A980-4A1F-B9C4-051618DF5BCE}" type="datetimeFigureOut">
               <a:rPr lang="nl-NL" smtClean="0"/>
-              <a:t>13-6-2018</a:t>
+              <a:t>11-7-2018</a:t>
             </a:fld>
             <a:endParaRPr lang="nl-NL"/>
           </a:p>
@@ -1404,7 +1407,7 @@
           <a:p>
             <a:fld id="{D7D96FC9-A980-4A1F-B9C4-051618DF5BCE}" type="datetimeFigureOut">
               <a:rPr lang="nl-NL" smtClean="0"/>
-              <a:t>13-6-2018</a:t>
+              <a:t>11-7-2018</a:t>
             </a:fld>
             <a:endParaRPr lang="nl-NL"/>
           </a:p>
@@ -1584,7 +1587,7 @@
           <a:p>
             <a:fld id="{D7D96FC9-A980-4A1F-B9C4-051618DF5BCE}" type="datetimeFigureOut">
               <a:rPr lang="nl-NL" smtClean="0"/>
-              <a:t>13-6-2018</a:t>
+              <a:t>11-7-2018</a:t>
             </a:fld>
             <a:endParaRPr lang="nl-NL"/>
           </a:p>
@@ -1754,7 +1757,7 @@
           <a:p>
             <a:fld id="{D7D96FC9-A980-4A1F-B9C4-051618DF5BCE}" type="datetimeFigureOut">
               <a:rPr lang="nl-NL" smtClean="0"/>
-              <a:t>13-6-2018</a:t>
+              <a:t>11-7-2018</a:t>
             </a:fld>
             <a:endParaRPr lang="nl-NL"/>
           </a:p>
@@ -1998,7 +2001,7 @@
           <a:p>
             <a:fld id="{D7D96FC9-A980-4A1F-B9C4-051618DF5BCE}" type="datetimeFigureOut">
               <a:rPr lang="nl-NL" smtClean="0"/>
-              <a:t>13-6-2018</a:t>
+              <a:t>11-7-2018</a:t>
             </a:fld>
             <a:endParaRPr lang="nl-NL"/>
           </a:p>
@@ -2230,7 +2233,7 @@
           <a:p>
             <a:fld id="{D7D96FC9-A980-4A1F-B9C4-051618DF5BCE}" type="datetimeFigureOut">
               <a:rPr lang="nl-NL" smtClean="0"/>
-              <a:t>13-6-2018</a:t>
+              <a:t>11-7-2018</a:t>
             </a:fld>
             <a:endParaRPr lang="nl-NL"/>
           </a:p>
@@ -2597,7 +2600,7 @@
           <a:p>
             <a:fld id="{D7D96FC9-A980-4A1F-B9C4-051618DF5BCE}" type="datetimeFigureOut">
               <a:rPr lang="nl-NL" smtClean="0"/>
-              <a:t>13-6-2018</a:t>
+              <a:t>11-7-2018</a:t>
             </a:fld>
             <a:endParaRPr lang="nl-NL"/>
           </a:p>
@@ -2715,7 +2718,7 @@
           <a:p>
             <a:fld id="{D7D96FC9-A980-4A1F-B9C4-051618DF5BCE}" type="datetimeFigureOut">
               <a:rPr lang="nl-NL" smtClean="0"/>
-              <a:t>13-6-2018</a:t>
+              <a:t>11-7-2018</a:t>
             </a:fld>
             <a:endParaRPr lang="nl-NL"/>
           </a:p>
@@ -2810,7 +2813,7 @@
           <a:p>
             <a:fld id="{D7D96FC9-A980-4A1F-B9C4-051618DF5BCE}" type="datetimeFigureOut">
               <a:rPr lang="nl-NL" smtClean="0"/>
-              <a:t>13-6-2018</a:t>
+              <a:t>11-7-2018</a:t>
             </a:fld>
             <a:endParaRPr lang="nl-NL"/>
           </a:p>
@@ -3087,7 +3090,7 @@
           <a:p>
             <a:fld id="{D7D96FC9-A980-4A1F-B9C4-051618DF5BCE}" type="datetimeFigureOut">
               <a:rPr lang="nl-NL" smtClean="0"/>
-              <a:t>13-6-2018</a:t>
+              <a:t>11-7-2018</a:t>
             </a:fld>
             <a:endParaRPr lang="nl-NL"/>
           </a:p>
@@ -3344,7 +3347,7 @@
           <a:p>
             <a:fld id="{D7D96FC9-A980-4A1F-B9C4-051618DF5BCE}" type="datetimeFigureOut">
               <a:rPr lang="nl-NL" smtClean="0"/>
-              <a:t>13-6-2018</a:t>
+              <a:t>11-7-2018</a:t>
             </a:fld>
             <a:endParaRPr lang="nl-NL"/>
           </a:p>
@@ -3557,7 +3560,7 @@
           <a:p>
             <a:fld id="{D7D96FC9-A980-4A1F-B9C4-051618DF5BCE}" type="datetimeFigureOut">
               <a:rPr lang="nl-NL" smtClean="0"/>
-              <a:t>13-6-2018</a:t>
+              <a:t>11-7-2018</a:t>
             </a:fld>
             <a:endParaRPr lang="nl-NL"/>
           </a:p>
@@ -4377,6 +4380,36 @@
 </file>
 
 <file path=ppt/slides/slide2.xml><?xml version="1.0" encoding="utf-8"?>
+<p:sld xmlns:a="http://schemas.openxmlformats.org/drawingml/2006/main" xmlns:r="http://schemas.openxmlformats.org/officeDocument/2006/relationships" xmlns:p="http://schemas.openxmlformats.org/presentationml/2006/main">
+  <p:cSld>
+    <p:spTree>
+      <p:nvGrpSpPr>
+        <p:cNvPr id="1" name=""/>
+        <p:cNvGrpSpPr/>
+        <p:nvPr/>
+      </p:nvGrpSpPr>
+      <p:grpSpPr>
+        <a:xfrm>
+          <a:off x="0" y="0"/>
+          <a:ext cx="0" cy="0"/>
+          <a:chOff x="0" y="0"/>
+          <a:chExt cx="0" cy="0"/>
+        </a:xfrm>
+      </p:grpSpPr>
+    </p:spTree>
+    <p:extLst>
+      <p:ext uri="{BB962C8B-B14F-4D97-AF65-F5344CB8AC3E}">
+        <p14:creationId xmlns:p14="http://schemas.microsoft.com/office/powerpoint/2010/main" val="4087975967"/>
+      </p:ext>
+    </p:extLst>
+  </p:cSld>
+  <p:clrMapOvr>
+    <a:masterClrMapping/>
+  </p:clrMapOvr>
+</p:sld>
+</file>
+
+<file path=ppt/slides/slide3.xml><?xml version="1.0" encoding="utf-8"?>
 <p:sld xmlns:a="http://schemas.openxmlformats.org/drawingml/2006/main" xmlns:r="http://schemas.openxmlformats.org/officeDocument/2006/relationships" xmlns:p="http://schemas.openxmlformats.org/presentationml/2006/main">
   <p:cSld>
     <p:spTree>
@@ -10963,7 +10996,7 @@
 </p:sld>
 </file>
 
-<file path=ppt/slides/slide3.xml><?xml version="1.0" encoding="utf-8"?>
+<file path=ppt/slides/slide4.xml><?xml version="1.0" encoding="utf-8"?>
 <p:sld xmlns:a="http://schemas.openxmlformats.org/drawingml/2006/main" xmlns:r="http://schemas.openxmlformats.org/officeDocument/2006/relationships" xmlns:p="http://schemas.openxmlformats.org/presentationml/2006/main">
   <p:cSld>
     <p:spTree>
@@ -12595,7 +12628,7 @@
 </p:sld>
 </file>
 
-<file path=ppt/slides/slide4.xml><?xml version="1.0" encoding="utf-8"?>
+<file path=ppt/slides/slide5.xml><?xml version="1.0" encoding="utf-8"?>
 <p:sld xmlns:a="http://schemas.openxmlformats.org/drawingml/2006/main" xmlns:r="http://schemas.openxmlformats.org/officeDocument/2006/relationships" xmlns:p="http://schemas.openxmlformats.org/presentationml/2006/main">
   <p:cSld>
     <p:spTree>
@@ -14720,7 +14753,7 @@
 </p:sld>
 </file>
 
-<file path=ppt/slides/slide5.xml><?xml version="1.0" encoding="utf-8"?>
+<file path=ppt/slides/slide6.xml><?xml version="1.0" encoding="utf-8"?>
 <p:sld xmlns:a="http://schemas.openxmlformats.org/drawingml/2006/main" xmlns:r="http://schemas.openxmlformats.org/officeDocument/2006/relationships" xmlns:p="http://schemas.openxmlformats.org/presentationml/2006/main">
   <p:cSld>
     <p:spTree>

</xml_diff>

<commit_message>
Report is missing conlcusions, some images and prematter
</commit_message>
<xml_diff>
--- a/Model/Decision-making/Situation sketch.pptx
+++ b/Model/Decision-making/Situation sketch.pptx
@@ -5,14 +5,15 @@
     <p:sldMasterId id="2147483660" r:id="rId1"/>
   </p:sldMasterIdLst>
   <p:notesMasterIdLst>
-    <p:notesMasterId r:id="rId7"/>
+    <p:notesMasterId r:id="rId8"/>
   </p:notesMasterIdLst>
   <p:sldIdLst>
     <p:sldId id="256" r:id="rId2"/>
-    <p:sldId id="259" r:id="rId3"/>
+    <p:sldId id="261" r:id="rId3"/>
     <p:sldId id="260" r:id="rId4"/>
-    <p:sldId id="257" r:id="rId5"/>
-    <p:sldId id="258" r:id="rId6"/>
+    <p:sldId id="259" r:id="rId5"/>
+    <p:sldId id="257" r:id="rId6"/>
+    <p:sldId id="258" r:id="rId7"/>
   </p:sldIdLst>
   <p:sldSz cx="9906000" cy="6858000" type="A4"/>
   <p:notesSz cx="6858000" cy="9144000"/>
@@ -133,7 +134,7 @@
 <file path=ppt/revisionInfo.xml><?xml version="1.0" encoding="utf-8"?>
 <p1510:revInfo xmlns:a="http://schemas.openxmlformats.org/drawingml/2006/main" xmlns:r="http://schemas.openxmlformats.org/officeDocument/2006/relationships" xmlns:p1510="http://schemas.microsoft.com/office/powerpoint/2015/10/main">
   <p1510:revLst>
-    <p1510:client id="{199CEE0D-A3F8-496B-8D55-8DDA2B713DCD}" v="16" dt="2018-09-10T12:40:04.114"/>
+    <p1510:client id="{199CEE0D-A3F8-496B-8D55-8DDA2B713DCD}" v="33" dt="2018-10-02T10:36:56.289"/>
   </p1510:revLst>
 </p1510:revInfo>
 </file>
@@ -142,17 +143,11 @@
 <pc:chgInfo xmlns:a="http://schemas.openxmlformats.org/drawingml/2006/main" xmlns:r="http://schemas.openxmlformats.org/officeDocument/2006/relationships" xmlns:ac="http://schemas.microsoft.com/office/drawing/2013/main/command" xmlns:pc="http://schemas.microsoft.com/office/powerpoint/2013/main/command">
   <pc:docChgLst>
     <pc:chgData name="Ingmar Wever" userId="1d4f24f3f093ab16" providerId="LiveId" clId="{C4BFD186-317F-4916-988F-5AEA2A5F5499}"/>
-    <pc:docChg chg="undo custSel addSld delSld modSld sldOrd">
-      <pc:chgData name="Ingmar Wever" userId="1d4f24f3f093ab16" providerId="LiveId" clId="{C4BFD186-317F-4916-988F-5AEA2A5F5499}" dt="2018-06-13T12:52:10.787" v="1771" actId="2696"/>
-      <pc:docMkLst>
-        <pc:docMk/>
-      </pc:docMkLst>
-    </pc:docChg>
   </pc:docChgLst>
   <pc:docChgLst>
     <pc:chgData name="Ingmar Wever" userId="1d4f24f3f093ab16" providerId="LiveId" clId="{199CEE0D-A3F8-496B-8D55-8DDA2B713DCD}"/>
-    <pc:docChg chg="addSld delSld modSld">
-      <pc:chgData name="Ingmar Wever" userId="1d4f24f3f093ab16" providerId="LiveId" clId="{199CEE0D-A3F8-496B-8D55-8DDA2B713DCD}" dt="2018-09-10T12:40:04.110" v="15"/>
+    <pc:docChg chg="custSel addSld delSld modSld sldOrd">
+      <pc:chgData name="Ingmar Wever" userId="1d4f24f3f093ab16" providerId="LiveId" clId="{199CEE0D-A3F8-496B-8D55-8DDA2B713DCD}" dt="2018-10-02T10:36:56.289" v="32" actId="478"/>
       <pc:docMkLst>
         <pc:docMk/>
       </pc:docMkLst>
@@ -171,12 +166,83 @@
           </ac:spMkLst>
         </pc:spChg>
       </pc:sldChg>
-      <pc:sldChg chg="add">
-        <pc:chgData name="Ingmar Wever" userId="1d4f24f3f093ab16" providerId="LiveId" clId="{199CEE0D-A3F8-496B-8D55-8DDA2B713DCD}" dt="2018-09-10T12:40:04.110" v="15"/>
+      <pc:sldChg chg="addSp modSp add ord">
+        <pc:chgData name="Ingmar Wever" userId="1d4f24f3f093ab16" providerId="LiveId" clId="{199CEE0D-A3F8-496B-8D55-8DDA2B713DCD}" dt="2018-10-02T10:36:22.747" v="25" actId="1076"/>
         <pc:sldMkLst>
           <pc:docMk/>
           <pc:sldMk cId="943820103" sldId="260"/>
         </pc:sldMkLst>
+        <pc:picChg chg="add mod ord">
+          <ac:chgData name="Ingmar Wever" userId="1d4f24f3f093ab16" providerId="LiveId" clId="{199CEE0D-A3F8-496B-8D55-8DDA2B713DCD}" dt="2018-10-02T10:36:22.747" v="25" actId="1076"/>
+          <ac:picMkLst>
+            <pc:docMk/>
+            <pc:sldMk cId="943820103" sldId="260"/>
+            <ac:picMk id="2" creationId="{08AAAB5C-734C-43C8-A342-5AE3EDCE6514}"/>
+          </ac:picMkLst>
+        </pc:picChg>
+        <pc:picChg chg="add">
+          <ac:chgData name="Ingmar Wever" userId="1d4f24f3f093ab16" providerId="LiveId" clId="{199CEE0D-A3F8-496B-8D55-8DDA2B713DCD}" dt="2018-10-02T10:36:15.267" v="23"/>
+          <ac:picMkLst>
+            <pc:docMk/>
+            <pc:sldMk cId="943820103" sldId="260"/>
+            <ac:picMk id="3" creationId="{EEC094FF-A078-40AC-8E8E-9EB7FC68D13A}"/>
+          </ac:picMkLst>
+        </pc:picChg>
+      </pc:sldChg>
+      <pc:sldChg chg="addSp delSp modSp add">
+        <pc:chgData name="Ingmar Wever" userId="1d4f24f3f093ab16" providerId="LiveId" clId="{199CEE0D-A3F8-496B-8D55-8DDA2B713DCD}" dt="2018-10-02T10:36:56.289" v="32" actId="478"/>
+        <pc:sldMkLst>
+          <pc:docMk/>
+          <pc:sldMk cId="1797571510" sldId="261"/>
+        </pc:sldMkLst>
+        <pc:spChg chg="del">
+          <ac:chgData name="Ingmar Wever" userId="1d4f24f3f093ab16" providerId="LiveId" clId="{199CEE0D-A3F8-496B-8D55-8DDA2B713DCD}" dt="2018-10-02T10:35:50.706" v="17"/>
+          <ac:spMkLst>
+            <pc:docMk/>
+            <pc:sldMk cId="1797571510" sldId="261"/>
+            <ac:spMk id="2" creationId="{0E3BA2ED-82BA-4EA6-BBE1-040C4E8B74DE}"/>
+          </ac:spMkLst>
+        </pc:spChg>
+        <pc:spChg chg="del">
+          <ac:chgData name="Ingmar Wever" userId="1d4f24f3f093ab16" providerId="LiveId" clId="{199CEE0D-A3F8-496B-8D55-8DDA2B713DCD}" dt="2018-10-02T10:35:50.706" v="17"/>
+          <ac:spMkLst>
+            <pc:docMk/>
+            <pc:sldMk cId="1797571510" sldId="261"/>
+            <ac:spMk id="3" creationId="{913EDBFA-F2C7-419D-A468-8DF34AF65AC5}"/>
+          </ac:spMkLst>
+        </pc:spChg>
+        <pc:picChg chg="add del mod modCrop">
+          <ac:chgData name="Ingmar Wever" userId="1d4f24f3f093ab16" providerId="LiveId" clId="{199CEE0D-A3F8-496B-8D55-8DDA2B713DCD}" dt="2018-10-02T10:36:54.551" v="31" actId="478"/>
+          <ac:picMkLst>
+            <pc:docMk/>
+            <pc:sldMk cId="1797571510" sldId="261"/>
+            <ac:picMk id="5" creationId="{32347BB5-1701-41EA-AFF5-A06323766CB7}"/>
+          </ac:picMkLst>
+        </pc:picChg>
+        <pc:picChg chg="add del mod">
+          <ac:chgData name="Ingmar Wever" userId="1d4f24f3f093ab16" providerId="LiveId" clId="{199CEE0D-A3F8-496B-8D55-8DDA2B713DCD}" dt="2018-10-02T10:36:01.114" v="20"/>
+          <ac:picMkLst>
+            <pc:docMk/>
+            <pc:sldMk cId="1797571510" sldId="261"/>
+            <ac:picMk id="7" creationId="{72DE8A72-7CF1-4768-A07D-B48F900A8BB4}"/>
+          </ac:picMkLst>
+        </pc:picChg>
+        <pc:picChg chg="add del mod">
+          <ac:chgData name="Ingmar Wever" userId="1d4f24f3f093ab16" providerId="LiveId" clId="{199CEE0D-A3F8-496B-8D55-8DDA2B713DCD}" dt="2018-10-02T10:36:29.982" v="28" actId="478"/>
+          <ac:picMkLst>
+            <pc:docMk/>
+            <pc:sldMk cId="1797571510" sldId="261"/>
+            <ac:picMk id="8" creationId="{E0749B3D-F6E5-40A4-85C1-C82763207819}"/>
+          </ac:picMkLst>
+        </pc:picChg>
+        <pc:picChg chg="add del">
+          <ac:chgData name="Ingmar Wever" userId="1d4f24f3f093ab16" providerId="LiveId" clId="{199CEE0D-A3F8-496B-8D55-8DDA2B713DCD}" dt="2018-10-02T10:36:56.289" v="32" actId="478"/>
+          <ac:picMkLst>
+            <pc:docMk/>
+            <pc:sldMk cId="1797571510" sldId="261"/>
+            <ac:picMk id="9" creationId="{78F82370-58EB-4669-9249-B9C1CF94C0B7}"/>
+          </ac:picMkLst>
+        </pc:picChg>
       </pc:sldChg>
     </pc:docChg>
   </pc:docChgLst>
@@ -274,7 +340,7 @@
           <a:p>
             <a:fld id="{CB03585E-2D59-44D4-88D9-8305F9AFB8D0}" type="datetimeFigureOut">
               <a:rPr lang="nl-NL" smtClean="0"/>
-              <a:t>10-9-2018</a:t>
+              <a:t>2-10-2018</a:t>
             </a:fld>
             <a:endParaRPr lang="nl-NL"/>
           </a:p>
@@ -672,7 +738,7 @@
           <a:p>
             <a:fld id="{D7D96FC9-A980-4A1F-B9C4-051618DF5BCE}" type="datetimeFigureOut">
               <a:rPr lang="nl-NL" smtClean="0"/>
-              <a:t>10-9-2018</a:t>
+              <a:t>2-10-2018</a:t>
             </a:fld>
             <a:endParaRPr lang="nl-NL"/>
           </a:p>
@@ -842,7 +908,7 @@
           <a:p>
             <a:fld id="{D7D96FC9-A980-4A1F-B9C4-051618DF5BCE}" type="datetimeFigureOut">
               <a:rPr lang="nl-NL" smtClean="0"/>
-              <a:t>10-9-2018</a:t>
+              <a:t>2-10-2018</a:t>
             </a:fld>
             <a:endParaRPr lang="nl-NL"/>
           </a:p>
@@ -1022,7 +1088,7 @@
           <a:p>
             <a:fld id="{D7D96FC9-A980-4A1F-B9C4-051618DF5BCE}" type="datetimeFigureOut">
               <a:rPr lang="nl-NL" smtClean="0"/>
-              <a:t>10-9-2018</a:t>
+              <a:t>2-10-2018</a:t>
             </a:fld>
             <a:endParaRPr lang="nl-NL"/>
           </a:p>
@@ -1192,7 +1258,7 @@
           <a:p>
             <a:fld id="{D7D96FC9-A980-4A1F-B9C4-051618DF5BCE}" type="datetimeFigureOut">
               <a:rPr lang="nl-NL" smtClean="0"/>
-              <a:t>10-9-2018</a:t>
+              <a:t>2-10-2018</a:t>
             </a:fld>
             <a:endParaRPr lang="nl-NL"/>
           </a:p>
@@ -1436,7 +1502,7 @@
           <a:p>
             <a:fld id="{D7D96FC9-A980-4A1F-B9C4-051618DF5BCE}" type="datetimeFigureOut">
               <a:rPr lang="nl-NL" smtClean="0"/>
-              <a:t>10-9-2018</a:t>
+              <a:t>2-10-2018</a:t>
             </a:fld>
             <a:endParaRPr lang="nl-NL"/>
           </a:p>
@@ -1668,7 +1734,7 @@
           <a:p>
             <a:fld id="{D7D96FC9-A980-4A1F-B9C4-051618DF5BCE}" type="datetimeFigureOut">
               <a:rPr lang="nl-NL" smtClean="0"/>
-              <a:t>10-9-2018</a:t>
+              <a:t>2-10-2018</a:t>
             </a:fld>
             <a:endParaRPr lang="nl-NL"/>
           </a:p>
@@ -2035,7 +2101,7 @@
           <a:p>
             <a:fld id="{D7D96FC9-A980-4A1F-B9C4-051618DF5BCE}" type="datetimeFigureOut">
               <a:rPr lang="nl-NL" smtClean="0"/>
-              <a:t>10-9-2018</a:t>
+              <a:t>2-10-2018</a:t>
             </a:fld>
             <a:endParaRPr lang="nl-NL"/>
           </a:p>
@@ -2153,7 +2219,7 @@
           <a:p>
             <a:fld id="{D7D96FC9-A980-4A1F-B9C4-051618DF5BCE}" type="datetimeFigureOut">
               <a:rPr lang="nl-NL" smtClean="0"/>
-              <a:t>10-9-2018</a:t>
+              <a:t>2-10-2018</a:t>
             </a:fld>
             <a:endParaRPr lang="nl-NL"/>
           </a:p>
@@ -2248,7 +2314,7 @@
           <a:p>
             <a:fld id="{D7D96FC9-A980-4A1F-B9C4-051618DF5BCE}" type="datetimeFigureOut">
               <a:rPr lang="nl-NL" smtClean="0"/>
-              <a:t>10-9-2018</a:t>
+              <a:t>2-10-2018</a:t>
             </a:fld>
             <a:endParaRPr lang="nl-NL"/>
           </a:p>
@@ -2525,7 +2591,7 @@
           <a:p>
             <a:fld id="{D7D96FC9-A980-4A1F-B9C4-051618DF5BCE}" type="datetimeFigureOut">
               <a:rPr lang="nl-NL" smtClean="0"/>
-              <a:t>10-9-2018</a:t>
+              <a:t>2-10-2018</a:t>
             </a:fld>
             <a:endParaRPr lang="nl-NL"/>
           </a:p>
@@ -2782,7 +2848,7 @@
           <a:p>
             <a:fld id="{D7D96FC9-A980-4A1F-B9C4-051618DF5BCE}" type="datetimeFigureOut">
               <a:rPr lang="nl-NL" smtClean="0"/>
-              <a:t>10-9-2018</a:t>
+              <a:t>2-10-2018</a:t>
             </a:fld>
             <a:endParaRPr lang="nl-NL"/>
           </a:p>
@@ -2995,7 +3061,7 @@
           <a:p>
             <a:fld id="{D7D96FC9-A980-4A1F-B9C4-051618DF5BCE}" type="datetimeFigureOut">
               <a:rPr lang="nl-NL" smtClean="0"/>
-              <a:t>10-9-2018</a:t>
+              <a:t>2-10-2018</a:t>
             </a:fld>
             <a:endParaRPr lang="nl-NL"/>
           </a:p>
@@ -9983,1612 +10049,10 @@
           <a:chExt cx="0" cy="0"/>
         </a:xfrm>
       </p:grpSpPr>
-      <p:grpSp>
-        <p:nvGrpSpPr>
-          <p:cNvPr id="32" name="Groep 31">
-            <a:extLst>
-              <a:ext uri="{FF2B5EF4-FFF2-40B4-BE49-F238E27FC236}">
-                <a16:creationId xmlns:a16="http://schemas.microsoft.com/office/drawing/2014/main" id="{CC44A1F2-04F8-4408-8BB0-6F5AD221D15C}"/>
-              </a:ext>
-            </a:extLst>
-          </p:cNvPr>
-          <p:cNvGrpSpPr/>
-          <p:nvPr/>
-        </p:nvGrpSpPr>
-        <p:grpSpPr>
-          <a:xfrm>
-            <a:off x="0" y="0"/>
-            <a:ext cx="10910878" cy="6858000"/>
-            <a:chOff x="0" y="0"/>
-            <a:chExt cx="10910878" cy="6858000"/>
-          </a:xfrm>
-        </p:grpSpPr>
-        <p:pic>
-          <p:nvPicPr>
-            <p:cNvPr id="4" name="Afbeelding 3">
-              <a:extLst>
-                <a:ext uri="{FF2B5EF4-FFF2-40B4-BE49-F238E27FC236}">
-                  <a16:creationId xmlns:a16="http://schemas.microsoft.com/office/drawing/2014/main" id="{80C58838-E105-4F86-8DE8-D498FCA21339}"/>
-                </a:ext>
-              </a:extLst>
-            </p:cNvPr>
-            <p:cNvPicPr>
-              <a:picLocks noChangeAspect="1"/>
-            </p:cNvPicPr>
-            <p:nvPr/>
-          </p:nvPicPr>
-          <p:blipFill rotWithShape="1">
-            <a:blip r:embed="rId2"/>
-            <a:srcRect l="121" t="9339" r="-1"/>
-            <a:stretch/>
-          </p:blipFill>
-          <p:spPr>
-            <a:xfrm>
-              <a:off x="0" y="0"/>
-              <a:ext cx="9906000" cy="6858000"/>
-            </a:xfrm>
-            <a:prstGeom prst="rect">
-              <a:avLst/>
-            </a:prstGeom>
-          </p:spPr>
-        </p:pic>
-        <p:sp>
-          <p:nvSpPr>
-            <p:cNvPr id="19" name="Tekstvak 18">
-              <a:extLst>
-                <a:ext uri="{FF2B5EF4-FFF2-40B4-BE49-F238E27FC236}">
-                  <a16:creationId xmlns:a16="http://schemas.microsoft.com/office/drawing/2014/main" id="{DCB61516-933B-42EA-880E-D397C8FE5673}"/>
-                </a:ext>
-              </a:extLst>
-            </p:cNvPr>
-            <p:cNvSpPr txBox="1"/>
-            <p:nvPr/>
-          </p:nvSpPr>
-          <p:spPr>
-            <a:xfrm rot="17419521">
-              <a:off x="4106518" y="5671932"/>
-              <a:ext cx="1582310" cy="276999"/>
-            </a:xfrm>
-            <a:prstGeom prst="rect">
-              <a:avLst/>
-            </a:prstGeom>
-            <a:noFill/>
-          </p:spPr>
-          <p:txBody>
-            <a:bodyPr wrap="square" rtlCol="0">
-              <a:spAutoFit/>
-            </a:bodyPr>
-            <a:lstStyle/>
-            <a:p>
-              <a:r>
-                <a:rPr lang="nl-NL" sz="1200" i="1" dirty="0">
-                  <a:solidFill>
-                    <a:schemeClr val="bg1">
-                      <a:lumMod val="50000"/>
-                    </a:schemeClr>
-                  </a:solidFill>
-                  <a:latin typeface="Arial" panose="020B0604020202020204" pitchFamily="34" charset="0"/>
-                  <a:cs typeface="Arial" panose="020B0604020202020204" pitchFamily="34" charset="0"/>
-                </a:rPr>
-                <a:t>Beerkanaal</a:t>
-              </a:r>
-            </a:p>
-          </p:txBody>
-        </p:sp>
-        <p:sp>
-          <p:nvSpPr>
-            <p:cNvPr id="20" name="Tekstvak 19">
-              <a:extLst>
-                <a:ext uri="{FF2B5EF4-FFF2-40B4-BE49-F238E27FC236}">
-                  <a16:creationId xmlns:a16="http://schemas.microsoft.com/office/drawing/2014/main" id="{75C789E5-9C33-4E82-B9BC-74B4D75B549C}"/>
-                </a:ext>
-              </a:extLst>
-            </p:cNvPr>
-            <p:cNvSpPr txBox="1"/>
-            <p:nvPr/>
-          </p:nvSpPr>
-          <p:spPr>
-            <a:xfrm rot="2235370">
-              <a:off x="8230924" y="5241236"/>
-              <a:ext cx="1582310" cy="276999"/>
-            </a:xfrm>
-            <a:prstGeom prst="rect">
-              <a:avLst/>
-            </a:prstGeom>
-            <a:noFill/>
-          </p:spPr>
-          <p:txBody>
-            <a:bodyPr wrap="square" rtlCol="0">
-              <a:spAutoFit/>
-            </a:bodyPr>
-            <a:lstStyle/>
-            <a:p>
-              <a:r>
-                <a:rPr lang="nl-NL" sz="1200" i="1" dirty="0" err="1">
-                  <a:solidFill>
-                    <a:schemeClr val="bg1">
-                      <a:lumMod val="50000"/>
-                    </a:schemeClr>
-                  </a:solidFill>
-                  <a:latin typeface="Arial" panose="020B0604020202020204" pitchFamily="34" charset="0"/>
-                  <a:cs typeface="Arial" panose="020B0604020202020204" pitchFamily="34" charset="0"/>
-                </a:rPr>
-                <a:t>Calandkanaal</a:t>
-              </a:r>
-              <a:endParaRPr lang="nl-NL" sz="1200" i="1" dirty="0">
-                <a:solidFill>
-                  <a:schemeClr val="bg1">
-                    <a:lumMod val="50000"/>
-                  </a:schemeClr>
-                </a:solidFill>
-                <a:latin typeface="Arial" panose="020B0604020202020204" pitchFamily="34" charset="0"/>
-                <a:cs typeface="Arial" panose="020B0604020202020204" pitchFamily="34" charset="0"/>
-              </a:endParaRPr>
-            </a:p>
-          </p:txBody>
-        </p:sp>
-        <p:sp>
-          <p:nvSpPr>
-            <p:cNvPr id="22" name="Tekstvak 21">
-              <a:extLst>
-                <a:ext uri="{FF2B5EF4-FFF2-40B4-BE49-F238E27FC236}">
-                  <a16:creationId xmlns:a16="http://schemas.microsoft.com/office/drawing/2014/main" id="{D21B0735-BB97-416B-8FF1-D2EBC5EFE382}"/>
-                </a:ext>
-              </a:extLst>
-            </p:cNvPr>
-            <p:cNvSpPr txBox="1"/>
-            <p:nvPr/>
-          </p:nvSpPr>
-          <p:spPr>
-            <a:xfrm rot="1264836">
-              <a:off x="73253" y="4334380"/>
-              <a:ext cx="1955478" cy="276999"/>
-            </a:xfrm>
-            <a:prstGeom prst="rect">
-              <a:avLst/>
-            </a:prstGeom>
-            <a:noFill/>
-          </p:spPr>
-          <p:txBody>
-            <a:bodyPr wrap="square" rtlCol="0">
-              <a:spAutoFit/>
-            </a:bodyPr>
-            <a:lstStyle/>
-            <a:p>
-              <a:r>
-                <a:rPr lang="nl-NL" sz="1200" i="1" dirty="0" err="1">
-                  <a:solidFill>
-                    <a:schemeClr val="bg1">
-                      <a:lumMod val="50000"/>
-                    </a:schemeClr>
-                  </a:solidFill>
-                  <a:latin typeface="Arial" panose="020B0604020202020204" pitchFamily="34" charset="0"/>
-                  <a:cs typeface="Arial" panose="020B0604020202020204" pitchFamily="34" charset="0"/>
-                </a:rPr>
-                <a:t>Yangtzekanaal</a:t>
-              </a:r>
-              <a:endParaRPr lang="nl-NL" sz="1200" i="1" dirty="0">
-                <a:solidFill>
-                  <a:schemeClr val="bg1">
-                    <a:lumMod val="50000"/>
-                  </a:schemeClr>
-                </a:solidFill>
-                <a:latin typeface="Arial" panose="020B0604020202020204" pitchFamily="34" charset="0"/>
-                <a:cs typeface="Arial" panose="020B0604020202020204" pitchFamily="34" charset="0"/>
-              </a:endParaRPr>
-            </a:p>
-          </p:txBody>
-        </p:sp>
-        <p:sp>
-          <p:nvSpPr>
-            <p:cNvPr id="23" name="Tekstvak 22">
-              <a:extLst>
-                <a:ext uri="{FF2B5EF4-FFF2-40B4-BE49-F238E27FC236}">
-                  <a16:creationId xmlns:a16="http://schemas.microsoft.com/office/drawing/2014/main" id="{CDFFE1F3-4CA4-44E6-BF1F-29C59FA75107}"/>
-                </a:ext>
-              </a:extLst>
-            </p:cNvPr>
-            <p:cNvSpPr txBox="1"/>
-            <p:nvPr/>
-          </p:nvSpPr>
-          <p:spPr>
-            <a:xfrm rot="1687144">
-              <a:off x="8528708" y="4313192"/>
-              <a:ext cx="2382170" cy="276999"/>
-            </a:xfrm>
-            <a:prstGeom prst="rect">
-              <a:avLst/>
-            </a:prstGeom>
-            <a:noFill/>
-          </p:spPr>
-          <p:txBody>
-            <a:bodyPr wrap="square" rtlCol="0">
-              <a:spAutoFit/>
-            </a:bodyPr>
-            <a:lstStyle/>
-            <a:p>
-              <a:r>
-                <a:rPr lang="nl-NL" sz="1200" i="1" dirty="0">
-                  <a:solidFill>
-                    <a:schemeClr val="bg1">
-                      <a:lumMod val="50000"/>
-                    </a:schemeClr>
-                  </a:solidFill>
-                  <a:latin typeface="Arial" panose="020B0604020202020204" pitchFamily="34" charset="0"/>
-                  <a:cs typeface="Arial" panose="020B0604020202020204" pitchFamily="34" charset="0"/>
-                </a:rPr>
-                <a:t>Nieuwe waterweg</a:t>
-              </a:r>
-            </a:p>
-          </p:txBody>
-        </p:sp>
-        <p:sp>
-          <p:nvSpPr>
-            <p:cNvPr id="24" name="Tekstvak 23">
-              <a:extLst>
-                <a:ext uri="{FF2B5EF4-FFF2-40B4-BE49-F238E27FC236}">
-                  <a16:creationId xmlns:a16="http://schemas.microsoft.com/office/drawing/2014/main" id="{5BF4F42A-2E93-4458-BD0D-589A623DB2AC}"/>
-                </a:ext>
-              </a:extLst>
-            </p:cNvPr>
-            <p:cNvSpPr txBox="1"/>
-            <p:nvPr/>
-          </p:nvSpPr>
-          <p:spPr>
-            <a:xfrm rot="1134460">
-              <a:off x="202426" y="1092061"/>
-              <a:ext cx="1582310" cy="276999"/>
-            </a:xfrm>
-            <a:prstGeom prst="rect">
-              <a:avLst/>
-            </a:prstGeom>
-            <a:noFill/>
-          </p:spPr>
-          <p:txBody>
-            <a:bodyPr wrap="square" rtlCol="0">
-              <a:spAutoFit/>
-            </a:bodyPr>
-            <a:lstStyle/>
-            <a:p>
-              <a:r>
-                <a:rPr lang="nl-NL" sz="1200" i="1" dirty="0">
-                  <a:solidFill>
-                    <a:schemeClr val="bg1">
-                      <a:lumMod val="50000"/>
-                    </a:schemeClr>
-                  </a:solidFill>
-                  <a:latin typeface="Arial" panose="020B0604020202020204" pitchFamily="34" charset="0"/>
-                  <a:cs typeface="Arial" panose="020B0604020202020204" pitchFamily="34" charset="0"/>
-                </a:rPr>
-                <a:t>Maasgeul</a:t>
-              </a:r>
-            </a:p>
-          </p:txBody>
-        </p:sp>
-        <p:sp>
-          <p:nvSpPr>
-            <p:cNvPr id="28" name="Vrije vorm: vorm 27">
-              <a:extLst>
-                <a:ext uri="{FF2B5EF4-FFF2-40B4-BE49-F238E27FC236}">
-                  <a16:creationId xmlns:a16="http://schemas.microsoft.com/office/drawing/2014/main" id="{77292B64-C6EA-44F3-9A60-0D74347862B2}"/>
-                </a:ext>
-              </a:extLst>
-            </p:cNvPr>
-            <p:cNvSpPr/>
-            <p:nvPr/>
-          </p:nvSpPr>
-          <p:spPr>
-            <a:xfrm>
-              <a:off x="4607073" y="2614405"/>
-              <a:ext cx="3791158" cy="1697623"/>
-            </a:xfrm>
-            <a:custGeom>
-              <a:avLst/>
-              <a:gdLst>
-                <a:gd name="connsiteX0" fmla="*/ 0 w 3776870"/>
-                <a:gd name="connsiteY0" fmla="*/ 0 h 1709531"/>
-                <a:gd name="connsiteX1" fmla="*/ 1916265 w 3776870"/>
-                <a:gd name="connsiteY1" fmla="*/ 818985 h 1709531"/>
-                <a:gd name="connsiteX2" fmla="*/ 3776870 w 3776870"/>
-                <a:gd name="connsiteY2" fmla="*/ 1709531 h 1709531"/>
-                <a:gd name="connsiteX0" fmla="*/ 0 w 3776870"/>
-                <a:gd name="connsiteY0" fmla="*/ 0 h 1709531"/>
-                <a:gd name="connsiteX1" fmla="*/ 1923409 w 3776870"/>
-                <a:gd name="connsiteY1" fmla="*/ 823748 h 1709531"/>
-                <a:gd name="connsiteX2" fmla="*/ 3776870 w 3776870"/>
-                <a:gd name="connsiteY2" fmla="*/ 1709531 h 1709531"/>
-                <a:gd name="connsiteX0" fmla="*/ 0 w 3795920"/>
-                <a:gd name="connsiteY0" fmla="*/ 0 h 1700006"/>
-                <a:gd name="connsiteX1" fmla="*/ 1942459 w 3795920"/>
-                <a:gd name="connsiteY1" fmla="*/ 814223 h 1700006"/>
-                <a:gd name="connsiteX2" fmla="*/ 3795920 w 3795920"/>
-                <a:gd name="connsiteY2" fmla="*/ 1700006 h 1700006"/>
-                <a:gd name="connsiteX0" fmla="*/ 0 w 3805445"/>
-                <a:gd name="connsiteY0" fmla="*/ 0 h 1709531"/>
-                <a:gd name="connsiteX1" fmla="*/ 1951984 w 3805445"/>
-                <a:gd name="connsiteY1" fmla="*/ 823748 h 1709531"/>
-                <a:gd name="connsiteX2" fmla="*/ 3805445 w 3805445"/>
-                <a:gd name="connsiteY2" fmla="*/ 1709531 h 1709531"/>
-                <a:gd name="connsiteX0" fmla="*/ 0 w 3817352"/>
-                <a:gd name="connsiteY0" fmla="*/ 0 h 1752393"/>
-                <a:gd name="connsiteX1" fmla="*/ 1951984 w 3817352"/>
-                <a:gd name="connsiteY1" fmla="*/ 823748 h 1752393"/>
-                <a:gd name="connsiteX2" fmla="*/ 3817352 w 3817352"/>
-                <a:gd name="connsiteY2" fmla="*/ 1752393 h 1752393"/>
-                <a:gd name="connsiteX0" fmla="*/ 0 w 3817352"/>
-                <a:gd name="connsiteY0" fmla="*/ 0 h 1735724"/>
-                <a:gd name="connsiteX1" fmla="*/ 1951984 w 3817352"/>
-                <a:gd name="connsiteY1" fmla="*/ 823748 h 1735724"/>
-                <a:gd name="connsiteX2" fmla="*/ 3817352 w 3817352"/>
-                <a:gd name="connsiteY2" fmla="*/ 1735724 h 1735724"/>
-                <a:gd name="connsiteX0" fmla="*/ 0 w 3817352"/>
-                <a:gd name="connsiteY0" fmla="*/ 0 h 1735724"/>
-                <a:gd name="connsiteX1" fmla="*/ 1951984 w 3817352"/>
-                <a:gd name="connsiteY1" fmla="*/ 823748 h 1735724"/>
-                <a:gd name="connsiteX2" fmla="*/ 3817352 w 3817352"/>
-                <a:gd name="connsiteY2" fmla="*/ 1735724 h 1735724"/>
-                <a:gd name="connsiteX0" fmla="*/ 0 w 3793539"/>
-                <a:gd name="connsiteY0" fmla="*/ 0 h 1735724"/>
-                <a:gd name="connsiteX1" fmla="*/ 1951984 w 3793539"/>
-                <a:gd name="connsiteY1" fmla="*/ 823748 h 1735724"/>
-                <a:gd name="connsiteX2" fmla="*/ 3793539 w 3793539"/>
-                <a:gd name="connsiteY2" fmla="*/ 1735724 h 1735724"/>
-                <a:gd name="connsiteX0" fmla="*/ 0 w 3798301"/>
-                <a:gd name="connsiteY0" fmla="*/ 0 h 1728580"/>
-                <a:gd name="connsiteX1" fmla="*/ 1951984 w 3798301"/>
-                <a:gd name="connsiteY1" fmla="*/ 823748 h 1728580"/>
-                <a:gd name="connsiteX2" fmla="*/ 3798301 w 3798301"/>
-                <a:gd name="connsiteY2" fmla="*/ 1728580 h 1728580"/>
-                <a:gd name="connsiteX0" fmla="*/ 0 w 3798301"/>
-                <a:gd name="connsiteY0" fmla="*/ 0 h 1728580"/>
-                <a:gd name="connsiteX1" fmla="*/ 1951984 w 3798301"/>
-                <a:gd name="connsiteY1" fmla="*/ 823748 h 1728580"/>
-                <a:gd name="connsiteX2" fmla="*/ 3798301 w 3798301"/>
-                <a:gd name="connsiteY2" fmla="*/ 1728580 h 1728580"/>
-                <a:gd name="connsiteX0" fmla="*/ 0 w 3798301"/>
-                <a:gd name="connsiteY0" fmla="*/ 0 h 1728580"/>
-                <a:gd name="connsiteX1" fmla="*/ 1951984 w 3798301"/>
-                <a:gd name="connsiteY1" fmla="*/ 823748 h 1728580"/>
-                <a:gd name="connsiteX2" fmla="*/ 3798301 w 3798301"/>
-                <a:gd name="connsiteY2" fmla="*/ 1728580 h 1728580"/>
-                <a:gd name="connsiteX0" fmla="*/ 0 w 3781632"/>
-                <a:gd name="connsiteY0" fmla="*/ 0 h 1700005"/>
-                <a:gd name="connsiteX1" fmla="*/ 1951984 w 3781632"/>
-                <a:gd name="connsiteY1" fmla="*/ 823748 h 1700005"/>
-                <a:gd name="connsiteX2" fmla="*/ 3781632 w 3781632"/>
-                <a:gd name="connsiteY2" fmla="*/ 1700005 h 1700005"/>
-                <a:gd name="connsiteX0" fmla="*/ 0 w 3800682"/>
-                <a:gd name="connsiteY0" fmla="*/ 0 h 1711911"/>
-                <a:gd name="connsiteX1" fmla="*/ 1951984 w 3800682"/>
-                <a:gd name="connsiteY1" fmla="*/ 823748 h 1711911"/>
-                <a:gd name="connsiteX2" fmla="*/ 3800682 w 3800682"/>
-                <a:gd name="connsiteY2" fmla="*/ 1711911 h 1711911"/>
-                <a:gd name="connsiteX0" fmla="*/ 0 w 3743532"/>
-                <a:gd name="connsiteY0" fmla="*/ 0 h 1676193"/>
-                <a:gd name="connsiteX1" fmla="*/ 1951984 w 3743532"/>
-                <a:gd name="connsiteY1" fmla="*/ 823748 h 1676193"/>
-                <a:gd name="connsiteX2" fmla="*/ 3743532 w 3743532"/>
-                <a:gd name="connsiteY2" fmla="*/ 1676193 h 1676193"/>
-                <a:gd name="connsiteX0" fmla="*/ 0 w 3791157"/>
-                <a:gd name="connsiteY0" fmla="*/ 0 h 1702386"/>
-                <a:gd name="connsiteX1" fmla="*/ 1951984 w 3791157"/>
-                <a:gd name="connsiteY1" fmla="*/ 823748 h 1702386"/>
-                <a:gd name="connsiteX2" fmla="*/ 3791157 w 3791157"/>
-                <a:gd name="connsiteY2" fmla="*/ 1702386 h 1702386"/>
-                <a:gd name="connsiteX0" fmla="*/ 0 w 3776869"/>
-                <a:gd name="connsiteY0" fmla="*/ 0 h 1685717"/>
-                <a:gd name="connsiteX1" fmla="*/ 1951984 w 3776869"/>
-                <a:gd name="connsiteY1" fmla="*/ 823748 h 1685717"/>
-                <a:gd name="connsiteX2" fmla="*/ 3776869 w 3776869"/>
-                <a:gd name="connsiteY2" fmla="*/ 1685717 h 1685717"/>
-                <a:gd name="connsiteX0" fmla="*/ 0 w 3776869"/>
-                <a:gd name="connsiteY0" fmla="*/ 0 h 1685717"/>
-                <a:gd name="connsiteX1" fmla="*/ 1951984 w 3776869"/>
-                <a:gd name="connsiteY1" fmla="*/ 823748 h 1685717"/>
-                <a:gd name="connsiteX2" fmla="*/ 3776869 w 3776869"/>
-                <a:gd name="connsiteY2" fmla="*/ 1685717 h 1685717"/>
-                <a:gd name="connsiteX0" fmla="*/ 0 w 3776869"/>
-                <a:gd name="connsiteY0" fmla="*/ 0 h 1685717"/>
-                <a:gd name="connsiteX1" fmla="*/ 1951984 w 3776869"/>
-                <a:gd name="connsiteY1" fmla="*/ 823748 h 1685717"/>
-                <a:gd name="connsiteX2" fmla="*/ 3776869 w 3776869"/>
-                <a:gd name="connsiteY2" fmla="*/ 1685717 h 1685717"/>
-                <a:gd name="connsiteX0" fmla="*/ 0 w 3776869"/>
-                <a:gd name="connsiteY0" fmla="*/ 0 h 1685717"/>
-                <a:gd name="connsiteX1" fmla="*/ 1951984 w 3776869"/>
-                <a:gd name="connsiteY1" fmla="*/ 823748 h 1685717"/>
-                <a:gd name="connsiteX2" fmla="*/ 3776869 w 3776869"/>
-                <a:gd name="connsiteY2" fmla="*/ 1685717 h 1685717"/>
-                <a:gd name="connsiteX0" fmla="*/ 0 w 3767344"/>
-                <a:gd name="connsiteY0" fmla="*/ 0 h 1688098"/>
-                <a:gd name="connsiteX1" fmla="*/ 1951984 w 3767344"/>
-                <a:gd name="connsiteY1" fmla="*/ 823748 h 1688098"/>
-                <a:gd name="connsiteX2" fmla="*/ 3767344 w 3767344"/>
-                <a:gd name="connsiteY2" fmla="*/ 1688098 h 1688098"/>
-                <a:gd name="connsiteX0" fmla="*/ 0 w 3767344"/>
-                <a:gd name="connsiteY0" fmla="*/ 0 h 1688098"/>
-                <a:gd name="connsiteX1" fmla="*/ 1951984 w 3767344"/>
-                <a:gd name="connsiteY1" fmla="*/ 823748 h 1688098"/>
-                <a:gd name="connsiteX2" fmla="*/ 3767344 w 3767344"/>
-                <a:gd name="connsiteY2" fmla="*/ 1688098 h 1688098"/>
-                <a:gd name="connsiteX0" fmla="*/ 0 w 3791157"/>
-                <a:gd name="connsiteY0" fmla="*/ 0 h 1688098"/>
-                <a:gd name="connsiteX1" fmla="*/ 1975797 w 3791157"/>
-                <a:gd name="connsiteY1" fmla="*/ 823748 h 1688098"/>
-                <a:gd name="connsiteX2" fmla="*/ 3791157 w 3791157"/>
-                <a:gd name="connsiteY2" fmla="*/ 1688098 h 1688098"/>
-                <a:gd name="connsiteX0" fmla="*/ 0 w 3779251"/>
-                <a:gd name="connsiteY0" fmla="*/ 0 h 1688098"/>
-                <a:gd name="connsiteX1" fmla="*/ 1963891 w 3779251"/>
-                <a:gd name="connsiteY1" fmla="*/ 823748 h 1688098"/>
-                <a:gd name="connsiteX2" fmla="*/ 3779251 w 3779251"/>
-                <a:gd name="connsiteY2" fmla="*/ 1688098 h 1688098"/>
-                <a:gd name="connsiteX0" fmla="*/ 0 w 3788776"/>
-                <a:gd name="connsiteY0" fmla="*/ 0 h 1700004"/>
-                <a:gd name="connsiteX1" fmla="*/ 1973416 w 3788776"/>
-                <a:gd name="connsiteY1" fmla="*/ 835654 h 1700004"/>
-                <a:gd name="connsiteX2" fmla="*/ 3788776 w 3788776"/>
-                <a:gd name="connsiteY2" fmla="*/ 1700004 h 1700004"/>
-                <a:gd name="connsiteX0" fmla="*/ 0 w 3800683"/>
-                <a:gd name="connsiteY0" fmla="*/ 0 h 1700004"/>
-                <a:gd name="connsiteX1" fmla="*/ 1985323 w 3800683"/>
-                <a:gd name="connsiteY1" fmla="*/ 835654 h 1700004"/>
-                <a:gd name="connsiteX2" fmla="*/ 3800683 w 3800683"/>
-                <a:gd name="connsiteY2" fmla="*/ 1700004 h 1700004"/>
-                <a:gd name="connsiteX0" fmla="*/ 0 w 3800683"/>
-                <a:gd name="connsiteY0" fmla="*/ 0 h 1700004"/>
-                <a:gd name="connsiteX1" fmla="*/ 1985323 w 3800683"/>
-                <a:gd name="connsiteY1" fmla="*/ 835654 h 1700004"/>
-                <a:gd name="connsiteX2" fmla="*/ 3800683 w 3800683"/>
-                <a:gd name="connsiteY2" fmla="*/ 1700004 h 1700004"/>
-                <a:gd name="connsiteX0" fmla="*/ 0 w 3791158"/>
-                <a:gd name="connsiteY0" fmla="*/ 0 h 1697623"/>
-                <a:gd name="connsiteX1" fmla="*/ 1975798 w 3791158"/>
-                <a:gd name="connsiteY1" fmla="*/ 833273 h 1697623"/>
-                <a:gd name="connsiteX2" fmla="*/ 3791158 w 3791158"/>
-                <a:gd name="connsiteY2" fmla="*/ 1697623 h 1697623"/>
-              </a:gdLst>
-              <a:ahLst/>
-              <a:cxnLst>
-                <a:cxn ang="0">
-                  <a:pos x="connsiteX0" y="connsiteY0"/>
-                </a:cxn>
-                <a:cxn ang="0">
-                  <a:pos x="connsiteX1" y="connsiteY1"/>
-                </a:cxn>
-                <a:cxn ang="0">
-                  <a:pos x="connsiteX2" y="connsiteY2"/>
-                </a:cxn>
-              </a:cxnLst>
-              <a:rect l="l" t="t" r="r" b="b"/>
-              <a:pathLst>
-                <a:path w="3791158" h="1697623">
-                  <a:moveTo>
-                    <a:pt x="0" y="0"/>
-                  </a:moveTo>
-                  <a:cubicBezTo>
-                    <a:pt x="643393" y="267031"/>
-                    <a:pt x="1343938" y="550336"/>
-                    <a:pt x="1975798" y="833273"/>
-                  </a:cubicBezTo>
-                  <a:cubicBezTo>
-                    <a:pt x="2607658" y="1116210"/>
-                    <a:pt x="3114717" y="1347641"/>
-                    <a:pt x="3791158" y="1697623"/>
-                  </a:cubicBezTo>
-                </a:path>
-              </a:pathLst>
-            </a:custGeom>
-            <a:noFill/>
-            <a:ln w="38100" cap="rnd">
-              <a:solidFill>
-                <a:srgbClr val="F2F2F2"/>
-              </a:solidFill>
-              <a:headEnd type="oval" w="med" len="sm"/>
-              <a:tailEnd type="oval" w="med" len="lg"/>
-            </a:ln>
-          </p:spPr>
-          <p:style>
-            <a:lnRef idx="2">
-              <a:schemeClr val="accent1">
-                <a:shade val="50000"/>
-              </a:schemeClr>
-            </a:lnRef>
-            <a:fillRef idx="1">
-              <a:schemeClr val="accent1"/>
-            </a:fillRef>
-            <a:effectRef idx="0">
-              <a:schemeClr val="accent1"/>
-            </a:effectRef>
-            <a:fontRef idx="minor">
-              <a:schemeClr val="lt1"/>
-            </a:fontRef>
-          </p:style>
-          <p:txBody>
-            <a:bodyPr rtlCol="0" anchor="ctr"/>
-            <a:lstStyle/>
-            <a:p>
-              <a:pPr algn="ctr"/>
-              <a:endParaRPr lang="nl-NL"/>
-            </a:p>
-          </p:txBody>
-        </p:sp>
-        <p:sp>
-          <p:nvSpPr>
-            <p:cNvPr id="29" name="Tekstvak 28">
-              <a:extLst>
-                <a:ext uri="{FF2B5EF4-FFF2-40B4-BE49-F238E27FC236}">
-                  <a16:creationId xmlns:a16="http://schemas.microsoft.com/office/drawing/2014/main" id="{FA43A1F9-4808-42A0-9663-8AEA70E4953C}"/>
-                </a:ext>
-              </a:extLst>
-            </p:cNvPr>
-            <p:cNvSpPr txBox="1"/>
-            <p:nvPr/>
-          </p:nvSpPr>
-          <p:spPr>
-            <a:xfrm>
-              <a:off x="3342500" y="264916"/>
-              <a:ext cx="1582310" cy="276999"/>
-            </a:xfrm>
-            <a:prstGeom prst="rect">
-              <a:avLst/>
-            </a:prstGeom>
-            <a:noFill/>
-          </p:spPr>
-          <p:txBody>
-            <a:bodyPr wrap="square" rtlCol="0">
-              <a:spAutoFit/>
-            </a:bodyPr>
-            <a:lstStyle/>
-            <a:p>
-              <a:r>
-                <a:rPr lang="nl-NL" sz="1200" i="1" dirty="0">
-                  <a:solidFill>
-                    <a:schemeClr val="bg1">
-                      <a:lumMod val="50000"/>
-                    </a:schemeClr>
-                  </a:solidFill>
-                  <a:latin typeface="Arial" panose="020B0604020202020204" pitchFamily="34" charset="0"/>
-                  <a:cs typeface="Arial" panose="020B0604020202020204" pitchFamily="34" charset="0"/>
-                </a:rPr>
-                <a:t>North </a:t>
-              </a:r>
-              <a:r>
-                <a:rPr lang="nl-NL" sz="1200" i="1" dirty="0" err="1">
-                  <a:solidFill>
-                    <a:schemeClr val="bg1">
-                      <a:lumMod val="50000"/>
-                    </a:schemeClr>
-                  </a:solidFill>
-                  <a:latin typeface="Arial" panose="020B0604020202020204" pitchFamily="34" charset="0"/>
-                  <a:cs typeface="Arial" panose="020B0604020202020204" pitchFamily="34" charset="0"/>
-                </a:rPr>
-                <a:t>sea</a:t>
-              </a:r>
-              <a:endParaRPr lang="nl-NL" sz="1200" i="1" dirty="0">
-                <a:solidFill>
-                  <a:schemeClr val="bg1">
-                    <a:lumMod val="50000"/>
-                  </a:schemeClr>
-                </a:solidFill>
-                <a:latin typeface="Arial" panose="020B0604020202020204" pitchFamily="34" charset="0"/>
-                <a:cs typeface="Arial" panose="020B0604020202020204" pitchFamily="34" charset="0"/>
-              </a:endParaRPr>
-            </a:p>
-          </p:txBody>
-        </p:sp>
-        <p:sp>
-          <p:nvSpPr>
-            <p:cNvPr id="30" name="Vrije vorm: vorm 29">
-              <a:extLst>
-                <a:ext uri="{FF2B5EF4-FFF2-40B4-BE49-F238E27FC236}">
-                  <a16:creationId xmlns:a16="http://schemas.microsoft.com/office/drawing/2014/main" id="{41F770EE-6251-423A-B7F6-0352834C8E10}"/>
-                </a:ext>
-              </a:extLst>
-            </p:cNvPr>
-            <p:cNvSpPr/>
-            <p:nvPr/>
-          </p:nvSpPr>
-          <p:spPr>
-            <a:xfrm>
-              <a:off x="1435247" y="623680"/>
-              <a:ext cx="5778073" cy="1985278"/>
-            </a:xfrm>
-            <a:custGeom>
-              <a:avLst/>
-              <a:gdLst>
-                <a:gd name="connsiteX0" fmla="*/ 0 w 3776870"/>
-                <a:gd name="connsiteY0" fmla="*/ 0 h 1709531"/>
-                <a:gd name="connsiteX1" fmla="*/ 1916265 w 3776870"/>
-                <a:gd name="connsiteY1" fmla="*/ 818985 h 1709531"/>
-                <a:gd name="connsiteX2" fmla="*/ 3776870 w 3776870"/>
-                <a:gd name="connsiteY2" fmla="*/ 1709531 h 1709531"/>
-                <a:gd name="connsiteX0" fmla="*/ 0 w 3776870"/>
-                <a:gd name="connsiteY0" fmla="*/ 0 h 1709531"/>
-                <a:gd name="connsiteX1" fmla="*/ 1923409 w 3776870"/>
-                <a:gd name="connsiteY1" fmla="*/ 823748 h 1709531"/>
-                <a:gd name="connsiteX2" fmla="*/ 3776870 w 3776870"/>
-                <a:gd name="connsiteY2" fmla="*/ 1709531 h 1709531"/>
-                <a:gd name="connsiteX0" fmla="*/ 0 w 3795920"/>
-                <a:gd name="connsiteY0" fmla="*/ 0 h 1700006"/>
-                <a:gd name="connsiteX1" fmla="*/ 1942459 w 3795920"/>
-                <a:gd name="connsiteY1" fmla="*/ 814223 h 1700006"/>
-                <a:gd name="connsiteX2" fmla="*/ 3795920 w 3795920"/>
-                <a:gd name="connsiteY2" fmla="*/ 1700006 h 1700006"/>
-                <a:gd name="connsiteX0" fmla="*/ 0 w 3805445"/>
-                <a:gd name="connsiteY0" fmla="*/ 0 h 1709531"/>
-                <a:gd name="connsiteX1" fmla="*/ 1951984 w 3805445"/>
-                <a:gd name="connsiteY1" fmla="*/ 823748 h 1709531"/>
-                <a:gd name="connsiteX2" fmla="*/ 3805445 w 3805445"/>
-                <a:gd name="connsiteY2" fmla="*/ 1709531 h 1709531"/>
-                <a:gd name="connsiteX0" fmla="*/ 0 w 3817352"/>
-                <a:gd name="connsiteY0" fmla="*/ 0 h 1752393"/>
-                <a:gd name="connsiteX1" fmla="*/ 1951984 w 3817352"/>
-                <a:gd name="connsiteY1" fmla="*/ 823748 h 1752393"/>
-                <a:gd name="connsiteX2" fmla="*/ 3817352 w 3817352"/>
-                <a:gd name="connsiteY2" fmla="*/ 1752393 h 1752393"/>
-                <a:gd name="connsiteX0" fmla="*/ 0 w 3817352"/>
-                <a:gd name="connsiteY0" fmla="*/ 0 h 1735724"/>
-                <a:gd name="connsiteX1" fmla="*/ 1951984 w 3817352"/>
-                <a:gd name="connsiteY1" fmla="*/ 823748 h 1735724"/>
-                <a:gd name="connsiteX2" fmla="*/ 3817352 w 3817352"/>
-                <a:gd name="connsiteY2" fmla="*/ 1735724 h 1735724"/>
-                <a:gd name="connsiteX0" fmla="*/ 0 w 3817352"/>
-                <a:gd name="connsiteY0" fmla="*/ 0 h 1735724"/>
-                <a:gd name="connsiteX1" fmla="*/ 1951984 w 3817352"/>
-                <a:gd name="connsiteY1" fmla="*/ 823748 h 1735724"/>
-                <a:gd name="connsiteX2" fmla="*/ 3817352 w 3817352"/>
-                <a:gd name="connsiteY2" fmla="*/ 1735724 h 1735724"/>
-                <a:gd name="connsiteX0" fmla="*/ 0 w 3793539"/>
-                <a:gd name="connsiteY0" fmla="*/ 0 h 1735724"/>
-                <a:gd name="connsiteX1" fmla="*/ 1951984 w 3793539"/>
-                <a:gd name="connsiteY1" fmla="*/ 823748 h 1735724"/>
-                <a:gd name="connsiteX2" fmla="*/ 3793539 w 3793539"/>
-                <a:gd name="connsiteY2" fmla="*/ 1735724 h 1735724"/>
-                <a:gd name="connsiteX0" fmla="*/ 0 w 3798301"/>
-                <a:gd name="connsiteY0" fmla="*/ 0 h 1728580"/>
-                <a:gd name="connsiteX1" fmla="*/ 1951984 w 3798301"/>
-                <a:gd name="connsiteY1" fmla="*/ 823748 h 1728580"/>
-                <a:gd name="connsiteX2" fmla="*/ 3798301 w 3798301"/>
-                <a:gd name="connsiteY2" fmla="*/ 1728580 h 1728580"/>
-                <a:gd name="connsiteX0" fmla="*/ 0 w 3798301"/>
-                <a:gd name="connsiteY0" fmla="*/ 0 h 1728580"/>
-                <a:gd name="connsiteX1" fmla="*/ 1951984 w 3798301"/>
-                <a:gd name="connsiteY1" fmla="*/ 823748 h 1728580"/>
-                <a:gd name="connsiteX2" fmla="*/ 3798301 w 3798301"/>
-                <a:gd name="connsiteY2" fmla="*/ 1728580 h 1728580"/>
-                <a:gd name="connsiteX0" fmla="*/ 0 w 3798301"/>
-                <a:gd name="connsiteY0" fmla="*/ 0 h 1728580"/>
-                <a:gd name="connsiteX1" fmla="*/ 1951984 w 3798301"/>
-                <a:gd name="connsiteY1" fmla="*/ 823748 h 1728580"/>
-                <a:gd name="connsiteX2" fmla="*/ 3798301 w 3798301"/>
-                <a:gd name="connsiteY2" fmla="*/ 1728580 h 1728580"/>
-                <a:gd name="connsiteX0" fmla="*/ 0 w 3781632"/>
-                <a:gd name="connsiteY0" fmla="*/ 0 h 1700005"/>
-                <a:gd name="connsiteX1" fmla="*/ 1951984 w 3781632"/>
-                <a:gd name="connsiteY1" fmla="*/ 823748 h 1700005"/>
-                <a:gd name="connsiteX2" fmla="*/ 3781632 w 3781632"/>
-                <a:gd name="connsiteY2" fmla="*/ 1700005 h 1700005"/>
-                <a:gd name="connsiteX0" fmla="*/ 0 w 3800682"/>
-                <a:gd name="connsiteY0" fmla="*/ 0 h 1711911"/>
-                <a:gd name="connsiteX1" fmla="*/ 1951984 w 3800682"/>
-                <a:gd name="connsiteY1" fmla="*/ 823748 h 1711911"/>
-                <a:gd name="connsiteX2" fmla="*/ 3800682 w 3800682"/>
-                <a:gd name="connsiteY2" fmla="*/ 1711911 h 1711911"/>
-                <a:gd name="connsiteX0" fmla="*/ 0 w 3743532"/>
-                <a:gd name="connsiteY0" fmla="*/ 0 h 1676193"/>
-                <a:gd name="connsiteX1" fmla="*/ 1951984 w 3743532"/>
-                <a:gd name="connsiteY1" fmla="*/ 823748 h 1676193"/>
-                <a:gd name="connsiteX2" fmla="*/ 3743532 w 3743532"/>
-                <a:gd name="connsiteY2" fmla="*/ 1676193 h 1676193"/>
-                <a:gd name="connsiteX0" fmla="*/ 0 w 3791157"/>
-                <a:gd name="connsiteY0" fmla="*/ 0 h 1702386"/>
-                <a:gd name="connsiteX1" fmla="*/ 1951984 w 3791157"/>
-                <a:gd name="connsiteY1" fmla="*/ 823748 h 1702386"/>
-                <a:gd name="connsiteX2" fmla="*/ 3791157 w 3791157"/>
-                <a:gd name="connsiteY2" fmla="*/ 1702386 h 1702386"/>
-                <a:gd name="connsiteX0" fmla="*/ 0 w 3776869"/>
-                <a:gd name="connsiteY0" fmla="*/ 0 h 1685717"/>
-                <a:gd name="connsiteX1" fmla="*/ 1951984 w 3776869"/>
-                <a:gd name="connsiteY1" fmla="*/ 823748 h 1685717"/>
-                <a:gd name="connsiteX2" fmla="*/ 3776869 w 3776869"/>
-                <a:gd name="connsiteY2" fmla="*/ 1685717 h 1685717"/>
-                <a:gd name="connsiteX0" fmla="*/ 0 w 3776869"/>
-                <a:gd name="connsiteY0" fmla="*/ 0 h 1685717"/>
-                <a:gd name="connsiteX1" fmla="*/ 1951984 w 3776869"/>
-                <a:gd name="connsiteY1" fmla="*/ 823748 h 1685717"/>
-                <a:gd name="connsiteX2" fmla="*/ 3776869 w 3776869"/>
-                <a:gd name="connsiteY2" fmla="*/ 1685717 h 1685717"/>
-                <a:gd name="connsiteX0" fmla="*/ 0 w 3776869"/>
-                <a:gd name="connsiteY0" fmla="*/ 0 h 1685717"/>
-                <a:gd name="connsiteX1" fmla="*/ 1951984 w 3776869"/>
-                <a:gd name="connsiteY1" fmla="*/ 823748 h 1685717"/>
-                <a:gd name="connsiteX2" fmla="*/ 3776869 w 3776869"/>
-                <a:gd name="connsiteY2" fmla="*/ 1685717 h 1685717"/>
-                <a:gd name="connsiteX0" fmla="*/ 0 w 3776869"/>
-                <a:gd name="connsiteY0" fmla="*/ 0 h 1685717"/>
-                <a:gd name="connsiteX1" fmla="*/ 1951984 w 3776869"/>
-                <a:gd name="connsiteY1" fmla="*/ 823748 h 1685717"/>
-                <a:gd name="connsiteX2" fmla="*/ 3776869 w 3776869"/>
-                <a:gd name="connsiteY2" fmla="*/ 1685717 h 1685717"/>
-                <a:gd name="connsiteX0" fmla="*/ 0 w 3767344"/>
-                <a:gd name="connsiteY0" fmla="*/ 0 h 1688098"/>
-                <a:gd name="connsiteX1" fmla="*/ 1951984 w 3767344"/>
-                <a:gd name="connsiteY1" fmla="*/ 823748 h 1688098"/>
-                <a:gd name="connsiteX2" fmla="*/ 3767344 w 3767344"/>
-                <a:gd name="connsiteY2" fmla="*/ 1688098 h 1688098"/>
-                <a:gd name="connsiteX0" fmla="*/ 0 w 3767344"/>
-                <a:gd name="connsiteY0" fmla="*/ 0 h 1688098"/>
-                <a:gd name="connsiteX1" fmla="*/ 1951984 w 3767344"/>
-                <a:gd name="connsiteY1" fmla="*/ 823748 h 1688098"/>
-                <a:gd name="connsiteX2" fmla="*/ 3767344 w 3767344"/>
-                <a:gd name="connsiteY2" fmla="*/ 1688098 h 1688098"/>
-                <a:gd name="connsiteX0" fmla="*/ 0 w 3791157"/>
-                <a:gd name="connsiteY0" fmla="*/ 0 h 1688098"/>
-                <a:gd name="connsiteX1" fmla="*/ 1975797 w 3791157"/>
-                <a:gd name="connsiteY1" fmla="*/ 823748 h 1688098"/>
-                <a:gd name="connsiteX2" fmla="*/ 3791157 w 3791157"/>
-                <a:gd name="connsiteY2" fmla="*/ 1688098 h 1688098"/>
-                <a:gd name="connsiteX0" fmla="*/ 0 w 3779251"/>
-                <a:gd name="connsiteY0" fmla="*/ 0 h 1688098"/>
-                <a:gd name="connsiteX1" fmla="*/ 1963891 w 3779251"/>
-                <a:gd name="connsiteY1" fmla="*/ 823748 h 1688098"/>
-                <a:gd name="connsiteX2" fmla="*/ 3779251 w 3779251"/>
-                <a:gd name="connsiteY2" fmla="*/ 1688098 h 1688098"/>
-                <a:gd name="connsiteX0" fmla="*/ 0 w 3788776"/>
-                <a:gd name="connsiteY0" fmla="*/ 0 h 1700004"/>
-                <a:gd name="connsiteX1" fmla="*/ 1973416 w 3788776"/>
-                <a:gd name="connsiteY1" fmla="*/ 835654 h 1700004"/>
-                <a:gd name="connsiteX2" fmla="*/ 3788776 w 3788776"/>
-                <a:gd name="connsiteY2" fmla="*/ 1700004 h 1700004"/>
-                <a:gd name="connsiteX0" fmla="*/ 0 w 3800683"/>
-                <a:gd name="connsiteY0" fmla="*/ 0 h 1700004"/>
-                <a:gd name="connsiteX1" fmla="*/ 1985323 w 3800683"/>
-                <a:gd name="connsiteY1" fmla="*/ 835654 h 1700004"/>
-                <a:gd name="connsiteX2" fmla="*/ 3800683 w 3800683"/>
-                <a:gd name="connsiteY2" fmla="*/ 1700004 h 1700004"/>
-                <a:gd name="connsiteX0" fmla="*/ 0 w 3800683"/>
-                <a:gd name="connsiteY0" fmla="*/ 0 h 1700004"/>
-                <a:gd name="connsiteX1" fmla="*/ 1985323 w 3800683"/>
-                <a:gd name="connsiteY1" fmla="*/ 835654 h 1700004"/>
-                <a:gd name="connsiteX2" fmla="*/ 3800683 w 3800683"/>
-                <a:gd name="connsiteY2" fmla="*/ 1700004 h 1700004"/>
-                <a:gd name="connsiteX0" fmla="*/ 0 w 3791158"/>
-                <a:gd name="connsiteY0" fmla="*/ 0 h 1697623"/>
-                <a:gd name="connsiteX1" fmla="*/ 1975798 w 3791158"/>
-                <a:gd name="connsiteY1" fmla="*/ 833273 h 1697623"/>
-                <a:gd name="connsiteX2" fmla="*/ 3791158 w 3791158"/>
-                <a:gd name="connsiteY2" fmla="*/ 1697623 h 1697623"/>
-                <a:gd name="connsiteX0" fmla="*/ 0 w 2943433"/>
-                <a:gd name="connsiteY0" fmla="*/ 0 h 1154698"/>
-                <a:gd name="connsiteX1" fmla="*/ 1975798 w 2943433"/>
-                <a:gd name="connsiteY1" fmla="*/ 833273 h 1154698"/>
-                <a:gd name="connsiteX2" fmla="*/ 2943433 w 2943433"/>
-                <a:gd name="connsiteY2" fmla="*/ 1154698 h 1154698"/>
-                <a:gd name="connsiteX0" fmla="*/ 0 w 2943433"/>
-                <a:gd name="connsiteY0" fmla="*/ 0 h 1154698"/>
-                <a:gd name="connsiteX1" fmla="*/ 2943433 w 2943433"/>
-                <a:gd name="connsiteY1" fmla="*/ 1154698 h 1154698"/>
-                <a:gd name="connsiteX0" fmla="*/ 0 w 3172033"/>
-                <a:gd name="connsiteY0" fmla="*/ 0 h 1154698"/>
-                <a:gd name="connsiteX1" fmla="*/ 3172033 w 3172033"/>
-                <a:gd name="connsiteY1" fmla="*/ 1154698 h 1154698"/>
-                <a:gd name="connsiteX0" fmla="*/ 0 w 3423493"/>
-                <a:gd name="connsiteY0" fmla="*/ 0 h 1253758"/>
-                <a:gd name="connsiteX1" fmla="*/ 3423493 w 3423493"/>
-                <a:gd name="connsiteY1" fmla="*/ 1253758 h 1253758"/>
-                <a:gd name="connsiteX0" fmla="*/ 0 w 5724733"/>
-                <a:gd name="connsiteY0" fmla="*/ 0 h 2046238"/>
-                <a:gd name="connsiteX1" fmla="*/ 5724733 w 5724733"/>
-                <a:gd name="connsiteY1" fmla="*/ 2046238 h 2046238"/>
-                <a:gd name="connsiteX0" fmla="*/ 0 w 5778073"/>
-                <a:gd name="connsiteY0" fmla="*/ 0 h 1985278"/>
-                <a:gd name="connsiteX1" fmla="*/ 5778073 w 5778073"/>
-                <a:gd name="connsiteY1" fmla="*/ 1985278 h 1985278"/>
-              </a:gdLst>
-              <a:ahLst/>
-              <a:cxnLst>
-                <a:cxn ang="0">
-                  <a:pos x="connsiteX0" y="connsiteY0"/>
-                </a:cxn>
-                <a:cxn ang="0">
-                  <a:pos x="connsiteX1" y="connsiteY1"/>
-                </a:cxn>
-              </a:cxnLst>
-              <a:rect l="l" t="t" r="r" b="b"/>
-              <a:pathLst>
-                <a:path w="5778073" h="1985278">
-                  <a:moveTo>
-                    <a:pt x="0" y="0"/>
-                  </a:moveTo>
-                  <a:lnTo>
-                    <a:pt x="5778073" y="1985278"/>
-                  </a:lnTo>
-                </a:path>
-              </a:pathLst>
-            </a:custGeom>
-            <a:noFill/>
-            <a:ln w="12700" cap="rnd">
-              <a:solidFill>
-                <a:srgbClr val="F2F2F2"/>
-              </a:solidFill>
-              <a:headEnd type="oval" w="med" len="med"/>
-              <a:tailEnd type="none" w="med" len="med"/>
-            </a:ln>
-          </p:spPr>
-          <p:style>
-            <a:lnRef idx="2">
-              <a:schemeClr val="accent1">
-                <a:shade val="50000"/>
-              </a:schemeClr>
-            </a:lnRef>
-            <a:fillRef idx="1">
-              <a:schemeClr val="accent1"/>
-            </a:fillRef>
-            <a:effectRef idx="0">
-              <a:schemeClr val="accent1"/>
-            </a:effectRef>
-            <a:fontRef idx="minor">
-              <a:schemeClr val="lt1"/>
-            </a:fontRef>
-          </p:style>
-          <p:txBody>
-            <a:bodyPr rtlCol="0" anchor="ctr"/>
-            <a:lstStyle/>
-            <a:p>
-              <a:pPr algn="ctr"/>
-              <a:endParaRPr lang="nl-NL"/>
-            </a:p>
-          </p:txBody>
-        </p:sp>
-        <p:sp>
-          <p:nvSpPr>
-            <p:cNvPr id="31" name="Vrije vorm: vorm 30">
-              <a:extLst>
-                <a:ext uri="{FF2B5EF4-FFF2-40B4-BE49-F238E27FC236}">
-                  <a16:creationId xmlns:a16="http://schemas.microsoft.com/office/drawing/2014/main" id="{7A59B2FF-BB7A-498D-BAD2-20A79F7CC2DF}"/>
-                </a:ext>
-              </a:extLst>
-            </p:cNvPr>
-            <p:cNvSpPr/>
-            <p:nvPr/>
-          </p:nvSpPr>
-          <p:spPr>
-            <a:xfrm>
-              <a:off x="487241" y="1806952"/>
-              <a:ext cx="361266" cy="165467"/>
-            </a:xfrm>
-            <a:custGeom>
-              <a:avLst/>
-              <a:gdLst>
-                <a:gd name="connsiteX0" fmla="*/ 0 w 3776870"/>
-                <a:gd name="connsiteY0" fmla="*/ 0 h 1709531"/>
-                <a:gd name="connsiteX1" fmla="*/ 1916265 w 3776870"/>
-                <a:gd name="connsiteY1" fmla="*/ 818985 h 1709531"/>
-                <a:gd name="connsiteX2" fmla="*/ 3776870 w 3776870"/>
-                <a:gd name="connsiteY2" fmla="*/ 1709531 h 1709531"/>
-                <a:gd name="connsiteX0" fmla="*/ 0 w 3776870"/>
-                <a:gd name="connsiteY0" fmla="*/ 0 h 1709531"/>
-                <a:gd name="connsiteX1" fmla="*/ 1923409 w 3776870"/>
-                <a:gd name="connsiteY1" fmla="*/ 823748 h 1709531"/>
-                <a:gd name="connsiteX2" fmla="*/ 3776870 w 3776870"/>
-                <a:gd name="connsiteY2" fmla="*/ 1709531 h 1709531"/>
-                <a:gd name="connsiteX0" fmla="*/ 0 w 3795920"/>
-                <a:gd name="connsiteY0" fmla="*/ 0 h 1700006"/>
-                <a:gd name="connsiteX1" fmla="*/ 1942459 w 3795920"/>
-                <a:gd name="connsiteY1" fmla="*/ 814223 h 1700006"/>
-                <a:gd name="connsiteX2" fmla="*/ 3795920 w 3795920"/>
-                <a:gd name="connsiteY2" fmla="*/ 1700006 h 1700006"/>
-                <a:gd name="connsiteX0" fmla="*/ 0 w 3805445"/>
-                <a:gd name="connsiteY0" fmla="*/ 0 h 1709531"/>
-                <a:gd name="connsiteX1" fmla="*/ 1951984 w 3805445"/>
-                <a:gd name="connsiteY1" fmla="*/ 823748 h 1709531"/>
-                <a:gd name="connsiteX2" fmla="*/ 3805445 w 3805445"/>
-                <a:gd name="connsiteY2" fmla="*/ 1709531 h 1709531"/>
-                <a:gd name="connsiteX0" fmla="*/ 0 w 3817352"/>
-                <a:gd name="connsiteY0" fmla="*/ 0 h 1752393"/>
-                <a:gd name="connsiteX1" fmla="*/ 1951984 w 3817352"/>
-                <a:gd name="connsiteY1" fmla="*/ 823748 h 1752393"/>
-                <a:gd name="connsiteX2" fmla="*/ 3817352 w 3817352"/>
-                <a:gd name="connsiteY2" fmla="*/ 1752393 h 1752393"/>
-                <a:gd name="connsiteX0" fmla="*/ 0 w 3817352"/>
-                <a:gd name="connsiteY0" fmla="*/ 0 h 1735724"/>
-                <a:gd name="connsiteX1" fmla="*/ 1951984 w 3817352"/>
-                <a:gd name="connsiteY1" fmla="*/ 823748 h 1735724"/>
-                <a:gd name="connsiteX2" fmla="*/ 3817352 w 3817352"/>
-                <a:gd name="connsiteY2" fmla="*/ 1735724 h 1735724"/>
-                <a:gd name="connsiteX0" fmla="*/ 0 w 3817352"/>
-                <a:gd name="connsiteY0" fmla="*/ 0 h 1735724"/>
-                <a:gd name="connsiteX1" fmla="*/ 1951984 w 3817352"/>
-                <a:gd name="connsiteY1" fmla="*/ 823748 h 1735724"/>
-                <a:gd name="connsiteX2" fmla="*/ 3817352 w 3817352"/>
-                <a:gd name="connsiteY2" fmla="*/ 1735724 h 1735724"/>
-                <a:gd name="connsiteX0" fmla="*/ 0 w 3793539"/>
-                <a:gd name="connsiteY0" fmla="*/ 0 h 1735724"/>
-                <a:gd name="connsiteX1" fmla="*/ 1951984 w 3793539"/>
-                <a:gd name="connsiteY1" fmla="*/ 823748 h 1735724"/>
-                <a:gd name="connsiteX2" fmla="*/ 3793539 w 3793539"/>
-                <a:gd name="connsiteY2" fmla="*/ 1735724 h 1735724"/>
-                <a:gd name="connsiteX0" fmla="*/ 0 w 3798301"/>
-                <a:gd name="connsiteY0" fmla="*/ 0 h 1728580"/>
-                <a:gd name="connsiteX1" fmla="*/ 1951984 w 3798301"/>
-                <a:gd name="connsiteY1" fmla="*/ 823748 h 1728580"/>
-                <a:gd name="connsiteX2" fmla="*/ 3798301 w 3798301"/>
-                <a:gd name="connsiteY2" fmla="*/ 1728580 h 1728580"/>
-                <a:gd name="connsiteX0" fmla="*/ 0 w 3798301"/>
-                <a:gd name="connsiteY0" fmla="*/ 0 h 1728580"/>
-                <a:gd name="connsiteX1" fmla="*/ 1951984 w 3798301"/>
-                <a:gd name="connsiteY1" fmla="*/ 823748 h 1728580"/>
-                <a:gd name="connsiteX2" fmla="*/ 3798301 w 3798301"/>
-                <a:gd name="connsiteY2" fmla="*/ 1728580 h 1728580"/>
-                <a:gd name="connsiteX0" fmla="*/ 0 w 3798301"/>
-                <a:gd name="connsiteY0" fmla="*/ 0 h 1728580"/>
-                <a:gd name="connsiteX1" fmla="*/ 1951984 w 3798301"/>
-                <a:gd name="connsiteY1" fmla="*/ 823748 h 1728580"/>
-                <a:gd name="connsiteX2" fmla="*/ 3798301 w 3798301"/>
-                <a:gd name="connsiteY2" fmla="*/ 1728580 h 1728580"/>
-                <a:gd name="connsiteX0" fmla="*/ 0 w 3781632"/>
-                <a:gd name="connsiteY0" fmla="*/ 0 h 1700005"/>
-                <a:gd name="connsiteX1" fmla="*/ 1951984 w 3781632"/>
-                <a:gd name="connsiteY1" fmla="*/ 823748 h 1700005"/>
-                <a:gd name="connsiteX2" fmla="*/ 3781632 w 3781632"/>
-                <a:gd name="connsiteY2" fmla="*/ 1700005 h 1700005"/>
-                <a:gd name="connsiteX0" fmla="*/ 0 w 3800682"/>
-                <a:gd name="connsiteY0" fmla="*/ 0 h 1711911"/>
-                <a:gd name="connsiteX1" fmla="*/ 1951984 w 3800682"/>
-                <a:gd name="connsiteY1" fmla="*/ 823748 h 1711911"/>
-                <a:gd name="connsiteX2" fmla="*/ 3800682 w 3800682"/>
-                <a:gd name="connsiteY2" fmla="*/ 1711911 h 1711911"/>
-                <a:gd name="connsiteX0" fmla="*/ 0 w 3743532"/>
-                <a:gd name="connsiteY0" fmla="*/ 0 h 1676193"/>
-                <a:gd name="connsiteX1" fmla="*/ 1951984 w 3743532"/>
-                <a:gd name="connsiteY1" fmla="*/ 823748 h 1676193"/>
-                <a:gd name="connsiteX2" fmla="*/ 3743532 w 3743532"/>
-                <a:gd name="connsiteY2" fmla="*/ 1676193 h 1676193"/>
-                <a:gd name="connsiteX0" fmla="*/ 0 w 3791157"/>
-                <a:gd name="connsiteY0" fmla="*/ 0 h 1702386"/>
-                <a:gd name="connsiteX1" fmla="*/ 1951984 w 3791157"/>
-                <a:gd name="connsiteY1" fmla="*/ 823748 h 1702386"/>
-                <a:gd name="connsiteX2" fmla="*/ 3791157 w 3791157"/>
-                <a:gd name="connsiteY2" fmla="*/ 1702386 h 1702386"/>
-                <a:gd name="connsiteX0" fmla="*/ 0 w 3776869"/>
-                <a:gd name="connsiteY0" fmla="*/ 0 h 1685717"/>
-                <a:gd name="connsiteX1" fmla="*/ 1951984 w 3776869"/>
-                <a:gd name="connsiteY1" fmla="*/ 823748 h 1685717"/>
-                <a:gd name="connsiteX2" fmla="*/ 3776869 w 3776869"/>
-                <a:gd name="connsiteY2" fmla="*/ 1685717 h 1685717"/>
-                <a:gd name="connsiteX0" fmla="*/ 0 w 3776869"/>
-                <a:gd name="connsiteY0" fmla="*/ 0 h 1685717"/>
-                <a:gd name="connsiteX1" fmla="*/ 1951984 w 3776869"/>
-                <a:gd name="connsiteY1" fmla="*/ 823748 h 1685717"/>
-                <a:gd name="connsiteX2" fmla="*/ 3776869 w 3776869"/>
-                <a:gd name="connsiteY2" fmla="*/ 1685717 h 1685717"/>
-                <a:gd name="connsiteX0" fmla="*/ 0 w 3776869"/>
-                <a:gd name="connsiteY0" fmla="*/ 0 h 1685717"/>
-                <a:gd name="connsiteX1" fmla="*/ 1951984 w 3776869"/>
-                <a:gd name="connsiteY1" fmla="*/ 823748 h 1685717"/>
-                <a:gd name="connsiteX2" fmla="*/ 3776869 w 3776869"/>
-                <a:gd name="connsiteY2" fmla="*/ 1685717 h 1685717"/>
-                <a:gd name="connsiteX0" fmla="*/ 0 w 3776869"/>
-                <a:gd name="connsiteY0" fmla="*/ 0 h 1685717"/>
-                <a:gd name="connsiteX1" fmla="*/ 1951984 w 3776869"/>
-                <a:gd name="connsiteY1" fmla="*/ 823748 h 1685717"/>
-                <a:gd name="connsiteX2" fmla="*/ 3776869 w 3776869"/>
-                <a:gd name="connsiteY2" fmla="*/ 1685717 h 1685717"/>
-                <a:gd name="connsiteX0" fmla="*/ 0 w 3767344"/>
-                <a:gd name="connsiteY0" fmla="*/ 0 h 1688098"/>
-                <a:gd name="connsiteX1" fmla="*/ 1951984 w 3767344"/>
-                <a:gd name="connsiteY1" fmla="*/ 823748 h 1688098"/>
-                <a:gd name="connsiteX2" fmla="*/ 3767344 w 3767344"/>
-                <a:gd name="connsiteY2" fmla="*/ 1688098 h 1688098"/>
-                <a:gd name="connsiteX0" fmla="*/ 0 w 3767344"/>
-                <a:gd name="connsiteY0" fmla="*/ 0 h 1688098"/>
-                <a:gd name="connsiteX1" fmla="*/ 1951984 w 3767344"/>
-                <a:gd name="connsiteY1" fmla="*/ 823748 h 1688098"/>
-                <a:gd name="connsiteX2" fmla="*/ 3767344 w 3767344"/>
-                <a:gd name="connsiteY2" fmla="*/ 1688098 h 1688098"/>
-                <a:gd name="connsiteX0" fmla="*/ 0 w 3791157"/>
-                <a:gd name="connsiteY0" fmla="*/ 0 h 1688098"/>
-                <a:gd name="connsiteX1" fmla="*/ 1975797 w 3791157"/>
-                <a:gd name="connsiteY1" fmla="*/ 823748 h 1688098"/>
-                <a:gd name="connsiteX2" fmla="*/ 3791157 w 3791157"/>
-                <a:gd name="connsiteY2" fmla="*/ 1688098 h 1688098"/>
-                <a:gd name="connsiteX0" fmla="*/ 0 w 3779251"/>
-                <a:gd name="connsiteY0" fmla="*/ 0 h 1688098"/>
-                <a:gd name="connsiteX1" fmla="*/ 1963891 w 3779251"/>
-                <a:gd name="connsiteY1" fmla="*/ 823748 h 1688098"/>
-                <a:gd name="connsiteX2" fmla="*/ 3779251 w 3779251"/>
-                <a:gd name="connsiteY2" fmla="*/ 1688098 h 1688098"/>
-                <a:gd name="connsiteX0" fmla="*/ 0 w 3788776"/>
-                <a:gd name="connsiteY0" fmla="*/ 0 h 1700004"/>
-                <a:gd name="connsiteX1" fmla="*/ 1973416 w 3788776"/>
-                <a:gd name="connsiteY1" fmla="*/ 835654 h 1700004"/>
-                <a:gd name="connsiteX2" fmla="*/ 3788776 w 3788776"/>
-                <a:gd name="connsiteY2" fmla="*/ 1700004 h 1700004"/>
-                <a:gd name="connsiteX0" fmla="*/ 0 w 3800683"/>
-                <a:gd name="connsiteY0" fmla="*/ 0 h 1700004"/>
-                <a:gd name="connsiteX1" fmla="*/ 1985323 w 3800683"/>
-                <a:gd name="connsiteY1" fmla="*/ 835654 h 1700004"/>
-                <a:gd name="connsiteX2" fmla="*/ 3800683 w 3800683"/>
-                <a:gd name="connsiteY2" fmla="*/ 1700004 h 1700004"/>
-                <a:gd name="connsiteX0" fmla="*/ 0 w 3800683"/>
-                <a:gd name="connsiteY0" fmla="*/ 0 h 1700004"/>
-                <a:gd name="connsiteX1" fmla="*/ 1985323 w 3800683"/>
-                <a:gd name="connsiteY1" fmla="*/ 835654 h 1700004"/>
-                <a:gd name="connsiteX2" fmla="*/ 3800683 w 3800683"/>
-                <a:gd name="connsiteY2" fmla="*/ 1700004 h 1700004"/>
-                <a:gd name="connsiteX0" fmla="*/ 0 w 3791158"/>
-                <a:gd name="connsiteY0" fmla="*/ 0 h 1697623"/>
-                <a:gd name="connsiteX1" fmla="*/ 1975798 w 3791158"/>
-                <a:gd name="connsiteY1" fmla="*/ 833273 h 1697623"/>
-                <a:gd name="connsiteX2" fmla="*/ 3791158 w 3791158"/>
-                <a:gd name="connsiteY2" fmla="*/ 1697623 h 1697623"/>
-                <a:gd name="connsiteX0" fmla="*/ 0 w 2943433"/>
-                <a:gd name="connsiteY0" fmla="*/ 0 h 1154698"/>
-                <a:gd name="connsiteX1" fmla="*/ 1975798 w 2943433"/>
-                <a:gd name="connsiteY1" fmla="*/ 833273 h 1154698"/>
-                <a:gd name="connsiteX2" fmla="*/ 2943433 w 2943433"/>
-                <a:gd name="connsiteY2" fmla="*/ 1154698 h 1154698"/>
-                <a:gd name="connsiteX0" fmla="*/ 0 w 2943433"/>
-                <a:gd name="connsiteY0" fmla="*/ 0 h 1154698"/>
-                <a:gd name="connsiteX1" fmla="*/ 2943433 w 2943433"/>
-                <a:gd name="connsiteY1" fmla="*/ 1154698 h 1154698"/>
-                <a:gd name="connsiteX0" fmla="*/ 0 w 3172033"/>
-                <a:gd name="connsiteY0" fmla="*/ 0 h 1154698"/>
-                <a:gd name="connsiteX1" fmla="*/ 3172033 w 3172033"/>
-                <a:gd name="connsiteY1" fmla="*/ 1154698 h 1154698"/>
-                <a:gd name="connsiteX0" fmla="*/ 0 w 3423493"/>
-                <a:gd name="connsiteY0" fmla="*/ 0 h 1253758"/>
-                <a:gd name="connsiteX1" fmla="*/ 3423493 w 3423493"/>
-                <a:gd name="connsiteY1" fmla="*/ 1253758 h 1253758"/>
-                <a:gd name="connsiteX0" fmla="*/ 0 w 5724733"/>
-                <a:gd name="connsiteY0" fmla="*/ 0 h 2046238"/>
-                <a:gd name="connsiteX1" fmla="*/ 5724733 w 5724733"/>
-                <a:gd name="connsiteY1" fmla="*/ 2046238 h 2046238"/>
-                <a:gd name="connsiteX0" fmla="*/ 0 w 5778073"/>
-                <a:gd name="connsiteY0" fmla="*/ 0 h 1985278"/>
-                <a:gd name="connsiteX1" fmla="*/ 5778073 w 5778073"/>
-                <a:gd name="connsiteY1" fmla="*/ 1985278 h 1985278"/>
-                <a:gd name="connsiteX0" fmla="*/ 1102787 w 1102787"/>
-                <a:gd name="connsiteY0" fmla="*/ 0 h 1009918"/>
-                <a:gd name="connsiteX1" fmla="*/ 0 w 1102787"/>
-                <a:gd name="connsiteY1" fmla="*/ 1009918 h 1009918"/>
-                <a:gd name="connsiteX0" fmla="*/ 363647 w 363647"/>
-                <a:gd name="connsiteY0" fmla="*/ 186422 h 186422"/>
-                <a:gd name="connsiteX1" fmla="*/ 0 w 363647"/>
-                <a:gd name="connsiteY1" fmla="*/ 0 h 186422"/>
-                <a:gd name="connsiteX0" fmla="*/ 363647 w 363647"/>
-                <a:gd name="connsiteY0" fmla="*/ 155942 h 155942"/>
-                <a:gd name="connsiteX1" fmla="*/ 0 w 363647"/>
-                <a:gd name="connsiteY1" fmla="*/ 0 h 155942"/>
-                <a:gd name="connsiteX0" fmla="*/ 361266 w 361266"/>
-                <a:gd name="connsiteY0" fmla="*/ 165467 h 165467"/>
-                <a:gd name="connsiteX1" fmla="*/ 0 w 361266"/>
-                <a:gd name="connsiteY1" fmla="*/ 0 h 165467"/>
-              </a:gdLst>
-              <a:ahLst/>
-              <a:cxnLst>
-                <a:cxn ang="0">
-                  <a:pos x="connsiteX0" y="connsiteY0"/>
-                </a:cxn>
-                <a:cxn ang="0">
-                  <a:pos x="connsiteX1" y="connsiteY1"/>
-                </a:cxn>
-              </a:cxnLst>
-              <a:rect l="l" t="t" r="r" b="b"/>
-              <a:pathLst>
-                <a:path w="361266" h="165467">
-                  <a:moveTo>
-                    <a:pt x="361266" y="165467"/>
-                  </a:moveTo>
-                  <a:lnTo>
-                    <a:pt x="0" y="0"/>
-                  </a:lnTo>
-                </a:path>
-              </a:pathLst>
-            </a:custGeom>
-            <a:noFill/>
-            <a:ln w="12700" cap="rnd">
-              <a:solidFill>
-                <a:srgbClr val="F2F2F2"/>
-              </a:solidFill>
-              <a:headEnd type="oval" w="sm" len="sm"/>
-              <a:tailEnd type="none" w="med" len="med"/>
-            </a:ln>
-          </p:spPr>
-          <p:style>
-            <a:lnRef idx="2">
-              <a:schemeClr val="accent1">
-                <a:shade val="50000"/>
-              </a:schemeClr>
-            </a:lnRef>
-            <a:fillRef idx="1">
-              <a:schemeClr val="accent1"/>
-            </a:fillRef>
-            <a:effectRef idx="0">
-              <a:schemeClr val="accent1"/>
-            </a:effectRef>
-            <a:fontRef idx="minor">
-              <a:schemeClr val="lt1"/>
-            </a:fontRef>
-          </p:style>
-          <p:txBody>
-            <a:bodyPr rtlCol="0" anchor="ctr"/>
-            <a:lstStyle/>
-            <a:p>
-              <a:pPr algn="ctr"/>
-              <a:endParaRPr lang="nl-NL"/>
-            </a:p>
-          </p:txBody>
-        </p:sp>
-      </p:grpSp>
-      <p:sp>
-        <p:nvSpPr>
-          <p:cNvPr id="13" name="Tekstvak 12">
-            <a:extLst>
-              <a:ext uri="{FF2B5EF4-FFF2-40B4-BE49-F238E27FC236}">
-                <a16:creationId xmlns:a16="http://schemas.microsoft.com/office/drawing/2014/main" id="{E20AFFF8-810A-429C-9DCB-9290C3A5F8C9}"/>
-              </a:ext>
-            </a:extLst>
-          </p:cNvPr>
-          <p:cNvSpPr txBox="1"/>
-          <p:nvPr/>
-        </p:nvSpPr>
-        <p:spPr>
-          <a:xfrm>
-            <a:off x="609600" y="7019925"/>
-            <a:ext cx="3076575" cy="861774"/>
-          </a:xfrm>
-          <a:prstGeom prst="rect">
-            <a:avLst/>
-          </a:prstGeom>
-          <a:noFill/>
-        </p:spPr>
-        <p:txBody>
-          <a:bodyPr wrap="square" rtlCol="0">
-            <a:spAutoFit/>
-          </a:bodyPr>
-          <a:lstStyle/>
-          <a:p>
-            <a:r>
-              <a:rPr lang="nl-NL" sz="1600" dirty="0">
-                <a:latin typeface="Arial" panose="020B0604020202020204" pitchFamily="34" charset="0"/>
-                <a:cs typeface="Arial" panose="020B0604020202020204" pitchFamily="34" charset="0"/>
-              </a:rPr>
-              <a:t>1 cm = 0.255 km</a:t>
-            </a:r>
-          </a:p>
-          <a:p>
-            <a:r>
-              <a:rPr lang="nl-NL" sz="1600" dirty="0">
-                <a:latin typeface="Arial" panose="020B0604020202020204" pitchFamily="34" charset="0"/>
-                <a:cs typeface="Arial" panose="020B0604020202020204" pitchFamily="34" charset="0"/>
-              </a:rPr>
-              <a:t>3.914 cm = 1 km</a:t>
-            </a:r>
-          </a:p>
-          <a:p>
-            <a:r>
-              <a:rPr lang="nl-NL" sz="1600" dirty="0">
-                <a:latin typeface="Arial" panose="020B0604020202020204" pitchFamily="34" charset="0"/>
-                <a:cs typeface="Arial" panose="020B0604020202020204" pitchFamily="34" charset="0"/>
-              </a:rPr>
-              <a:t>Schepen 2x vergroot</a:t>
-            </a:r>
-          </a:p>
-        </p:txBody>
-      </p:sp>
-      <p:sp>
-        <p:nvSpPr>
-          <p:cNvPr id="21" name="Tekstvak 20">
-            <a:extLst>
-              <a:ext uri="{FF2B5EF4-FFF2-40B4-BE49-F238E27FC236}">
-                <a16:creationId xmlns:a16="http://schemas.microsoft.com/office/drawing/2014/main" id="{67B53F03-9BE6-497C-90EE-965CDE58A0AB}"/>
-              </a:ext>
-            </a:extLst>
-          </p:cNvPr>
-          <p:cNvSpPr txBox="1"/>
-          <p:nvPr/>
-        </p:nvSpPr>
-        <p:spPr>
-          <a:xfrm rot="1793371">
-            <a:off x="8327663" y="3222160"/>
-            <a:ext cx="1582310" cy="230832"/>
-          </a:xfrm>
-          <a:prstGeom prst="rect">
-            <a:avLst/>
-          </a:prstGeom>
-          <a:noFill/>
-        </p:spPr>
-        <p:txBody>
-          <a:bodyPr wrap="square" rtlCol="0">
-            <a:spAutoFit/>
-          </a:bodyPr>
-          <a:lstStyle/>
-          <a:p>
-            <a:r>
-              <a:rPr lang="nl-NL" sz="900" i="1" dirty="0">
-                <a:solidFill>
-                  <a:schemeClr val="bg1">
-                    <a:lumMod val="50000"/>
-                  </a:schemeClr>
-                </a:solidFill>
-                <a:latin typeface="Arial" panose="020B0604020202020204" pitchFamily="34" charset="0"/>
-                <a:cs typeface="Arial" panose="020B0604020202020204" pitchFamily="34" charset="0"/>
-              </a:rPr>
-              <a:t>Berghaven</a:t>
-            </a:r>
-          </a:p>
-        </p:txBody>
-      </p:sp>
-      <p:sp>
-        <p:nvSpPr>
-          <p:cNvPr id="41" name="Tekstvak 40">
-            <a:extLst>
-              <a:ext uri="{FF2B5EF4-FFF2-40B4-BE49-F238E27FC236}">
-                <a16:creationId xmlns:a16="http://schemas.microsoft.com/office/drawing/2014/main" id="{22E9C66B-5E3D-4D87-BA72-086152C6717A}"/>
-              </a:ext>
-            </a:extLst>
-          </p:cNvPr>
-          <p:cNvSpPr txBox="1"/>
-          <p:nvPr/>
-        </p:nvSpPr>
-        <p:spPr>
-          <a:xfrm>
-            <a:off x="8205746" y="174625"/>
-            <a:ext cx="1382753" cy="400110"/>
-          </a:xfrm>
-          <a:prstGeom prst="rect">
-            <a:avLst/>
-          </a:prstGeom>
-          <a:noFill/>
-          <a:ln>
-            <a:solidFill>
-              <a:schemeClr val="tx1">
-                <a:lumMod val="95000"/>
-                <a:lumOff val="5000"/>
-              </a:schemeClr>
-            </a:solidFill>
-          </a:ln>
-        </p:spPr>
-        <p:txBody>
-          <a:bodyPr wrap="square" rtlCol="0">
-            <a:spAutoFit/>
-          </a:bodyPr>
-          <a:lstStyle/>
-          <a:p>
-            <a:pPr algn="ctr"/>
-            <a:r>
-              <a:rPr lang="nl-NL" sz="2000" dirty="0">
-                <a:latin typeface="Arial" panose="020B0604020202020204" pitchFamily="34" charset="0"/>
-                <a:cs typeface="Arial" panose="020B0604020202020204" pitchFamily="34" charset="0"/>
-              </a:rPr>
-              <a:t>Maasgeul</a:t>
-            </a:r>
-          </a:p>
-        </p:txBody>
-      </p:sp>
-      <p:grpSp>
-        <p:nvGrpSpPr>
-          <p:cNvPr id="51" name="Groep 50">
-            <a:extLst>
-              <a:ext uri="{FF2B5EF4-FFF2-40B4-BE49-F238E27FC236}">
-                <a16:creationId xmlns:a16="http://schemas.microsoft.com/office/drawing/2014/main" id="{DE62420E-18B0-4E67-9D6D-655915A32BB8}"/>
-              </a:ext>
-            </a:extLst>
-          </p:cNvPr>
-          <p:cNvGrpSpPr/>
-          <p:nvPr/>
-        </p:nvGrpSpPr>
-        <p:grpSpPr>
-          <a:xfrm>
-            <a:off x="811848" y="6470174"/>
-            <a:ext cx="1407853" cy="54000"/>
-            <a:chOff x="811848" y="6625749"/>
-            <a:chExt cx="1407853" cy="54000"/>
-          </a:xfrm>
-        </p:grpSpPr>
-        <p:grpSp>
-          <p:nvGrpSpPr>
-            <p:cNvPr id="46" name="Groep 45">
-              <a:extLst>
-                <a:ext uri="{FF2B5EF4-FFF2-40B4-BE49-F238E27FC236}">
-                  <a16:creationId xmlns:a16="http://schemas.microsoft.com/office/drawing/2014/main" id="{42644175-AA89-43B4-82FC-C9FA599FDEA1}"/>
-                </a:ext>
-              </a:extLst>
-            </p:cNvPr>
-            <p:cNvGrpSpPr/>
-            <p:nvPr/>
-          </p:nvGrpSpPr>
-          <p:grpSpPr>
-            <a:xfrm>
-              <a:off x="811848" y="6625749"/>
-              <a:ext cx="706813" cy="54000"/>
-              <a:chOff x="1390968" y="6275229"/>
-              <a:chExt cx="1413625" cy="54000"/>
-            </a:xfrm>
-          </p:grpSpPr>
-          <p:sp>
-            <p:nvSpPr>
-              <p:cNvPr id="44" name="Rechthoek 43">
-                <a:extLst>
-                  <a:ext uri="{FF2B5EF4-FFF2-40B4-BE49-F238E27FC236}">
-                    <a16:creationId xmlns:a16="http://schemas.microsoft.com/office/drawing/2014/main" id="{45902CA9-E4E5-43CD-ACCE-76371350F831}"/>
-                  </a:ext>
-                </a:extLst>
-              </p:cNvPr>
-              <p:cNvSpPr/>
-              <p:nvPr/>
-            </p:nvSpPr>
-            <p:spPr>
-              <a:xfrm>
-                <a:off x="1390968" y="6275229"/>
-                <a:ext cx="705600" cy="54000"/>
-              </a:xfrm>
-              <a:prstGeom prst="rect">
-                <a:avLst/>
-              </a:prstGeom>
-              <a:solidFill>
-                <a:schemeClr val="bg1"/>
-              </a:solidFill>
-              <a:ln w="6350">
-                <a:solidFill>
-                  <a:schemeClr val="tx1"/>
-                </a:solidFill>
-              </a:ln>
-            </p:spPr>
-            <p:style>
-              <a:lnRef idx="2">
-                <a:schemeClr val="accent1">
-                  <a:shade val="50000"/>
-                </a:schemeClr>
-              </a:lnRef>
-              <a:fillRef idx="1">
-                <a:schemeClr val="accent1"/>
-              </a:fillRef>
-              <a:effectRef idx="0">
-                <a:schemeClr val="accent1"/>
-              </a:effectRef>
-              <a:fontRef idx="minor">
-                <a:schemeClr val="lt1"/>
-              </a:fontRef>
-            </p:style>
-            <p:txBody>
-              <a:bodyPr rtlCol="0" anchor="ctr"/>
-              <a:lstStyle/>
-              <a:p>
-                <a:pPr algn="ctr"/>
-                <a:endParaRPr lang="nl-NL"/>
-              </a:p>
-            </p:txBody>
-          </p:sp>
-          <p:sp>
-            <p:nvSpPr>
-              <p:cNvPr id="45" name="Rechthoek 44">
-                <a:extLst>
-                  <a:ext uri="{FF2B5EF4-FFF2-40B4-BE49-F238E27FC236}">
-                    <a16:creationId xmlns:a16="http://schemas.microsoft.com/office/drawing/2014/main" id="{66EAB369-DD96-414D-B20E-CD378B79567E}"/>
-                  </a:ext>
-                </a:extLst>
-              </p:cNvPr>
-              <p:cNvSpPr/>
-              <p:nvPr/>
-            </p:nvSpPr>
-            <p:spPr>
-              <a:xfrm>
-                <a:off x="2098993" y="6275229"/>
-                <a:ext cx="705600" cy="54000"/>
-              </a:xfrm>
-              <a:prstGeom prst="rect">
-                <a:avLst/>
-              </a:prstGeom>
-              <a:solidFill>
-                <a:schemeClr val="tx1"/>
-              </a:solidFill>
-              <a:ln w="6350">
-                <a:solidFill>
-                  <a:schemeClr val="tx1"/>
-                </a:solidFill>
-              </a:ln>
-            </p:spPr>
-            <p:style>
-              <a:lnRef idx="2">
-                <a:schemeClr val="accent1">
-                  <a:shade val="50000"/>
-                </a:schemeClr>
-              </a:lnRef>
-              <a:fillRef idx="1">
-                <a:schemeClr val="accent1"/>
-              </a:fillRef>
-              <a:effectRef idx="0">
-                <a:schemeClr val="accent1"/>
-              </a:effectRef>
-              <a:fontRef idx="minor">
-                <a:schemeClr val="lt1"/>
-              </a:fontRef>
-            </p:style>
-            <p:txBody>
-              <a:bodyPr rtlCol="0" anchor="ctr"/>
-              <a:lstStyle/>
-              <a:p>
-                <a:pPr algn="ctr"/>
-                <a:endParaRPr lang="nl-NL"/>
-              </a:p>
-            </p:txBody>
-          </p:sp>
-        </p:grpSp>
-        <p:grpSp>
-          <p:nvGrpSpPr>
-            <p:cNvPr id="47" name="Groep 46">
-              <a:extLst>
-                <a:ext uri="{FF2B5EF4-FFF2-40B4-BE49-F238E27FC236}">
-                  <a16:creationId xmlns:a16="http://schemas.microsoft.com/office/drawing/2014/main" id="{488F433E-64AE-458F-9972-EE9755E1E6D8}"/>
-                </a:ext>
-              </a:extLst>
-            </p:cNvPr>
-            <p:cNvGrpSpPr/>
-            <p:nvPr/>
-          </p:nvGrpSpPr>
-          <p:grpSpPr>
-            <a:xfrm>
-              <a:off x="1512888" y="6625749"/>
-              <a:ext cx="706813" cy="54000"/>
-              <a:chOff x="1390968" y="6275229"/>
-              <a:chExt cx="1413625" cy="54000"/>
-            </a:xfrm>
-          </p:grpSpPr>
-          <p:sp>
-            <p:nvSpPr>
-              <p:cNvPr id="48" name="Rechthoek 47">
-                <a:extLst>
-                  <a:ext uri="{FF2B5EF4-FFF2-40B4-BE49-F238E27FC236}">
-                    <a16:creationId xmlns:a16="http://schemas.microsoft.com/office/drawing/2014/main" id="{4C7CA002-172D-4727-847C-E0BAA0D27776}"/>
-                  </a:ext>
-                </a:extLst>
-              </p:cNvPr>
-              <p:cNvSpPr/>
-              <p:nvPr/>
-            </p:nvSpPr>
-            <p:spPr>
-              <a:xfrm>
-                <a:off x="1390968" y="6275229"/>
-                <a:ext cx="705600" cy="54000"/>
-              </a:xfrm>
-              <a:prstGeom prst="rect">
-                <a:avLst/>
-              </a:prstGeom>
-              <a:solidFill>
-                <a:schemeClr val="bg1"/>
-              </a:solidFill>
-              <a:ln w="6350">
-                <a:solidFill>
-                  <a:schemeClr val="tx1"/>
-                </a:solidFill>
-              </a:ln>
-            </p:spPr>
-            <p:style>
-              <a:lnRef idx="2">
-                <a:schemeClr val="accent1">
-                  <a:shade val="50000"/>
-                </a:schemeClr>
-              </a:lnRef>
-              <a:fillRef idx="1">
-                <a:schemeClr val="accent1"/>
-              </a:fillRef>
-              <a:effectRef idx="0">
-                <a:schemeClr val="accent1"/>
-              </a:effectRef>
-              <a:fontRef idx="minor">
-                <a:schemeClr val="lt1"/>
-              </a:fontRef>
-            </p:style>
-            <p:txBody>
-              <a:bodyPr rtlCol="0" anchor="ctr"/>
-              <a:lstStyle/>
-              <a:p>
-                <a:pPr algn="ctr"/>
-                <a:endParaRPr lang="nl-NL"/>
-              </a:p>
-            </p:txBody>
-          </p:sp>
-          <p:sp>
-            <p:nvSpPr>
-              <p:cNvPr id="49" name="Rechthoek 48">
-                <a:extLst>
-                  <a:ext uri="{FF2B5EF4-FFF2-40B4-BE49-F238E27FC236}">
-                    <a16:creationId xmlns:a16="http://schemas.microsoft.com/office/drawing/2014/main" id="{EBCBA058-353E-454D-BE47-FDA4FAC45C91}"/>
-                  </a:ext>
-                </a:extLst>
-              </p:cNvPr>
-              <p:cNvSpPr/>
-              <p:nvPr/>
-            </p:nvSpPr>
-            <p:spPr>
-              <a:xfrm>
-                <a:off x="2098993" y="6275229"/>
-                <a:ext cx="705600" cy="54000"/>
-              </a:xfrm>
-              <a:prstGeom prst="rect">
-                <a:avLst/>
-              </a:prstGeom>
-              <a:solidFill>
-                <a:schemeClr val="tx1"/>
-              </a:solidFill>
-              <a:ln w="6350">
-                <a:solidFill>
-                  <a:schemeClr val="tx1"/>
-                </a:solidFill>
-              </a:ln>
-            </p:spPr>
-            <p:style>
-              <a:lnRef idx="2">
-                <a:schemeClr val="accent1">
-                  <a:shade val="50000"/>
-                </a:schemeClr>
-              </a:lnRef>
-              <a:fillRef idx="1">
-                <a:schemeClr val="accent1"/>
-              </a:fillRef>
-              <a:effectRef idx="0">
-                <a:schemeClr val="accent1"/>
-              </a:effectRef>
-              <a:fontRef idx="minor">
-                <a:schemeClr val="lt1"/>
-              </a:fontRef>
-            </p:style>
-            <p:txBody>
-              <a:bodyPr rtlCol="0" anchor="ctr"/>
-              <a:lstStyle/>
-              <a:p>
-                <a:pPr algn="ctr"/>
-                <a:endParaRPr lang="nl-NL"/>
-              </a:p>
-            </p:txBody>
-          </p:sp>
-        </p:grpSp>
-      </p:grpSp>
-      <p:sp>
-        <p:nvSpPr>
-          <p:cNvPr id="50" name="Tekstvak 49">
-            <a:extLst>
-              <a:ext uri="{FF2B5EF4-FFF2-40B4-BE49-F238E27FC236}">
-                <a16:creationId xmlns:a16="http://schemas.microsoft.com/office/drawing/2014/main" id="{A1660F5A-1BDD-443C-8F3E-259916D86A56}"/>
-              </a:ext>
-            </a:extLst>
-          </p:cNvPr>
-          <p:cNvSpPr txBox="1"/>
-          <p:nvPr/>
-        </p:nvSpPr>
-        <p:spPr>
-          <a:xfrm>
-            <a:off x="1255865" y="6250968"/>
-            <a:ext cx="1884459" cy="253916"/>
-          </a:xfrm>
-          <a:prstGeom prst="rect">
-            <a:avLst/>
-          </a:prstGeom>
-          <a:noFill/>
-        </p:spPr>
-        <p:txBody>
-          <a:bodyPr wrap="square" rtlCol="0">
-            <a:spAutoFit/>
-          </a:bodyPr>
-          <a:lstStyle/>
-          <a:p>
-            <a:r>
-              <a:rPr lang="nl-NL" sz="1050" dirty="0">
-                <a:latin typeface="Arial" panose="020B0604020202020204" pitchFamily="34" charset="0"/>
-                <a:cs typeface="Arial" panose="020B0604020202020204" pitchFamily="34" charset="0"/>
-              </a:rPr>
-              <a:t>1 km</a:t>
-            </a:r>
-          </a:p>
-        </p:txBody>
-      </p:sp>
     </p:spTree>
     <p:extLst>
       <p:ext uri="{BB962C8B-B14F-4D97-AF65-F5344CB8AC3E}">
-        <p14:creationId xmlns:p14="http://schemas.microsoft.com/office/powerpoint/2010/main" val="4240618134"/>
+        <p14:creationId xmlns:p14="http://schemas.microsoft.com/office/powerpoint/2010/main" val="1797571510"/>
       </p:ext>
     </p:extLst>
   </p:cSld>
@@ -11615,6 +10079,78 @@
           <a:chExt cx="0" cy="0"/>
         </a:xfrm>
       </p:grpSpPr>
+      <p:pic>
+        <p:nvPicPr>
+          <p:cNvPr id="3" name="Afbeelding 2">
+            <a:extLst>
+              <a:ext uri="{FF2B5EF4-FFF2-40B4-BE49-F238E27FC236}">
+                <a16:creationId xmlns:a16="http://schemas.microsoft.com/office/drawing/2014/main" id="{EEC094FF-A078-40AC-8E8E-9EB7FC68D13A}"/>
+              </a:ext>
+            </a:extLst>
+          </p:cNvPr>
+          <p:cNvPicPr>
+            <a:picLocks noChangeAspect="1"/>
+          </p:cNvPicPr>
+          <p:nvPr/>
+        </p:nvPicPr>
+        <p:blipFill>
+          <a:blip r:embed="rId2">
+            <a:extLst>
+              <a:ext uri="{28A0092B-C50C-407E-A947-70E740481C1C}">
+                <a14:useLocalDpi xmlns:a14="http://schemas.microsoft.com/office/drawing/2010/main" val="0"/>
+              </a:ext>
+            </a:extLst>
+          </a:blip>
+          <a:stretch>
+            <a:fillRect/>
+          </a:stretch>
+        </p:blipFill>
+        <p:spPr>
+          <a:xfrm>
+            <a:off x="0" y="0"/>
+            <a:ext cx="9906000" cy="6558505"/>
+          </a:xfrm>
+          <a:prstGeom prst="rect">
+            <a:avLst/>
+          </a:prstGeom>
+        </p:spPr>
+      </p:pic>
+      <p:pic>
+        <p:nvPicPr>
+          <p:cNvPr id="2" name="Afbeelding 1">
+            <a:extLst>
+              <a:ext uri="{FF2B5EF4-FFF2-40B4-BE49-F238E27FC236}">
+                <a16:creationId xmlns:a16="http://schemas.microsoft.com/office/drawing/2014/main" id="{08AAAB5C-734C-43C8-A342-5AE3EDCE6514}"/>
+              </a:ext>
+            </a:extLst>
+          </p:cNvPr>
+          <p:cNvPicPr>
+            <a:picLocks noChangeAspect="1"/>
+          </p:cNvPicPr>
+          <p:nvPr/>
+        </p:nvPicPr>
+        <p:blipFill>
+          <a:blip r:embed="rId3">
+            <a:extLst>
+              <a:ext uri="{28A0092B-C50C-407E-A947-70E740481C1C}">
+                <a14:useLocalDpi xmlns:a14="http://schemas.microsoft.com/office/drawing/2010/main" val="0"/>
+              </a:ext>
+            </a:extLst>
+          </a:blip>
+          <a:stretch>
+            <a:fillRect/>
+          </a:stretch>
+        </p:blipFill>
+        <p:spPr>
+          <a:xfrm>
+            <a:off x="0" y="0"/>
+            <a:ext cx="9906000" cy="6501499"/>
+          </a:xfrm>
+          <a:prstGeom prst="rect">
+            <a:avLst/>
+          </a:prstGeom>
+        </p:spPr>
+      </p:pic>
     </p:spTree>
     <p:extLst>
       <p:ext uri="{BB962C8B-B14F-4D97-AF65-F5344CB8AC3E}">
@@ -12786,65 +11322,6 @@
       </p:grpSp>
       <p:sp>
         <p:nvSpPr>
-          <p:cNvPr id="5" name="Pijl: vijfhoek 4">
-            <a:extLst>
-              <a:ext uri="{FF2B5EF4-FFF2-40B4-BE49-F238E27FC236}">
-                <a16:creationId xmlns:a16="http://schemas.microsoft.com/office/drawing/2014/main" id="{B9BAA35E-7E2C-4F7A-A156-4417A236DF1B}"/>
-              </a:ext>
-            </a:extLst>
-          </p:cNvPr>
-          <p:cNvSpPr/>
-          <p:nvPr/>
-        </p:nvSpPr>
-        <p:spPr>
-          <a:xfrm rot="19498422">
-            <a:off x="4404497" y="5416485"/>
-            <a:ext cx="698400" cy="136800"/>
-          </a:xfrm>
-          <a:prstGeom prst="homePlate">
-            <a:avLst/>
-          </a:prstGeom>
-          <a:solidFill>
-            <a:srgbClr val="CC0000"/>
-          </a:solidFill>
-          <a:ln>
-            <a:solidFill>
-              <a:schemeClr val="accent6">
-                <a:lumMod val="75000"/>
-              </a:schemeClr>
-            </a:solidFill>
-          </a:ln>
-        </p:spPr>
-        <p:style>
-          <a:lnRef idx="2">
-            <a:schemeClr val="accent2">
-              <a:shade val="50000"/>
-            </a:schemeClr>
-          </a:lnRef>
-          <a:fillRef idx="1">
-            <a:schemeClr val="accent2"/>
-          </a:fillRef>
-          <a:effectRef idx="0">
-            <a:schemeClr val="accent2"/>
-          </a:effectRef>
-          <a:fontRef idx="minor">
-            <a:schemeClr val="lt1"/>
-          </a:fontRef>
-        </p:style>
-        <p:txBody>
-          <a:bodyPr rtlCol="0" anchor="ctr"/>
-          <a:lstStyle/>
-          <a:p>
-            <a:pPr algn="ctr"/>
-            <a:endParaRPr lang="nl-NL" sz="1600">
-              <a:latin typeface="Arial" panose="020B0604020202020204" pitchFamily="34" charset="0"/>
-              <a:cs typeface="Arial" panose="020B0604020202020204" pitchFamily="34" charset="0"/>
-            </a:endParaRPr>
-          </a:p>
-        </p:txBody>
-      </p:sp>
-      <p:sp>
-        <p:nvSpPr>
           <p:cNvPr id="13" name="Tekstvak 12">
             <a:extLst>
               <a:ext uri="{FF2B5EF4-FFF2-40B4-BE49-F238E27FC236}">
@@ -12896,335 +11373,6 @@
               </a:rPr>
               <a:t>Schepen 2x vergroot</a:t>
             </a:r>
-          </a:p>
-        </p:txBody>
-      </p:sp>
-      <p:sp>
-        <p:nvSpPr>
-          <p:cNvPr id="14" name="Pijl: vijfhoek 13">
-            <a:extLst>
-              <a:ext uri="{FF2B5EF4-FFF2-40B4-BE49-F238E27FC236}">
-                <a16:creationId xmlns:a16="http://schemas.microsoft.com/office/drawing/2014/main" id="{C6978AA4-8ED2-4685-8C27-A80813728B63}"/>
-              </a:ext>
-            </a:extLst>
-          </p:cNvPr>
-          <p:cNvSpPr>
-            <a:spLocks/>
-          </p:cNvSpPr>
-          <p:nvPr/>
-        </p:nvSpPr>
-        <p:spPr>
-          <a:xfrm rot="1296606">
-            <a:off x="1502621" y="1721131"/>
-            <a:ext cx="403200" cy="64800"/>
-          </a:xfrm>
-          <a:prstGeom prst="homePlate">
-            <a:avLst/>
-          </a:prstGeom>
-          <a:solidFill>
-            <a:schemeClr val="accent2">
-              <a:lumMod val="75000"/>
-            </a:schemeClr>
-          </a:solidFill>
-          <a:ln w="6350">
-            <a:solidFill>
-              <a:schemeClr val="accent5">
-                <a:lumMod val="75000"/>
-              </a:schemeClr>
-            </a:solidFill>
-          </a:ln>
-        </p:spPr>
-        <p:style>
-          <a:lnRef idx="2">
-            <a:schemeClr val="accent2">
-              <a:shade val="50000"/>
-            </a:schemeClr>
-          </a:lnRef>
-          <a:fillRef idx="1">
-            <a:schemeClr val="accent2"/>
-          </a:fillRef>
-          <a:effectRef idx="0">
-            <a:schemeClr val="accent2"/>
-          </a:effectRef>
-          <a:fontRef idx="minor">
-            <a:schemeClr val="lt1"/>
-          </a:fontRef>
-        </p:style>
-        <p:txBody>
-          <a:bodyPr rtlCol="0" anchor="ctr"/>
-          <a:lstStyle/>
-          <a:p>
-            <a:pPr algn="ctr"/>
-            <a:endParaRPr lang="nl-NL" sz="1600">
-              <a:latin typeface="Arial" panose="020B0604020202020204" pitchFamily="34" charset="0"/>
-              <a:cs typeface="Arial" panose="020B0604020202020204" pitchFamily="34" charset="0"/>
-            </a:endParaRPr>
-          </a:p>
-        </p:txBody>
-      </p:sp>
-      <p:sp>
-        <p:nvSpPr>
-          <p:cNvPr id="15" name="Pijl: vijfhoek 14">
-            <a:extLst>
-              <a:ext uri="{FF2B5EF4-FFF2-40B4-BE49-F238E27FC236}">
-                <a16:creationId xmlns:a16="http://schemas.microsoft.com/office/drawing/2014/main" id="{25E612E3-412B-43ED-84C9-684E1A818950}"/>
-              </a:ext>
-            </a:extLst>
-          </p:cNvPr>
-          <p:cNvSpPr/>
-          <p:nvPr/>
-        </p:nvSpPr>
-        <p:spPr>
-          <a:xfrm rot="12205911">
-            <a:off x="8199762" y="3593008"/>
-            <a:ext cx="403200" cy="64800"/>
-          </a:xfrm>
-          <a:prstGeom prst="homePlate">
-            <a:avLst/>
-          </a:prstGeom>
-          <a:solidFill>
-            <a:srgbClr val="00B0F0"/>
-          </a:solidFill>
-          <a:ln w="6350">
-            <a:solidFill>
-              <a:schemeClr val="accent5">
-                <a:lumMod val="75000"/>
-              </a:schemeClr>
-            </a:solidFill>
-          </a:ln>
-        </p:spPr>
-        <p:style>
-          <a:lnRef idx="2">
-            <a:schemeClr val="accent2">
-              <a:shade val="50000"/>
-            </a:schemeClr>
-          </a:lnRef>
-          <a:fillRef idx="1">
-            <a:schemeClr val="accent2"/>
-          </a:fillRef>
-          <a:effectRef idx="0">
-            <a:schemeClr val="accent2"/>
-          </a:effectRef>
-          <a:fontRef idx="minor">
-            <a:schemeClr val="lt1"/>
-          </a:fontRef>
-        </p:style>
-        <p:txBody>
-          <a:bodyPr rtlCol="0" anchor="ctr"/>
-          <a:lstStyle/>
-          <a:p>
-            <a:pPr algn="ctr"/>
-            <a:endParaRPr lang="nl-NL" sz="1600">
-              <a:latin typeface="Arial" panose="020B0604020202020204" pitchFamily="34" charset="0"/>
-              <a:cs typeface="Arial" panose="020B0604020202020204" pitchFamily="34" charset="0"/>
-            </a:endParaRPr>
-          </a:p>
-        </p:txBody>
-      </p:sp>
-      <p:sp>
-        <p:nvSpPr>
-          <p:cNvPr id="16" name="Tekstvak 15">
-            <a:extLst>
-              <a:ext uri="{FF2B5EF4-FFF2-40B4-BE49-F238E27FC236}">
-                <a16:creationId xmlns:a16="http://schemas.microsoft.com/office/drawing/2014/main" id="{96BFFAC8-8A38-4393-A4D8-EB7B09418EE2}"/>
-              </a:ext>
-            </a:extLst>
-          </p:cNvPr>
-          <p:cNvSpPr txBox="1"/>
-          <p:nvPr/>
-        </p:nvSpPr>
-        <p:spPr>
-          <a:xfrm>
-            <a:off x="3597677" y="5349737"/>
-            <a:ext cx="1003852" cy="430887"/>
-          </a:xfrm>
-          <a:prstGeom prst="rect">
-            <a:avLst/>
-          </a:prstGeom>
-          <a:noFill/>
-        </p:spPr>
-        <p:txBody>
-          <a:bodyPr wrap="square" rtlCol="0">
-            <a:spAutoFit/>
-          </a:bodyPr>
-          <a:lstStyle/>
-          <a:p>
-            <a:r>
-              <a:rPr lang="nl-NL" sz="1050" dirty="0">
-                <a:latin typeface="Arial" panose="020B0604020202020204" pitchFamily="34" charset="0"/>
-                <a:cs typeface="Arial" panose="020B0604020202020204" pitchFamily="34" charset="0"/>
-              </a:rPr>
-              <a:t>Gulf </a:t>
-            </a:r>
-            <a:r>
-              <a:rPr lang="nl-NL" sz="1050" dirty="0" err="1">
-                <a:latin typeface="Arial" panose="020B0604020202020204" pitchFamily="34" charset="0"/>
-                <a:cs typeface="Arial" panose="020B0604020202020204" pitchFamily="34" charset="0"/>
-              </a:rPr>
-              <a:t>Valour</a:t>
-            </a:r>
-            <a:endParaRPr lang="nl-NL" sz="1050" dirty="0">
-              <a:latin typeface="Arial" panose="020B0604020202020204" pitchFamily="34" charset="0"/>
-              <a:cs typeface="Arial" panose="020B0604020202020204" pitchFamily="34" charset="0"/>
-            </a:endParaRPr>
-          </a:p>
-          <a:p>
-            <a:r>
-              <a:rPr lang="nl-NL" sz="1050" dirty="0">
-                <a:latin typeface="Arial" panose="020B0604020202020204" pitchFamily="34" charset="0"/>
-                <a:cs typeface="Arial" panose="020B0604020202020204" pitchFamily="34" charset="0"/>
-              </a:rPr>
-              <a:t>7.8 </a:t>
-            </a:r>
-            <a:r>
-              <a:rPr lang="nl-NL" sz="1050" dirty="0" err="1">
-                <a:latin typeface="Arial" panose="020B0604020202020204" pitchFamily="34" charset="0"/>
-                <a:cs typeface="Arial" panose="020B0604020202020204" pitchFamily="34" charset="0"/>
-              </a:rPr>
-              <a:t>kn</a:t>
-            </a:r>
-            <a:endParaRPr lang="nl-NL" sz="1050" dirty="0">
-              <a:latin typeface="Arial" panose="020B0604020202020204" pitchFamily="34" charset="0"/>
-              <a:cs typeface="Arial" panose="020B0604020202020204" pitchFamily="34" charset="0"/>
-            </a:endParaRPr>
-          </a:p>
-        </p:txBody>
-      </p:sp>
-      <p:sp>
-        <p:nvSpPr>
-          <p:cNvPr id="17" name="Tekstvak 16">
-            <a:extLst>
-              <a:ext uri="{FF2B5EF4-FFF2-40B4-BE49-F238E27FC236}">
-                <a16:creationId xmlns:a16="http://schemas.microsoft.com/office/drawing/2014/main" id="{A418C49D-0E79-42EC-BE91-307E7E12D908}"/>
-              </a:ext>
-            </a:extLst>
-          </p:cNvPr>
-          <p:cNvSpPr txBox="1"/>
-          <p:nvPr/>
-        </p:nvSpPr>
-        <p:spPr>
-          <a:xfrm>
-            <a:off x="1695285" y="1334825"/>
-            <a:ext cx="1884459" cy="430887"/>
-          </a:xfrm>
-          <a:prstGeom prst="rect">
-            <a:avLst/>
-          </a:prstGeom>
-          <a:noFill/>
-        </p:spPr>
-        <p:txBody>
-          <a:bodyPr wrap="square" rtlCol="0">
-            <a:spAutoFit/>
-          </a:bodyPr>
-          <a:lstStyle/>
-          <a:p>
-            <a:r>
-              <a:rPr lang="nl-NL" sz="1050" dirty="0" err="1">
-                <a:latin typeface="Arial" panose="020B0604020202020204" pitchFamily="34" charset="0"/>
-                <a:cs typeface="Arial" panose="020B0604020202020204" pitchFamily="34" charset="0"/>
-              </a:rPr>
-              <a:t>Astrorunner</a:t>
-            </a:r>
-            <a:endParaRPr lang="nl-NL" sz="1050" dirty="0">
-              <a:latin typeface="Arial" panose="020B0604020202020204" pitchFamily="34" charset="0"/>
-              <a:cs typeface="Arial" panose="020B0604020202020204" pitchFamily="34" charset="0"/>
-            </a:endParaRPr>
-          </a:p>
-          <a:p>
-            <a:r>
-              <a:rPr lang="nl-NL" sz="1050" dirty="0">
-                <a:latin typeface="Arial" panose="020B0604020202020204" pitchFamily="34" charset="0"/>
-                <a:cs typeface="Arial" panose="020B0604020202020204" pitchFamily="34" charset="0"/>
-              </a:rPr>
-              <a:t>13.4 </a:t>
-            </a:r>
-            <a:r>
-              <a:rPr lang="nl-NL" sz="1050" dirty="0" err="1">
-                <a:latin typeface="Arial" panose="020B0604020202020204" pitchFamily="34" charset="0"/>
-                <a:cs typeface="Arial" panose="020B0604020202020204" pitchFamily="34" charset="0"/>
-              </a:rPr>
-              <a:t>kn</a:t>
-            </a:r>
-            <a:endParaRPr lang="nl-NL" sz="1050" dirty="0">
-              <a:latin typeface="Arial" panose="020B0604020202020204" pitchFamily="34" charset="0"/>
-              <a:cs typeface="Arial" panose="020B0604020202020204" pitchFamily="34" charset="0"/>
-            </a:endParaRPr>
-          </a:p>
-        </p:txBody>
-      </p:sp>
-      <p:sp>
-        <p:nvSpPr>
-          <p:cNvPr id="18" name="Tekstvak 17">
-            <a:extLst>
-              <a:ext uri="{FF2B5EF4-FFF2-40B4-BE49-F238E27FC236}">
-                <a16:creationId xmlns:a16="http://schemas.microsoft.com/office/drawing/2014/main" id="{CF05A2A9-2A1A-44CB-AB75-2F64C0908EE7}"/>
-              </a:ext>
-            </a:extLst>
-          </p:cNvPr>
-          <p:cNvSpPr txBox="1"/>
-          <p:nvPr/>
-        </p:nvSpPr>
-        <p:spPr>
-          <a:xfrm>
-            <a:off x="7138505" y="3251863"/>
-            <a:ext cx="1884459" cy="430887"/>
-          </a:xfrm>
-          <a:prstGeom prst="rect">
-            <a:avLst/>
-          </a:prstGeom>
-          <a:noFill/>
-        </p:spPr>
-        <p:txBody>
-          <a:bodyPr wrap="square" rtlCol="0">
-            <a:spAutoFit/>
-          </a:bodyPr>
-          <a:lstStyle/>
-          <a:p>
-            <a:r>
-              <a:rPr lang="nl-NL" sz="1050" dirty="0" err="1">
-                <a:latin typeface="Arial" panose="020B0604020202020204" pitchFamily="34" charset="0"/>
-                <a:cs typeface="Arial" panose="020B0604020202020204" pitchFamily="34" charset="0"/>
-              </a:rPr>
-              <a:t>Anglia</a:t>
-            </a:r>
-            <a:r>
-              <a:rPr lang="nl-NL" sz="1050" dirty="0">
-                <a:latin typeface="Arial" panose="020B0604020202020204" pitchFamily="34" charset="0"/>
-                <a:cs typeface="Arial" panose="020B0604020202020204" pitchFamily="34" charset="0"/>
-              </a:rPr>
-              <a:t> </a:t>
-            </a:r>
-            <a:r>
-              <a:rPr lang="nl-NL" sz="1050" dirty="0" err="1">
-                <a:latin typeface="Arial" panose="020B0604020202020204" pitchFamily="34" charset="0"/>
-                <a:cs typeface="Arial" panose="020B0604020202020204" pitchFamily="34" charset="0"/>
-              </a:rPr>
-              <a:t>Seaways</a:t>
-            </a:r>
-            <a:endParaRPr lang="nl-NL" sz="1050" dirty="0">
-              <a:latin typeface="Arial" panose="020B0604020202020204" pitchFamily="34" charset="0"/>
-              <a:cs typeface="Arial" panose="020B0604020202020204" pitchFamily="34" charset="0"/>
-            </a:endParaRPr>
-          </a:p>
-          <a:p>
-            <a:r>
-              <a:rPr lang="nl-NL" sz="1050" dirty="0">
-                <a:latin typeface="Arial" panose="020B0604020202020204" pitchFamily="34" charset="0"/>
-                <a:cs typeface="Arial" panose="020B0604020202020204" pitchFamily="34" charset="0"/>
-              </a:rPr>
-              <a:t>10.3 </a:t>
-            </a:r>
-            <a:r>
-              <a:rPr lang="nl-NL" sz="1050" dirty="0" err="1">
-                <a:latin typeface="Arial" panose="020B0604020202020204" pitchFamily="34" charset="0"/>
-                <a:cs typeface="Arial" panose="020B0604020202020204" pitchFamily="34" charset="0"/>
-              </a:rPr>
-              <a:t>kn</a:t>
-            </a:r>
-            <a:endParaRPr lang="nl-NL" sz="1050" dirty="0">
-              <a:latin typeface="Arial" panose="020B0604020202020204" pitchFamily="34" charset="0"/>
-              <a:cs typeface="Arial" panose="020B0604020202020204" pitchFamily="34" charset="0"/>
-            </a:endParaRPr>
           </a:p>
         </p:txBody>
       </p:sp>
@@ -13285,8 +11433,8 @@
         </p:nvSpPr>
         <p:spPr>
           <a:xfrm>
-            <a:off x="8547100" y="174625"/>
-            <a:ext cx="1041399" cy="400110"/>
+            <a:off x="8205746" y="174625"/>
+            <a:ext cx="1382753" cy="400110"/>
           </a:xfrm>
           <a:prstGeom prst="rect">
             <a:avLst/>
@@ -13313,7 +11461,7 @@
                 <a:latin typeface="Arial" panose="020B0604020202020204" pitchFamily="34" charset="0"/>
                 <a:cs typeface="Arial" panose="020B0604020202020204" pitchFamily="34" charset="0"/>
               </a:rPr>
-              <a:t>12:00</a:t>
+              <a:t>Maasgeul</a:t>
             </a:r>
           </a:p>
         </p:txBody>
@@ -13635,115 +11783,10 @@
           </a:p>
         </p:txBody>
       </p:sp>
-      <p:sp>
-        <p:nvSpPr>
-          <p:cNvPr id="52" name="Tekstvak 51">
-            <a:extLst>
-              <a:ext uri="{FF2B5EF4-FFF2-40B4-BE49-F238E27FC236}">
-                <a16:creationId xmlns:a16="http://schemas.microsoft.com/office/drawing/2014/main" id="{8E878480-B4A0-4029-A619-F932CD0A3F65}"/>
-              </a:ext>
-            </a:extLst>
-          </p:cNvPr>
-          <p:cNvSpPr txBox="1"/>
-          <p:nvPr/>
-        </p:nvSpPr>
-        <p:spPr>
-          <a:xfrm>
-            <a:off x="820890" y="6555768"/>
-            <a:ext cx="1884459" cy="200055"/>
-          </a:xfrm>
-          <a:prstGeom prst="rect">
-            <a:avLst/>
-          </a:prstGeom>
-          <a:noFill/>
-        </p:spPr>
-        <p:txBody>
-          <a:bodyPr wrap="square" rtlCol="0">
-            <a:spAutoFit/>
-          </a:bodyPr>
-          <a:lstStyle/>
-          <a:p>
-            <a:r>
-              <a:rPr lang="nl-NL" sz="700" dirty="0">
-                <a:latin typeface="Arial" panose="020B0604020202020204" pitchFamily="34" charset="0"/>
-                <a:cs typeface="Arial" panose="020B0604020202020204" pitchFamily="34" charset="0"/>
-              </a:rPr>
-              <a:t>*</a:t>
-            </a:r>
-            <a:r>
-              <a:rPr lang="nl-NL" sz="700" dirty="0" err="1">
-                <a:latin typeface="Arial" panose="020B0604020202020204" pitchFamily="34" charset="0"/>
-                <a:cs typeface="Arial" panose="020B0604020202020204" pitchFamily="34" charset="0"/>
-              </a:rPr>
-              <a:t>Ships</a:t>
-            </a:r>
-            <a:r>
-              <a:rPr lang="nl-NL" sz="700" dirty="0">
-                <a:latin typeface="Arial" panose="020B0604020202020204" pitchFamily="34" charset="0"/>
-                <a:cs typeface="Arial" panose="020B0604020202020204" pitchFamily="34" charset="0"/>
-              </a:rPr>
-              <a:t> </a:t>
-            </a:r>
-            <a:r>
-              <a:rPr lang="nl-NL" sz="700" dirty="0" err="1">
-                <a:latin typeface="Arial" panose="020B0604020202020204" pitchFamily="34" charset="0"/>
-                <a:cs typeface="Arial" panose="020B0604020202020204" pitchFamily="34" charset="0"/>
-              </a:rPr>
-              <a:t>scaled</a:t>
-            </a:r>
-            <a:r>
-              <a:rPr lang="nl-NL" sz="700" dirty="0">
-                <a:latin typeface="Arial" panose="020B0604020202020204" pitchFamily="34" charset="0"/>
-                <a:cs typeface="Arial" panose="020B0604020202020204" pitchFamily="34" charset="0"/>
-              </a:rPr>
-              <a:t> </a:t>
-            </a:r>
-            <a:r>
-              <a:rPr lang="nl-NL" sz="700" dirty="0" err="1">
-                <a:latin typeface="Arial" panose="020B0604020202020204" pitchFamily="34" charset="0"/>
-                <a:cs typeface="Arial" panose="020B0604020202020204" pitchFamily="34" charset="0"/>
-              </a:rPr>
-              <a:t>with</a:t>
-            </a:r>
-            <a:r>
-              <a:rPr lang="nl-NL" sz="700" dirty="0">
-                <a:latin typeface="Arial" panose="020B0604020202020204" pitchFamily="34" charset="0"/>
-                <a:cs typeface="Arial" panose="020B0604020202020204" pitchFamily="34" charset="0"/>
-              </a:rPr>
-              <a:t> factor 2 </a:t>
-            </a:r>
-            <a:r>
-              <a:rPr lang="nl-NL" sz="700" dirty="0" err="1">
-                <a:latin typeface="Arial" panose="020B0604020202020204" pitchFamily="34" charset="0"/>
-                <a:cs typeface="Arial" panose="020B0604020202020204" pitchFamily="34" charset="0"/>
-              </a:rPr>
-              <a:t>for</a:t>
-            </a:r>
-            <a:r>
-              <a:rPr lang="nl-NL" sz="700" dirty="0">
-                <a:latin typeface="Arial" panose="020B0604020202020204" pitchFamily="34" charset="0"/>
-                <a:cs typeface="Arial" panose="020B0604020202020204" pitchFamily="34" charset="0"/>
-              </a:rPr>
-              <a:t> </a:t>
-            </a:r>
-            <a:r>
-              <a:rPr lang="nl-NL" sz="700" dirty="0" err="1">
-                <a:latin typeface="Arial" panose="020B0604020202020204" pitchFamily="34" charset="0"/>
-                <a:cs typeface="Arial" panose="020B0604020202020204" pitchFamily="34" charset="0"/>
-              </a:rPr>
-              <a:t>visibility</a:t>
-            </a:r>
-            <a:endParaRPr lang="nl-NL" sz="700" dirty="0">
-              <a:latin typeface="Arial" panose="020B0604020202020204" pitchFamily="34" charset="0"/>
-              <a:cs typeface="Arial" panose="020B0604020202020204" pitchFamily="34" charset="0"/>
-            </a:endParaRPr>
-          </a:p>
-        </p:txBody>
-      </p:sp>
     </p:spTree>
     <p:extLst>
       <p:ext uri="{BB962C8B-B14F-4D97-AF65-F5344CB8AC3E}">
-        <p14:creationId xmlns:p14="http://schemas.microsoft.com/office/powerpoint/2010/main" val="3303994614"/>
+        <p14:creationId xmlns:p14="http://schemas.microsoft.com/office/powerpoint/2010/main" val="4240618134"/>
       </p:ext>
     </p:extLst>
   </p:cSld>
@@ -15257,6 +13300,2131 @@
           </a:p>
           <a:p>
             <a:r>
+              <a:rPr lang="nl-NL" sz="1050" dirty="0">
+                <a:latin typeface="Arial" panose="020B0604020202020204" pitchFamily="34" charset="0"/>
+                <a:cs typeface="Arial" panose="020B0604020202020204" pitchFamily="34" charset="0"/>
+              </a:rPr>
+              <a:t>13.4 </a:t>
+            </a:r>
+            <a:r>
+              <a:rPr lang="nl-NL" sz="1050" dirty="0" err="1">
+                <a:latin typeface="Arial" panose="020B0604020202020204" pitchFamily="34" charset="0"/>
+                <a:cs typeface="Arial" panose="020B0604020202020204" pitchFamily="34" charset="0"/>
+              </a:rPr>
+              <a:t>kn</a:t>
+            </a:r>
+            <a:endParaRPr lang="nl-NL" sz="1050" dirty="0">
+              <a:latin typeface="Arial" panose="020B0604020202020204" pitchFamily="34" charset="0"/>
+              <a:cs typeface="Arial" panose="020B0604020202020204" pitchFamily="34" charset="0"/>
+            </a:endParaRPr>
+          </a:p>
+        </p:txBody>
+      </p:sp>
+      <p:sp>
+        <p:nvSpPr>
+          <p:cNvPr id="18" name="Tekstvak 17">
+            <a:extLst>
+              <a:ext uri="{FF2B5EF4-FFF2-40B4-BE49-F238E27FC236}">
+                <a16:creationId xmlns:a16="http://schemas.microsoft.com/office/drawing/2014/main" id="{CF05A2A9-2A1A-44CB-AB75-2F64C0908EE7}"/>
+              </a:ext>
+            </a:extLst>
+          </p:cNvPr>
+          <p:cNvSpPr txBox="1"/>
+          <p:nvPr/>
+        </p:nvSpPr>
+        <p:spPr>
+          <a:xfrm>
+            <a:off x="7138505" y="3251863"/>
+            <a:ext cx="1884459" cy="430887"/>
+          </a:xfrm>
+          <a:prstGeom prst="rect">
+            <a:avLst/>
+          </a:prstGeom>
+          <a:noFill/>
+        </p:spPr>
+        <p:txBody>
+          <a:bodyPr wrap="square" rtlCol="0">
+            <a:spAutoFit/>
+          </a:bodyPr>
+          <a:lstStyle/>
+          <a:p>
+            <a:r>
+              <a:rPr lang="nl-NL" sz="1050" dirty="0" err="1">
+                <a:latin typeface="Arial" panose="020B0604020202020204" pitchFamily="34" charset="0"/>
+                <a:cs typeface="Arial" panose="020B0604020202020204" pitchFamily="34" charset="0"/>
+              </a:rPr>
+              <a:t>Anglia</a:t>
+            </a:r>
+            <a:r>
+              <a:rPr lang="nl-NL" sz="1050" dirty="0">
+                <a:latin typeface="Arial" panose="020B0604020202020204" pitchFamily="34" charset="0"/>
+                <a:cs typeface="Arial" panose="020B0604020202020204" pitchFamily="34" charset="0"/>
+              </a:rPr>
+              <a:t> </a:t>
+            </a:r>
+            <a:r>
+              <a:rPr lang="nl-NL" sz="1050" dirty="0" err="1">
+                <a:latin typeface="Arial" panose="020B0604020202020204" pitchFamily="34" charset="0"/>
+                <a:cs typeface="Arial" panose="020B0604020202020204" pitchFamily="34" charset="0"/>
+              </a:rPr>
+              <a:t>Seaways</a:t>
+            </a:r>
+            <a:endParaRPr lang="nl-NL" sz="1050" dirty="0">
+              <a:latin typeface="Arial" panose="020B0604020202020204" pitchFamily="34" charset="0"/>
+              <a:cs typeface="Arial" panose="020B0604020202020204" pitchFamily="34" charset="0"/>
+            </a:endParaRPr>
+          </a:p>
+          <a:p>
+            <a:r>
+              <a:rPr lang="nl-NL" sz="1050" dirty="0">
+                <a:latin typeface="Arial" panose="020B0604020202020204" pitchFamily="34" charset="0"/>
+                <a:cs typeface="Arial" panose="020B0604020202020204" pitchFamily="34" charset="0"/>
+              </a:rPr>
+              <a:t>10.3 </a:t>
+            </a:r>
+            <a:r>
+              <a:rPr lang="nl-NL" sz="1050" dirty="0" err="1">
+                <a:latin typeface="Arial" panose="020B0604020202020204" pitchFamily="34" charset="0"/>
+                <a:cs typeface="Arial" panose="020B0604020202020204" pitchFamily="34" charset="0"/>
+              </a:rPr>
+              <a:t>kn</a:t>
+            </a:r>
+            <a:endParaRPr lang="nl-NL" sz="1050" dirty="0">
+              <a:latin typeface="Arial" panose="020B0604020202020204" pitchFamily="34" charset="0"/>
+              <a:cs typeface="Arial" panose="020B0604020202020204" pitchFamily="34" charset="0"/>
+            </a:endParaRPr>
+          </a:p>
+        </p:txBody>
+      </p:sp>
+      <p:sp>
+        <p:nvSpPr>
+          <p:cNvPr id="21" name="Tekstvak 20">
+            <a:extLst>
+              <a:ext uri="{FF2B5EF4-FFF2-40B4-BE49-F238E27FC236}">
+                <a16:creationId xmlns:a16="http://schemas.microsoft.com/office/drawing/2014/main" id="{67B53F03-9BE6-497C-90EE-965CDE58A0AB}"/>
+              </a:ext>
+            </a:extLst>
+          </p:cNvPr>
+          <p:cNvSpPr txBox="1"/>
+          <p:nvPr/>
+        </p:nvSpPr>
+        <p:spPr>
+          <a:xfrm rot="1793371">
+            <a:off x="8327663" y="3222160"/>
+            <a:ext cx="1582310" cy="230832"/>
+          </a:xfrm>
+          <a:prstGeom prst="rect">
+            <a:avLst/>
+          </a:prstGeom>
+          <a:noFill/>
+        </p:spPr>
+        <p:txBody>
+          <a:bodyPr wrap="square" rtlCol="0">
+            <a:spAutoFit/>
+          </a:bodyPr>
+          <a:lstStyle/>
+          <a:p>
+            <a:r>
+              <a:rPr lang="nl-NL" sz="900" i="1" dirty="0">
+                <a:solidFill>
+                  <a:schemeClr val="bg1">
+                    <a:lumMod val="50000"/>
+                  </a:schemeClr>
+                </a:solidFill>
+                <a:latin typeface="Arial" panose="020B0604020202020204" pitchFamily="34" charset="0"/>
+                <a:cs typeface="Arial" panose="020B0604020202020204" pitchFamily="34" charset="0"/>
+              </a:rPr>
+              <a:t>Berghaven</a:t>
+            </a:r>
+          </a:p>
+        </p:txBody>
+      </p:sp>
+      <p:sp>
+        <p:nvSpPr>
+          <p:cNvPr id="41" name="Tekstvak 40">
+            <a:extLst>
+              <a:ext uri="{FF2B5EF4-FFF2-40B4-BE49-F238E27FC236}">
+                <a16:creationId xmlns:a16="http://schemas.microsoft.com/office/drawing/2014/main" id="{22E9C66B-5E3D-4D87-BA72-086152C6717A}"/>
+              </a:ext>
+            </a:extLst>
+          </p:cNvPr>
+          <p:cNvSpPr txBox="1"/>
+          <p:nvPr/>
+        </p:nvSpPr>
+        <p:spPr>
+          <a:xfrm>
+            <a:off x="8547100" y="174625"/>
+            <a:ext cx="1041399" cy="400110"/>
+          </a:xfrm>
+          <a:prstGeom prst="rect">
+            <a:avLst/>
+          </a:prstGeom>
+          <a:noFill/>
+          <a:ln>
+            <a:solidFill>
+              <a:schemeClr val="tx1">
+                <a:lumMod val="95000"/>
+                <a:lumOff val="5000"/>
+              </a:schemeClr>
+            </a:solidFill>
+          </a:ln>
+        </p:spPr>
+        <p:txBody>
+          <a:bodyPr wrap="square" rtlCol="0">
+            <a:spAutoFit/>
+          </a:bodyPr>
+          <a:lstStyle/>
+          <a:p>
+            <a:pPr algn="ctr"/>
+            <a:r>
+              <a:rPr lang="nl-NL" sz="2000" dirty="0">
+                <a:latin typeface="Arial" panose="020B0604020202020204" pitchFamily="34" charset="0"/>
+                <a:cs typeface="Arial" panose="020B0604020202020204" pitchFamily="34" charset="0"/>
+              </a:rPr>
+              <a:t>12:00</a:t>
+            </a:r>
+          </a:p>
+        </p:txBody>
+      </p:sp>
+      <p:grpSp>
+        <p:nvGrpSpPr>
+          <p:cNvPr id="51" name="Groep 50">
+            <a:extLst>
+              <a:ext uri="{FF2B5EF4-FFF2-40B4-BE49-F238E27FC236}">
+                <a16:creationId xmlns:a16="http://schemas.microsoft.com/office/drawing/2014/main" id="{DE62420E-18B0-4E67-9D6D-655915A32BB8}"/>
+              </a:ext>
+            </a:extLst>
+          </p:cNvPr>
+          <p:cNvGrpSpPr/>
+          <p:nvPr/>
+        </p:nvGrpSpPr>
+        <p:grpSpPr>
+          <a:xfrm>
+            <a:off x="811848" y="6470174"/>
+            <a:ext cx="1407853" cy="54000"/>
+            <a:chOff x="811848" y="6625749"/>
+            <a:chExt cx="1407853" cy="54000"/>
+          </a:xfrm>
+        </p:grpSpPr>
+        <p:grpSp>
+          <p:nvGrpSpPr>
+            <p:cNvPr id="46" name="Groep 45">
+              <a:extLst>
+                <a:ext uri="{FF2B5EF4-FFF2-40B4-BE49-F238E27FC236}">
+                  <a16:creationId xmlns:a16="http://schemas.microsoft.com/office/drawing/2014/main" id="{42644175-AA89-43B4-82FC-C9FA599FDEA1}"/>
+                </a:ext>
+              </a:extLst>
+            </p:cNvPr>
+            <p:cNvGrpSpPr/>
+            <p:nvPr/>
+          </p:nvGrpSpPr>
+          <p:grpSpPr>
+            <a:xfrm>
+              <a:off x="811848" y="6625749"/>
+              <a:ext cx="706813" cy="54000"/>
+              <a:chOff x="1390968" y="6275229"/>
+              <a:chExt cx="1413625" cy="54000"/>
+            </a:xfrm>
+          </p:grpSpPr>
+          <p:sp>
+            <p:nvSpPr>
+              <p:cNvPr id="44" name="Rechthoek 43">
+                <a:extLst>
+                  <a:ext uri="{FF2B5EF4-FFF2-40B4-BE49-F238E27FC236}">
+                    <a16:creationId xmlns:a16="http://schemas.microsoft.com/office/drawing/2014/main" id="{45902CA9-E4E5-43CD-ACCE-76371350F831}"/>
+                  </a:ext>
+                </a:extLst>
+              </p:cNvPr>
+              <p:cNvSpPr/>
+              <p:nvPr/>
+            </p:nvSpPr>
+            <p:spPr>
+              <a:xfrm>
+                <a:off x="1390968" y="6275229"/>
+                <a:ext cx="705600" cy="54000"/>
+              </a:xfrm>
+              <a:prstGeom prst="rect">
+                <a:avLst/>
+              </a:prstGeom>
+              <a:solidFill>
+                <a:schemeClr val="bg1"/>
+              </a:solidFill>
+              <a:ln w="6350">
+                <a:solidFill>
+                  <a:schemeClr val="tx1"/>
+                </a:solidFill>
+              </a:ln>
+            </p:spPr>
+            <p:style>
+              <a:lnRef idx="2">
+                <a:schemeClr val="accent1">
+                  <a:shade val="50000"/>
+                </a:schemeClr>
+              </a:lnRef>
+              <a:fillRef idx="1">
+                <a:schemeClr val="accent1"/>
+              </a:fillRef>
+              <a:effectRef idx="0">
+                <a:schemeClr val="accent1"/>
+              </a:effectRef>
+              <a:fontRef idx="minor">
+                <a:schemeClr val="lt1"/>
+              </a:fontRef>
+            </p:style>
+            <p:txBody>
+              <a:bodyPr rtlCol="0" anchor="ctr"/>
+              <a:lstStyle/>
+              <a:p>
+                <a:pPr algn="ctr"/>
+                <a:endParaRPr lang="nl-NL"/>
+              </a:p>
+            </p:txBody>
+          </p:sp>
+          <p:sp>
+            <p:nvSpPr>
+              <p:cNvPr id="45" name="Rechthoek 44">
+                <a:extLst>
+                  <a:ext uri="{FF2B5EF4-FFF2-40B4-BE49-F238E27FC236}">
+                    <a16:creationId xmlns:a16="http://schemas.microsoft.com/office/drawing/2014/main" id="{66EAB369-DD96-414D-B20E-CD378B79567E}"/>
+                  </a:ext>
+                </a:extLst>
+              </p:cNvPr>
+              <p:cNvSpPr/>
+              <p:nvPr/>
+            </p:nvSpPr>
+            <p:spPr>
+              <a:xfrm>
+                <a:off x="2098993" y="6275229"/>
+                <a:ext cx="705600" cy="54000"/>
+              </a:xfrm>
+              <a:prstGeom prst="rect">
+                <a:avLst/>
+              </a:prstGeom>
+              <a:solidFill>
+                <a:schemeClr val="tx1"/>
+              </a:solidFill>
+              <a:ln w="6350">
+                <a:solidFill>
+                  <a:schemeClr val="tx1"/>
+                </a:solidFill>
+              </a:ln>
+            </p:spPr>
+            <p:style>
+              <a:lnRef idx="2">
+                <a:schemeClr val="accent1">
+                  <a:shade val="50000"/>
+                </a:schemeClr>
+              </a:lnRef>
+              <a:fillRef idx="1">
+                <a:schemeClr val="accent1"/>
+              </a:fillRef>
+              <a:effectRef idx="0">
+                <a:schemeClr val="accent1"/>
+              </a:effectRef>
+              <a:fontRef idx="minor">
+                <a:schemeClr val="lt1"/>
+              </a:fontRef>
+            </p:style>
+            <p:txBody>
+              <a:bodyPr rtlCol="0" anchor="ctr"/>
+              <a:lstStyle/>
+              <a:p>
+                <a:pPr algn="ctr"/>
+                <a:endParaRPr lang="nl-NL"/>
+              </a:p>
+            </p:txBody>
+          </p:sp>
+        </p:grpSp>
+        <p:grpSp>
+          <p:nvGrpSpPr>
+            <p:cNvPr id="47" name="Groep 46">
+              <a:extLst>
+                <a:ext uri="{FF2B5EF4-FFF2-40B4-BE49-F238E27FC236}">
+                  <a16:creationId xmlns:a16="http://schemas.microsoft.com/office/drawing/2014/main" id="{488F433E-64AE-458F-9972-EE9755E1E6D8}"/>
+                </a:ext>
+              </a:extLst>
+            </p:cNvPr>
+            <p:cNvGrpSpPr/>
+            <p:nvPr/>
+          </p:nvGrpSpPr>
+          <p:grpSpPr>
+            <a:xfrm>
+              <a:off x="1512888" y="6625749"/>
+              <a:ext cx="706813" cy="54000"/>
+              <a:chOff x="1390968" y="6275229"/>
+              <a:chExt cx="1413625" cy="54000"/>
+            </a:xfrm>
+          </p:grpSpPr>
+          <p:sp>
+            <p:nvSpPr>
+              <p:cNvPr id="48" name="Rechthoek 47">
+                <a:extLst>
+                  <a:ext uri="{FF2B5EF4-FFF2-40B4-BE49-F238E27FC236}">
+                    <a16:creationId xmlns:a16="http://schemas.microsoft.com/office/drawing/2014/main" id="{4C7CA002-172D-4727-847C-E0BAA0D27776}"/>
+                  </a:ext>
+                </a:extLst>
+              </p:cNvPr>
+              <p:cNvSpPr/>
+              <p:nvPr/>
+            </p:nvSpPr>
+            <p:spPr>
+              <a:xfrm>
+                <a:off x="1390968" y="6275229"/>
+                <a:ext cx="705600" cy="54000"/>
+              </a:xfrm>
+              <a:prstGeom prst="rect">
+                <a:avLst/>
+              </a:prstGeom>
+              <a:solidFill>
+                <a:schemeClr val="bg1"/>
+              </a:solidFill>
+              <a:ln w="6350">
+                <a:solidFill>
+                  <a:schemeClr val="tx1"/>
+                </a:solidFill>
+              </a:ln>
+            </p:spPr>
+            <p:style>
+              <a:lnRef idx="2">
+                <a:schemeClr val="accent1">
+                  <a:shade val="50000"/>
+                </a:schemeClr>
+              </a:lnRef>
+              <a:fillRef idx="1">
+                <a:schemeClr val="accent1"/>
+              </a:fillRef>
+              <a:effectRef idx="0">
+                <a:schemeClr val="accent1"/>
+              </a:effectRef>
+              <a:fontRef idx="minor">
+                <a:schemeClr val="lt1"/>
+              </a:fontRef>
+            </p:style>
+            <p:txBody>
+              <a:bodyPr rtlCol="0" anchor="ctr"/>
+              <a:lstStyle/>
+              <a:p>
+                <a:pPr algn="ctr"/>
+                <a:endParaRPr lang="nl-NL"/>
+              </a:p>
+            </p:txBody>
+          </p:sp>
+          <p:sp>
+            <p:nvSpPr>
+              <p:cNvPr id="49" name="Rechthoek 48">
+                <a:extLst>
+                  <a:ext uri="{FF2B5EF4-FFF2-40B4-BE49-F238E27FC236}">
+                    <a16:creationId xmlns:a16="http://schemas.microsoft.com/office/drawing/2014/main" id="{EBCBA058-353E-454D-BE47-FDA4FAC45C91}"/>
+                  </a:ext>
+                </a:extLst>
+              </p:cNvPr>
+              <p:cNvSpPr/>
+              <p:nvPr/>
+            </p:nvSpPr>
+            <p:spPr>
+              <a:xfrm>
+                <a:off x="2098993" y="6275229"/>
+                <a:ext cx="705600" cy="54000"/>
+              </a:xfrm>
+              <a:prstGeom prst="rect">
+                <a:avLst/>
+              </a:prstGeom>
+              <a:solidFill>
+                <a:schemeClr val="tx1"/>
+              </a:solidFill>
+              <a:ln w="6350">
+                <a:solidFill>
+                  <a:schemeClr val="tx1"/>
+                </a:solidFill>
+              </a:ln>
+            </p:spPr>
+            <p:style>
+              <a:lnRef idx="2">
+                <a:schemeClr val="accent1">
+                  <a:shade val="50000"/>
+                </a:schemeClr>
+              </a:lnRef>
+              <a:fillRef idx="1">
+                <a:schemeClr val="accent1"/>
+              </a:fillRef>
+              <a:effectRef idx="0">
+                <a:schemeClr val="accent1"/>
+              </a:effectRef>
+              <a:fontRef idx="minor">
+                <a:schemeClr val="lt1"/>
+              </a:fontRef>
+            </p:style>
+            <p:txBody>
+              <a:bodyPr rtlCol="0" anchor="ctr"/>
+              <a:lstStyle/>
+              <a:p>
+                <a:pPr algn="ctr"/>
+                <a:endParaRPr lang="nl-NL"/>
+              </a:p>
+            </p:txBody>
+          </p:sp>
+        </p:grpSp>
+      </p:grpSp>
+      <p:sp>
+        <p:nvSpPr>
+          <p:cNvPr id="50" name="Tekstvak 49">
+            <a:extLst>
+              <a:ext uri="{FF2B5EF4-FFF2-40B4-BE49-F238E27FC236}">
+                <a16:creationId xmlns:a16="http://schemas.microsoft.com/office/drawing/2014/main" id="{A1660F5A-1BDD-443C-8F3E-259916D86A56}"/>
+              </a:ext>
+            </a:extLst>
+          </p:cNvPr>
+          <p:cNvSpPr txBox="1"/>
+          <p:nvPr/>
+        </p:nvSpPr>
+        <p:spPr>
+          <a:xfrm>
+            <a:off x="1255865" y="6250968"/>
+            <a:ext cx="1884459" cy="253916"/>
+          </a:xfrm>
+          <a:prstGeom prst="rect">
+            <a:avLst/>
+          </a:prstGeom>
+          <a:noFill/>
+        </p:spPr>
+        <p:txBody>
+          <a:bodyPr wrap="square" rtlCol="0">
+            <a:spAutoFit/>
+          </a:bodyPr>
+          <a:lstStyle/>
+          <a:p>
+            <a:r>
+              <a:rPr lang="nl-NL" sz="1050" dirty="0">
+                <a:latin typeface="Arial" panose="020B0604020202020204" pitchFamily="34" charset="0"/>
+                <a:cs typeface="Arial" panose="020B0604020202020204" pitchFamily="34" charset="0"/>
+              </a:rPr>
+              <a:t>1 km</a:t>
+            </a:r>
+          </a:p>
+        </p:txBody>
+      </p:sp>
+      <p:sp>
+        <p:nvSpPr>
+          <p:cNvPr id="52" name="Tekstvak 51">
+            <a:extLst>
+              <a:ext uri="{FF2B5EF4-FFF2-40B4-BE49-F238E27FC236}">
+                <a16:creationId xmlns:a16="http://schemas.microsoft.com/office/drawing/2014/main" id="{8E878480-B4A0-4029-A619-F932CD0A3F65}"/>
+              </a:ext>
+            </a:extLst>
+          </p:cNvPr>
+          <p:cNvSpPr txBox="1"/>
+          <p:nvPr/>
+        </p:nvSpPr>
+        <p:spPr>
+          <a:xfrm>
+            <a:off x="820890" y="6555768"/>
+            <a:ext cx="1884459" cy="200055"/>
+          </a:xfrm>
+          <a:prstGeom prst="rect">
+            <a:avLst/>
+          </a:prstGeom>
+          <a:noFill/>
+        </p:spPr>
+        <p:txBody>
+          <a:bodyPr wrap="square" rtlCol="0">
+            <a:spAutoFit/>
+          </a:bodyPr>
+          <a:lstStyle/>
+          <a:p>
+            <a:r>
+              <a:rPr lang="nl-NL" sz="700" dirty="0">
+                <a:latin typeface="Arial" panose="020B0604020202020204" pitchFamily="34" charset="0"/>
+                <a:cs typeface="Arial" panose="020B0604020202020204" pitchFamily="34" charset="0"/>
+              </a:rPr>
+              <a:t>*</a:t>
+            </a:r>
+            <a:r>
+              <a:rPr lang="nl-NL" sz="700" dirty="0" err="1">
+                <a:latin typeface="Arial" panose="020B0604020202020204" pitchFamily="34" charset="0"/>
+                <a:cs typeface="Arial" panose="020B0604020202020204" pitchFamily="34" charset="0"/>
+              </a:rPr>
+              <a:t>Ships</a:t>
+            </a:r>
+            <a:r>
+              <a:rPr lang="nl-NL" sz="700" dirty="0">
+                <a:latin typeface="Arial" panose="020B0604020202020204" pitchFamily="34" charset="0"/>
+                <a:cs typeface="Arial" panose="020B0604020202020204" pitchFamily="34" charset="0"/>
+              </a:rPr>
+              <a:t> </a:t>
+            </a:r>
+            <a:r>
+              <a:rPr lang="nl-NL" sz="700" dirty="0" err="1">
+                <a:latin typeface="Arial" panose="020B0604020202020204" pitchFamily="34" charset="0"/>
+                <a:cs typeface="Arial" panose="020B0604020202020204" pitchFamily="34" charset="0"/>
+              </a:rPr>
+              <a:t>scaled</a:t>
+            </a:r>
+            <a:r>
+              <a:rPr lang="nl-NL" sz="700" dirty="0">
+                <a:latin typeface="Arial" panose="020B0604020202020204" pitchFamily="34" charset="0"/>
+                <a:cs typeface="Arial" panose="020B0604020202020204" pitchFamily="34" charset="0"/>
+              </a:rPr>
+              <a:t> </a:t>
+            </a:r>
+            <a:r>
+              <a:rPr lang="nl-NL" sz="700" dirty="0" err="1">
+                <a:latin typeface="Arial" panose="020B0604020202020204" pitchFamily="34" charset="0"/>
+                <a:cs typeface="Arial" panose="020B0604020202020204" pitchFamily="34" charset="0"/>
+              </a:rPr>
+              <a:t>with</a:t>
+            </a:r>
+            <a:r>
+              <a:rPr lang="nl-NL" sz="700" dirty="0">
+                <a:latin typeface="Arial" panose="020B0604020202020204" pitchFamily="34" charset="0"/>
+                <a:cs typeface="Arial" panose="020B0604020202020204" pitchFamily="34" charset="0"/>
+              </a:rPr>
+              <a:t> factor 2 </a:t>
+            </a:r>
+            <a:r>
+              <a:rPr lang="nl-NL" sz="700" dirty="0" err="1">
+                <a:latin typeface="Arial" panose="020B0604020202020204" pitchFamily="34" charset="0"/>
+                <a:cs typeface="Arial" panose="020B0604020202020204" pitchFamily="34" charset="0"/>
+              </a:rPr>
+              <a:t>for</a:t>
+            </a:r>
+            <a:r>
+              <a:rPr lang="nl-NL" sz="700" dirty="0">
+                <a:latin typeface="Arial" panose="020B0604020202020204" pitchFamily="34" charset="0"/>
+                <a:cs typeface="Arial" panose="020B0604020202020204" pitchFamily="34" charset="0"/>
+              </a:rPr>
+              <a:t> </a:t>
+            </a:r>
+            <a:r>
+              <a:rPr lang="nl-NL" sz="700" dirty="0" err="1">
+                <a:latin typeface="Arial" panose="020B0604020202020204" pitchFamily="34" charset="0"/>
+                <a:cs typeface="Arial" panose="020B0604020202020204" pitchFamily="34" charset="0"/>
+              </a:rPr>
+              <a:t>visibility</a:t>
+            </a:r>
+            <a:endParaRPr lang="nl-NL" sz="700" dirty="0">
+              <a:latin typeface="Arial" panose="020B0604020202020204" pitchFamily="34" charset="0"/>
+              <a:cs typeface="Arial" panose="020B0604020202020204" pitchFamily="34" charset="0"/>
+            </a:endParaRPr>
+          </a:p>
+        </p:txBody>
+      </p:sp>
+    </p:spTree>
+    <p:extLst>
+      <p:ext uri="{BB962C8B-B14F-4D97-AF65-F5344CB8AC3E}">
+        <p14:creationId xmlns:p14="http://schemas.microsoft.com/office/powerpoint/2010/main" val="3303994614"/>
+      </p:ext>
+    </p:extLst>
+  </p:cSld>
+  <p:clrMapOvr>
+    <a:masterClrMapping/>
+  </p:clrMapOvr>
+</p:sld>
+</file>
+
+<file path=ppt/slides/slide6.xml><?xml version="1.0" encoding="utf-8"?>
+<p:sld xmlns:a="http://schemas.openxmlformats.org/drawingml/2006/main" xmlns:r="http://schemas.openxmlformats.org/officeDocument/2006/relationships" xmlns:p="http://schemas.openxmlformats.org/presentationml/2006/main">
+  <p:cSld>
+    <p:spTree>
+      <p:nvGrpSpPr>
+        <p:cNvPr id="1" name=""/>
+        <p:cNvGrpSpPr/>
+        <p:nvPr/>
+      </p:nvGrpSpPr>
+      <p:grpSpPr>
+        <a:xfrm>
+          <a:off x="0" y="0"/>
+          <a:ext cx="0" cy="0"/>
+          <a:chOff x="0" y="0"/>
+          <a:chExt cx="0" cy="0"/>
+        </a:xfrm>
+      </p:grpSpPr>
+      <p:grpSp>
+        <p:nvGrpSpPr>
+          <p:cNvPr id="32" name="Groep 31">
+            <a:extLst>
+              <a:ext uri="{FF2B5EF4-FFF2-40B4-BE49-F238E27FC236}">
+                <a16:creationId xmlns:a16="http://schemas.microsoft.com/office/drawing/2014/main" id="{CC44A1F2-04F8-4408-8BB0-6F5AD221D15C}"/>
+              </a:ext>
+            </a:extLst>
+          </p:cNvPr>
+          <p:cNvGrpSpPr/>
+          <p:nvPr/>
+        </p:nvGrpSpPr>
+        <p:grpSpPr>
+          <a:xfrm>
+            <a:off x="0" y="0"/>
+            <a:ext cx="10910878" cy="6858000"/>
+            <a:chOff x="0" y="0"/>
+            <a:chExt cx="10910878" cy="6858000"/>
+          </a:xfrm>
+        </p:grpSpPr>
+        <p:pic>
+          <p:nvPicPr>
+            <p:cNvPr id="4" name="Afbeelding 3">
+              <a:extLst>
+                <a:ext uri="{FF2B5EF4-FFF2-40B4-BE49-F238E27FC236}">
+                  <a16:creationId xmlns:a16="http://schemas.microsoft.com/office/drawing/2014/main" id="{80C58838-E105-4F86-8DE8-D498FCA21339}"/>
+                </a:ext>
+              </a:extLst>
+            </p:cNvPr>
+            <p:cNvPicPr>
+              <a:picLocks noChangeAspect="1"/>
+            </p:cNvPicPr>
+            <p:nvPr/>
+          </p:nvPicPr>
+          <p:blipFill rotWithShape="1">
+            <a:blip r:embed="rId2"/>
+            <a:srcRect l="121" t="9339" r="-1"/>
+            <a:stretch/>
+          </p:blipFill>
+          <p:spPr>
+            <a:xfrm>
+              <a:off x="0" y="0"/>
+              <a:ext cx="9906000" cy="6858000"/>
+            </a:xfrm>
+            <a:prstGeom prst="rect">
+              <a:avLst/>
+            </a:prstGeom>
+          </p:spPr>
+        </p:pic>
+        <p:sp>
+          <p:nvSpPr>
+            <p:cNvPr id="19" name="Tekstvak 18">
+              <a:extLst>
+                <a:ext uri="{FF2B5EF4-FFF2-40B4-BE49-F238E27FC236}">
+                  <a16:creationId xmlns:a16="http://schemas.microsoft.com/office/drawing/2014/main" id="{DCB61516-933B-42EA-880E-D397C8FE5673}"/>
+                </a:ext>
+              </a:extLst>
+            </p:cNvPr>
+            <p:cNvSpPr txBox="1"/>
+            <p:nvPr/>
+          </p:nvSpPr>
+          <p:spPr>
+            <a:xfrm rot="17419521">
+              <a:off x="4106518" y="5671932"/>
+              <a:ext cx="1582310" cy="276999"/>
+            </a:xfrm>
+            <a:prstGeom prst="rect">
+              <a:avLst/>
+            </a:prstGeom>
+            <a:noFill/>
+          </p:spPr>
+          <p:txBody>
+            <a:bodyPr wrap="square" rtlCol="0">
+              <a:spAutoFit/>
+            </a:bodyPr>
+            <a:lstStyle/>
+            <a:p>
+              <a:r>
+                <a:rPr lang="nl-NL" sz="1200" i="1" dirty="0">
+                  <a:solidFill>
+                    <a:schemeClr val="bg1">
+                      <a:lumMod val="50000"/>
+                    </a:schemeClr>
+                  </a:solidFill>
+                  <a:latin typeface="Arial" panose="020B0604020202020204" pitchFamily="34" charset="0"/>
+                  <a:cs typeface="Arial" panose="020B0604020202020204" pitchFamily="34" charset="0"/>
+                </a:rPr>
+                <a:t>Beerkanaal</a:t>
+              </a:r>
+            </a:p>
+          </p:txBody>
+        </p:sp>
+        <p:sp>
+          <p:nvSpPr>
+            <p:cNvPr id="20" name="Tekstvak 19">
+              <a:extLst>
+                <a:ext uri="{FF2B5EF4-FFF2-40B4-BE49-F238E27FC236}">
+                  <a16:creationId xmlns:a16="http://schemas.microsoft.com/office/drawing/2014/main" id="{75C789E5-9C33-4E82-B9BC-74B4D75B549C}"/>
+                </a:ext>
+              </a:extLst>
+            </p:cNvPr>
+            <p:cNvSpPr txBox="1"/>
+            <p:nvPr/>
+          </p:nvSpPr>
+          <p:spPr>
+            <a:xfrm rot="2235370">
+              <a:off x="8230924" y="5241236"/>
+              <a:ext cx="1582310" cy="276999"/>
+            </a:xfrm>
+            <a:prstGeom prst="rect">
+              <a:avLst/>
+            </a:prstGeom>
+            <a:noFill/>
+          </p:spPr>
+          <p:txBody>
+            <a:bodyPr wrap="square" rtlCol="0">
+              <a:spAutoFit/>
+            </a:bodyPr>
+            <a:lstStyle/>
+            <a:p>
+              <a:r>
+                <a:rPr lang="nl-NL" sz="1200" i="1" dirty="0" err="1">
+                  <a:solidFill>
+                    <a:schemeClr val="bg1">
+                      <a:lumMod val="50000"/>
+                    </a:schemeClr>
+                  </a:solidFill>
+                  <a:latin typeface="Arial" panose="020B0604020202020204" pitchFamily="34" charset="0"/>
+                  <a:cs typeface="Arial" panose="020B0604020202020204" pitchFamily="34" charset="0"/>
+                </a:rPr>
+                <a:t>Calandkanaal</a:t>
+              </a:r>
+              <a:endParaRPr lang="nl-NL" sz="1200" i="1" dirty="0">
+                <a:solidFill>
+                  <a:schemeClr val="bg1">
+                    <a:lumMod val="50000"/>
+                  </a:schemeClr>
+                </a:solidFill>
+                <a:latin typeface="Arial" panose="020B0604020202020204" pitchFamily="34" charset="0"/>
+                <a:cs typeface="Arial" panose="020B0604020202020204" pitchFamily="34" charset="0"/>
+              </a:endParaRPr>
+            </a:p>
+          </p:txBody>
+        </p:sp>
+        <p:sp>
+          <p:nvSpPr>
+            <p:cNvPr id="22" name="Tekstvak 21">
+              <a:extLst>
+                <a:ext uri="{FF2B5EF4-FFF2-40B4-BE49-F238E27FC236}">
+                  <a16:creationId xmlns:a16="http://schemas.microsoft.com/office/drawing/2014/main" id="{D21B0735-BB97-416B-8FF1-D2EBC5EFE382}"/>
+                </a:ext>
+              </a:extLst>
+            </p:cNvPr>
+            <p:cNvSpPr txBox="1"/>
+            <p:nvPr/>
+          </p:nvSpPr>
+          <p:spPr>
+            <a:xfrm rot="1264836">
+              <a:off x="73253" y="4334380"/>
+              <a:ext cx="1955478" cy="276999"/>
+            </a:xfrm>
+            <a:prstGeom prst="rect">
+              <a:avLst/>
+            </a:prstGeom>
+            <a:noFill/>
+          </p:spPr>
+          <p:txBody>
+            <a:bodyPr wrap="square" rtlCol="0">
+              <a:spAutoFit/>
+            </a:bodyPr>
+            <a:lstStyle/>
+            <a:p>
+              <a:r>
+                <a:rPr lang="nl-NL" sz="1200" i="1" dirty="0" err="1">
+                  <a:solidFill>
+                    <a:schemeClr val="bg1">
+                      <a:lumMod val="50000"/>
+                    </a:schemeClr>
+                  </a:solidFill>
+                  <a:latin typeface="Arial" panose="020B0604020202020204" pitchFamily="34" charset="0"/>
+                  <a:cs typeface="Arial" panose="020B0604020202020204" pitchFamily="34" charset="0"/>
+                </a:rPr>
+                <a:t>Yangtzekanaal</a:t>
+              </a:r>
+              <a:endParaRPr lang="nl-NL" sz="1200" i="1" dirty="0">
+                <a:solidFill>
+                  <a:schemeClr val="bg1">
+                    <a:lumMod val="50000"/>
+                  </a:schemeClr>
+                </a:solidFill>
+                <a:latin typeface="Arial" panose="020B0604020202020204" pitchFamily="34" charset="0"/>
+                <a:cs typeface="Arial" panose="020B0604020202020204" pitchFamily="34" charset="0"/>
+              </a:endParaRPr>
+            </a:p>
+          </p:txBody>
+        </p:sp>
+        <p:sp>
+          <p:nvSpPr>
+            <p:cNvPr id="23" name="Tekstvak 22">
+              <a:extLst>
+                <a:ext uri="{FF2B5EF4-FFF2-40B4-BE49-F238E27FC236}">
+                  <a16:creationId xmlns:a16="http://schemas.microsoft.com/office/drawing/2014/main" id="{CDFFE1F3-4CA4-44E6-BF1F-29C59FA75107}"/>
+                </a:ext>
+              </a:extLst>
+            </p:cNvPr>
+            <p:cNvSpPr txBox="1"/>
+            <p:nvPr/>
+          </p:nvSpPr>
+          <p:spPr>
+            <a:xfrm rot="1687144">
+              <a:off x="8528708" y="4313192"/>
+              <a:ext cx="2382170" cy="276999"/>
+            </a:xfrm>
+            <a:prstGeom prst="rect">
+              <a:avLst/>
+            </a:prstGeom>
+            <a:noFill/>
+          </p:spPr>
+          <p:txBody>
+            <a:bodyPr wrap="square" rtlCol="0">
+              <a:spAutoFit/>
+            </a:bodyPr>
+            <a:lstStyle/>
+            <a:p>
+              <a:r>
+                <a:rPr lang="nl-NL" sz="1200" i="1" dirty="0">
+                  <a:solidFill>
+                    <a:schemeClr val="bg1">
+                      <a:lumMod val="50000"/>
+                    </a:schemeClr>
+                  </a:solidFill>
+                  <a:latin typeface="Arial" panose="020B0604020202020204" pitchFamily="34" charset="0"/>
+                  <a:cs typeface="Arial" panose="020B0604020202020204" pitchFamily="34" charset="0"/>
+                </a:rPr>
+                <a:t>Nieuwe waterweg</a:t>
+              </a:r>
+            </a:p>
+          </p:txBody>
+        </p:sp>
+        <p:sp>
+          <p:nvSpPr>
+            <p:cNvPr id="24" name="Tekstvak 23">
+              <a:extLst>
+                <a:ext uri="{FF2B5EF4-FFF2-40B4-BE49-F238E27FC236}">
+                  <a16:creationId xmlns:a16="http://schemas.microsoft.com/office/drawing/2014/main" id="{5BF4F42A-2E93-4458-BD0D-589A623DB2AC}"/>
+                </a:ext>
+              </a:extLst>
+            </p:cNvPr>
+            <p:cNvSpPr txBox="1"/>
+            <p:nvPr/>
+          </p:nvSpPr>
+          <p:spPr>
+            <a:xfrm rot="1134460">
+              <a:off x="202426" y="1092061"/>
+              <a:ext cx="1582310" cy="276999"/>
+            </a:xfrm>
+            <a:prstGeom prst="rect">
+              <a:avLst/>
+            </a:prstGeom>
+            <a:noFill/>
+          </p:spPr>
+          <p:txBody>
+            <a:bodyPr wrap="square" rtlCol="0">
+              <a:spAutoFit/>
+            </a:bodyPr>
+            <a:lstStyle/>
+            <a:p>
+              <a:r>
+                <a:rPr lang="nl-NL" sz="1200" i="1" dirty="0">
+                  <a:solidFill>
+                    <a:schemeClr val="bg1">
+                      <a:lumMod val="50000"/>
+                    </a:schemeClr>
+                  </a:solidFill>
+                  <a:latin typeface="Arial" panose="020B0604020202020204" pitchFamily="34" charset="0"/>
+                  <a:cs typeface="Arial" panose="020B0604020202020204" pitchFamily="34" charset="0"/>
+                </a:rPr>
+                <a:t>Maasgeul</a:t>
+              </a:r>
+            </a:p>
+          </p:txBody>
+        </p:sp>
+        <p:sp>
+          <p:nvSpPr>
+            <p:cNvPr id="28" name="Vrije vorm: vorm 27">
+              <a:extLst>
+                <a:ext uri="{FF2B5EF4-FFF2-40B4-BE49-F238E27FC236}">
+                  <a16:creationId xmlns:a16="http://schemas.microsoft.com/office/drawing/2014/main" id="{77292B64-C6EA-44F3-9A60-0D74347862B2}"/>
+                </a:ext>
+              </a:extLst>
+            </p:cNvPr>
+            <p:cNvSpPr/>
+            <p:nvPr/>
+          </p:nvSpPr>
+          <p:spPr>
+            <a:xfrm>
+              <a:off x="4607073" y="2614405"/>
+              <a:ext cx="3791158" cy="1697623"/>
+            </a:xfrm>
+            <a:custGeom>
+              <a:avLst/>
+              <a:gdLst>
+                <a:gd name="connsiteX0" fmla="*/ 0 w 3776870"/>
+                <a:gd name="connsiteY0" fmla="*/ 0 h 1709531"/>
+                <a:gd name="connsiteX1" fmla="*/ 1916265 w 3776870"/>
+                <a:gd name="connsiteY1" fmla="*/ 818985 h 1709531"/>
+                <a:gd name="connsiteX2" fmla="*/ 3776870 w 3776870"/>
+                <a:gd name="connsiteY2" fmla="*/ 1709531 h 1709531"/>
+                <a:gd name="connsiteX0" fmla="*/ 0 w 3776870"/>
+                <a:gd name="connsiteY0" fmla="*/ 0 h 1709531"/>
+                <a:gd name="connsiteX1" fmla="*/ 1923409 w 3776870"/>
+                <a:gd name="connsiteY1" fmla="*/ 823748 h 1709531"/>
+                <a:gd name="connsiteX2" fmla="*/ 3776870 w 3776870"/>
+                <a:gd name="connsiteY2" fmla="*/ 1709531 h 1709531"/>
+                <a:gd name="connsiteX0" fmla="*/ 0 w 3795920"/>
+                <a:gd name="connsiteY0" fmla="*/ 0 h 1700006"/>
+                <a:gd name="connsiteX1" fmla="*/ 1942459 w 3795920"/>
+                <a:gd name="connsiteY1" fmla="*/ 814223 h 1700006"/>
+                <a:gd name="connsiteX2" fmla="*/ 3795920 w 3795920"/>
+                <a:gd name="connsiteY2" fmla="*/ 1700006 h 1700006"/>
+                <a:gd name="connsiteX0" fmla="*/ 0 w 3805445"/>
+                <a:gd name="connsiteY0" fmla="*/ 0 h 1709531"/>
+                <a:gd name="connsiteX1" fmla="*/ 1951984 w 3805445"/>
+                <a:gd name="connsiteY1" fmla="*/ 823748 h 1709531"/>
+                <a:gd name="connsiteX2" fmla="*/ 3805445 w 3805445"/>
+                <a:gd name="connsiteY2" fmla="*/ 1709531 h 1709531"/>
+                <a:gd name="connsiteX0" fmla="*/ 0 w 3817352"/>
+                <a:gd name="connsiteY0" fmla="*/ 0 h 1752393"/>
+                <a:gd name="connsiteX1" fmla="*/ 1951984 w 3817352"/>
+                <a:gd name="connsiteY1" fmla="*/ 823748 h 1752393"/>
+                <a:gd name="connsiteX2" fmla="*/ 3817352 w 3817352"/>
+                <a:gd name="connsiteY2" fmla="*/ 1752393 h 1752393"/>
+                <a:gd name="connsiteX0" fmla="*/ 0 w 3817352"/>
+                <a:gd name="connsiteY0" fmla="*/ 0 h 1735724"/>
+                <a:gd name="connsiteX1" fmla="*/ 1951984 w 3817352"/>
+                <a:gd name="connsiteY1" fmla="*/ 823748 h 1735724"/>
+                <a:gd name="connsiteX2" fmla="*/ 3817352 w 3817352"/>
+                <a:gd name="connsiteY2" fmla="*/ 1735724 h 1735724"/>
+                <a:gd name="connsiteX0" fmla="*/ 0 w 3817352"/>
+                <a:gd name="connsiteY0" fmla="*/ 0 h 1735724"/>
+                <a:gd name="connsiteX1" fmla="*/ 1951984 w 3817352"/>
+                <a:gd name="connsiteY1" fmla="*/ 823748 h 1735724"/>
+                <a:gd name="connsiteX2" fmla="*/ 3817352 w 3817352"/>
+                <a:gd name="connsiteY2" fmla="*/ 1735724 h 1735724"/>
+                <a:gd name="connsiteX0" fmla="*/ 0 w 3793539"/>
+                <a:gd name="connsiteY0" fmla="*/ 0 h 1735724"/>
+                <a:gd name="connsiteX1" fmla="*/ 1951984 w 3793539"/>
+                <a:gd name="connsiteY1" fmla="*/ 823748 h 1735724"/>
+                <a:gd name="connsiteX2" fmla="*/ 3793539 w 3793539"/>
+                <a:gd name="connsiteY2" fmla="*/ 1735724 h 1735724"/>
+                <a:gd name="connsiteX0" fmla="*/ 0 w 3798301"/>
+                <a:gd name="connsiteY0" fmla="*/ 0 h 1728580"/>
+                <a:gd name="connsiteX1" fmla="*/ 1951984 w 3798301"/>
+                <a:gd name="connsiteY1" fmla="*/ 823748 h 1728580"/>
+                <a:gd name="connsiteX2" fmla="*/ 3798301 w 3798301"/>
+                <a:gd name="connsiteY2" fmla="*/ 1728580 h 1728580"/>
+                <a:gd name="connsiteX0" fmla="*/ 0 w 3798301"/>
+                <a:gd name="connsiteY0" fmla="*/ 0 h 1728580"/>
+                <a:gd name="connsiteX1" fmla="*/ 1951984 w 3798301"/>
+                <a:gd name="connsiteY1" fmla="*/ 823748 h 1728580"/>
+                <a:gd name="connsiteX2" fmla="*/ 3798301 w 3798301"/>
+                <a:gd name="connsiteY2" fmla="*/ 1728580 h 1728580"/>
+                <a:gd name="connsiteX0" fmla="*/ 0 w 3798301"/>
+                <a:gd name="connsiteY0" fmla="*/ 0 h 1728580"/>
+                <a:gd name="connsiteX1" fmla="*/ 1951984 w 3798301"/>
+                <a:gd name="connsiteY1" fmla="*/ 823748 h 1728580"/>
+                <a:gd name="connsiteX2" fmla="*/ 3798301 w 3798301"/>
+                <a:gd name="connsiteY2" fmla="*/ 1728580 h 1728580"/>
+                <a:gd name="connsiteX0" fmla="*/ 0 w 3781632"/>
+                <a:gd name="connsiteY0" fmla="*/ 0 h 1700005"/>
+                <a:gd name="connsiteX1" fmla="*/ 1951984 w 3781632"/>
+                <a:gd name="connsiteY1" fmla="*/ 823748 h 1700005"/>
+                <a:gd name="connsiteX2" fmla="*/ 3781632 w 3781632"/>
+                <a:gd name="connsiteY2" fmla="*/ 1700005 h 1700005"/>
+                <a:gd name="connsiteX0" fmla="*/ 0 w 3800682"/>
+                <a:gd name="connsiteY0" fmla="*/ 0 h 1711911"/>
+                <a:gd name="connsiteX1" fmla="*/ 1951984 w 3800682"/>
+                <a:gd name="connsiteY1" fmla="*/ 823748 h 1711911"/>
+                <a:gd name="connsiteX2" fmla="*/ 3800682 w 3800682"/>
+                <a:gd name="connsiteY2" fmla="*/ 1711911 h 1711911"/>
+                <a:gd name="connsiteX0" fmla="*/ 0 w 3743532"/>
+                <a:gd name="connsiteY0" fmla="*/ 0 h 1676193"/>
+                <a:gd name="connsiteX1" fmla="*/ 1951984 w 3743532"/>
+                <a:gd name="connsiteY1" fmla="*/ 823748 h 1676193"/>
+                <a:gd name="connsiteX2" fmla="*/ 3743532 w 3743532"/>
+                <a:gd name="connsiteY2" fmla="*/ 1676193 h 1676193"/>
+                <a:gd name="connsiteX0" fmla="*/ 0 w 3791157"/>
+                <a:gd name="connsiteY0" fmla="*/ 0 h 1702386"/>
+                <a:gd name="connsiteX1" fmla="*/ 1951984 w 3791157"/>
+                <a:gd name="connsiteY1" fmla="*/ 823748 h 1702386"/>
+                <a:gd name="connsiteX2" fmla="*/ 3791157 w 3791157"/>
+                <a:gd name="connsiteY2" fmla="*/ 1702386 h 1702386"/>
+                <a:gd name="connsiteX0" fmla="*/ 0 w 3776869"/>
+                <a:gd name="connsiteY0" fmla="*/ 0 h 1685717"/>
+                <a:gd name="connsiteX1" fmla="*/ 1951984 w 3776869"/>
+                <a:gd name="connsiteY1" fmla="*/ 823748 h 1685717"/>
+                <a:gd name="connsiteX2" fmla="*/ 3776869 w 3776869"/>
+                <a:gd name="connsiteY2" fmla="*/ 1685717 h 1685717"/>
+                <a:gd name="connsiteX0" fmla="*/ 0 w 3776869"/>
+                <a:gd name="connsiteY0" fmla="*/ 0 h 1685717"/>
+                <a:gd name="connsiteX1" fmla="*/ 1951984 w 3776869"/>
+                <a:gd name="connsiteY1" fmla="*/ 823748 h 1685717"/>
+                <a:gd name="connsiteX2" fmla="*/ 3776869 w 3776869"/>
+                <a:gd name="connsiteY2" fmla="*/ 1685717 h 1685717"/>
+                <a:gd name="connsiteX0" fmla="*/ 0 w 3776869"/>
+                <a:gd name="connsiteY0" fmla="*/ 0 h 1685717"/>
+                <a:gd name="connsiteX1" fmla="*/ 1951984 w 3776869"/>
+                <a:gd name="connsiteY1" fmla="*/ 823748 h 1685717"/>
+                <a:gd name="connsiteX2" fmla="*/ 3776869 w 3776869"/>
+                <a:gd name="connsiteY2" fmla="*/ 1685717 h 1685717"/>
+                <a:gd name="connsiteX0" fmla="*/ 0 w 3776869"/>
+                <a:gd name="connsiteY0" fmla="*/ 0 h 1685717"/>
+                <a:gd name="connsiteX1" fmla="*/ 1951984 w 3776869"/>
+                <a:gd name="connsiteY1" fmla="*/ 823748 h 1685717"/>
+                <a:gd name="connsiteX2" fmla="*/ 3776869 w 3776869"/>
+                <a:gd name="connsiteY2" fmla="*/ 1685717 h 1685717"/>
+                <a:gd name="connsiteX0" fmla="*/ 0 w 3767344"/>
+                <a:gd name="connsiteY0" fmla="*/ 0 h 1688098"/>
+                <a:gd name="connsiteX1" fmla="*/ 1951984 w 3767344"/>
+                <a:gd name="connsiteY1" fmla="*/ 823748 h 1688098"/>
+                <a:gd name="connsiteX2" fmla="*/ 3767344 w 3767344"/>
+                <a:gd name="connsiteY2" fmla="*/ 1688098 h 1688098"/>
+                <a:gd name="connsiteX0" fmla="*/ 0 w 3767344"/>
+                <a:gd name="connsiteY0" fmla="*/ 0 h 1688098"/>
+                <a:gd name="connsiteX1" fmla="*/ 1951984 w 3767344"/>
+                <a:gd name="connsiteY1" fmla="*/ 823748 h 1688098"/>
+                <a:gd name="connsiteX2" fmla="*/ 3767344 w 3767344"/>
+                <a:gd name="connsiteY2" fmla="*/ 1688098 h 1688098"/>
+                <a:gd name="connsiteX0" fmla="*/ 0 w 3791157"/>
+                <a:gd name="connsiteY0" fmla="*/ 0 h 1688098"/>
+                <a:gd name="connsiteX1" fmla="*/ 1975797 w 3791157"/>
+                <a:gd name="connsiteY1" fmla="*/ 823748 h 1688098"/>
+                <a:gd name="connsiteX2" fmla="*/ 3791157 w 3791157"/>
+                <a:gd name="connsiteY2" fmla="*/ 1688098 h 1688098"/>
+                <a:gd name="connsiteX0" fmla="*/ 0 w 3779251"/>
+                <a:gd name="connsiteY0" fmla="*/ 0 h 1688098"/>
+                <a:gd name="connsiteX1" fmla="*/ 1963891 w 3779251"/>
+                <a:gd name="connsiteY1" fmla="*/ 823748 h 1688098"/>
+                <a:gd name="connsiteX2" fmla="*/ 3779251 w 3779251"/>
+                <a:gd name="connsiteY2" fmla="*/ 1688098 h 1688098"/>
+                <a:gd name="connsiteX0" fmla="*/ 0 w 3788776"/>
+                <a:gd name="connsiteY0" fmla="*/ 0 h 1700004"/>
+                <a:gd name="connsiteX1" fmla="*/ 1973416 w 3788776"/>
+                <a:gd name="connsiteY1" fmla="*/ 835654 h 1700004"/>
+                <a:gd name="connsiteX2" fmla="*/ 3788776 w 3788776"/>
+                <a:gd name="connsiteY2" fmla="*/ 1700004 h 1700004"/>
+                <a:gd name="connsiteX0" fmla="*/ 0 w 3800683"/>
+                <a:gd name="connsiteY0" fmla="*/ 0 h 1700004"/>
+                <a:gd name="connsiteX1" fmla="*/ 1985323 w 3800683"/>
+                <a:gd name="connsiteY1" fmla="*/ 835654 h 1700004"/>
+                <a:gd name="connsiteX2" fmla="*/ 3800683 w 3800683"/>
+                <a:gd name="connsiteY2" fmla="*/ 1700004 h 1700004"/>
+                <a:gd name="connsiteX0" fmla="*/ 0 w 3800683"/>
+                <a:gd name="connsiteY0" fmla="*/ 0 h 1700004"/>
+                <a:gd name="connsiteX1" fmla="*/ 1985323 w 3800683"/>
+                <a:gd name="connsiteY1" fmla="*/ 835654 h 1700004"/>
+                <a:gd name="connsiteX2" fmla="*/ 3800683 w 3800683"/>
+                <a:gd name="connsiteY2" fmla="*/ 1700004 h 1700004"/>
+                <a:gd name="connsiteX0" fmla="*/ 0 w 3791158"/>
+                <a:gd name="connsiteY0" fmla="*/ 0 h 1697623"/>
+                <a:gd name="connsiteX1" fmla="*/ 1975798 w 3791158"/>
+                <a:gd name="connsiteY1" fmla="*/ 833273 h 1697623"/>
+                <a:gd name="connsiteX2" fmla="*/ 3791158 w 3791158"/>
+                <a:gd name="connsiteY2" fmla="*/ 1697623 h 1697623"/>
+              </a:gdLst>
+              <a:ahLst/>
+              <a:cxnLst>
+                <a:cxn ang="0">
+                  <a:pos x="connsiteX0" y="connsiteY0"/>
+                </a:cxn>
+                <a:cxn ang="0">
+                  <a:pos x="connsiteX1" y="connsiteY1"/>
+                </a:cxn>
+                <a:cxn ang="0">
+                  <a:pos x="connsiteX2" y="connsiteY2"/>
+                </a:cxn>
+              </a:cxnLst>
+              <a:rect l="l" t="t" r="r" b="b"/>
+              <a:pathLst>
+                <a:path w="3791158" h="1697623">
+                  <a:moveTo>
+                    <a:pt x="0" y="0"/>
+                  </a:moveTo>
+                  <a:cubicBezTo>
+                    <a:pt x="643393" y="267031"/>
+                    <a:pt x="1343938" y="550336"/>
+                    <a:pt x="1975798" y="833273"/>
+                  </a:cubicBezTo>
+                  <a:cubicBezTo>
+                    <a:pt x="2607658" y="1116210"/>
+                    <a:pt x="3114717" y="1347641"/>
+                    <a:pt x="3791158" y="1697623"/>
+                  </a:cubicBezTo>
+                </a:path>
+              </a:pathLst>
+            </a:custGeom>
+            <a:noFill/>
+            <a:ln w="38100" cap="rnd">
+              <a:solidFill>
+                <a:srgbClr val="F2F2F2"/>
+              </a:solidFill>
+              <a:headEnd type="oval" w="med" len="sm"/>
+              <a:tailEnd type="oval" w="med" len="lg"/>
+            </a:ln>
+          </p:spPr>
+          <p:style>
+            <a:lnRef idx="2">
+              <a:schemeClr val="accent1">
+                <a:shade val="50000"/>
+              </a:schemeClr>
+            </a:lnRef>
+            <a:fillRef idx="1">
+              <a:schemeClr val="accent1"/>
+            </a:fillRef>
+            <a:effectRef idx="0">
+              <a:schemeClr val="accent1"/>
+            </a:effectRef>
+            <a:fontRef idx="minor">
+              <a:schemeClr val="lt1"/>
+            </a:fontRef>
+          </p:style>
+          <p:txBody>
+            <a:bodyPr rtlCol="0" anchor="ctr"/>
+            <a:lstStyle/>
+            <a:p>
+              <a:pPr algn="ctr"/>
+              <a:endParaRPr lang="nl-NL"/>
+            </a:p>
+          </p:txBody>
+        </p:sp>
+        <p:sp>
+          <p:nvSpPr>
+            <p:cNvPr id="29" name="Tekstvak 28">
+              <a:extLst>
+                <a:ext uri="{FF2B5EF4-FFF2-40B4-BE49-F238E27FC236}">
+                  <a16:creationId xmlns:a16="http://schemas.microsoft.com/office/drawing/2014/main" id="{FA43A1F9-4808-42A0-9663-8AEA70E4953C}"/>
+                </a:ext>
+              </a:extLst>
+            </p:cNvPr>
+            <p:cNvSpPr txBox="1"/>
+            <p:nvPr/>
+          </p:nvSpPr>
+          <p:spPr>
+            <a:xfrm>
+              <a:off x="3342500" y="264916"/>
+              <a:ext cx="1582310" cy="276999"/>
+            </a:xfrm>
+            <a:prstGeom prst="rect">
+              <a:avLst/>
+            </a:prstGeom>
+            <a:noFill/>
+          </p:spPr>
+          <p:txBody>
+            <a:bodyPr wrap="square" rtlCol="0">
+              <a:spAutoFit/>
+            </a:bodyPr>
+            <a:lstStyle/>
+            <a:p>
+              <a:r>
+                <a:rPr lang="nl-NL" sz="1200" i="1" dirty="0">
+                  <a:solidFill>
+                    <a:schemeClr val="bg1">
+                      <a:lumMod val="50000"/>
+                    </a:schemeClr>
+                  </a:solidFill>
+                  <a:latin typeface="Arial" panose="020B0604020202020204" pitchFamily="34" charset="0"/>
+                  <a:cs typeface="Arial" panose="020B0604020202020204" pitchFamily="34" charset="0"/>
+                </a:rPr>
+                <a:t>North </a:t>
+              </a:r>
+              <a:r>
+                <a:rPr lang="nl-NL" sz="1200" i="1" dirty="0" err="1">
+                  <a:solidFill>
+                    <a:schemeClr val="bg1">
+                      <a:lumMod val="50000"/>
+                    </a:schemeClr>
+                  </a:solidFill>
+                  <a:latin typeface="Arial" panose="020B0604020202020204" pitchFamily="34" charset="0"/>
+                  <a:cs typeface="Arial" panose="020B0604020202020204" pitchFamily="34" charset="0"/>
+                </a:rPr>
+                <a:t>sea</a:t>
+              </a:r>
+              <a:endParaRPr lang="nl-NL" sz="1200" i="1" dirty="0">
+                <a:solidFill>
+                  <a:schemeClr val="bg1">
+                    <a:lumMod val="50000"/>
+                  </a:schemeClr>
+                </a:solidFill>
+                <a:latin typeface="Arial" panose="020B0604020202020204" pitchFamily="34" charset="0"/>
+                <a:cs typeface="Arial" panose="020B0604020202020204" pitchFamily="34" charset="0"/>
+              </a:endParaRPr>
+            </a:p>
+          </p:txBody>
+        </p:sp>
+        <p:sp>
+          <p:nvSpPr>
+            <p:cNvPr id="30" name="Vrije vorm: vorm 29">
+              <a:extLst>
+                <a:ext uri="{FF2B5EF4-FFF2-40B4-BE49-F238E27FC236}">
+                  <a16:creationId xmlns:a16="http://schemas.microsoft.com/office/drawing/2014/main" id="{41F770EE-6251-423A-B7F6-0352834C8E10}"/>
+                </a:ext>
+              </a:extLst>
+            </p:cNvPr>
+            <p:cNvSpPr/>
+            <p:nvPr/>
+          </p:nvSpPr>
+          <p:spPr>
+            <a:xfrm>
+              <a:off x="1435247" y="623680"/>
+              <a:ext cx="5778073" cy="1985278"/>
+            </a:xfrm>
+            <a:custGeom>
+              <a:avLst/>
+              <a:gdLst>
+                <a:gd name="connsiteX0" fmla="*/ 0 w 3776870"/>
+                <a:gd name="connsiteY0" fmla="*/ 0 h 1709531"/>
+                <a:gd name="connsiteX1" fmla="*/ 1916265 w 3776870"/>
+                <a:gd name="connsiteY1" fmla="*/ 818985 h 1709531"/>
+                <a:gd name="connsiteX2" fmla="*/ 3776870 w 3776870"/>
+                <a:gd name="connsiteY2" fmla="*/ 1709531 h 1709531"/>
+                <a:gd name="connsiteX0" fmla="*/ 0 w 3776870"/>
+                <a:gd name="connsiteY0" fmla="*/ 0 h 1709531"/>
+                <a:gd name="connsiteX1" fmla="*/ 1923409 w 3776870"/>
+                <a:gd name="connsiteY1" fmla="*/ 823748 h 1709531"/>
+                <a:gd name="connsiteX2" fmla="*/ 3776870 w 3776870"/>
+                <a:gd name="connsiteY2" fmla="*/ 1709531 h 1709531"/>
+                <a:gd name="connsiteX0" fmla="*/ 0 w 3795920"/>
+                <a:gd name="connsiteY0" fmla="*/ 0 h 1700006"/>
+                <a:gd name="connsiteX1" fmla="*/ 1942459 w 3795920"/>
+                <a:gd name="connsiteY1" fmla="*/ 814223 h 1700006"/>
+                <a:gd name="connsiteX2" fmla="*/ 3795920 w 3795920"/>
+                <a:gd name="connsiteY2" fmla="*/ 1700006 h 1700006"/>
+                <a:gd name="connsiteX0" fmla="*/ 0 w 3805445"/>
+                <a:gd name="connsiteY0" fmla="*/ 0 h 1709531"/>
+                <a:gd name="connsiteX1" fmla="*/ 1951984 w 3805445"/>
+                <a:gd name="connsiteY1" fmla="*/ 823748 h 1709531"/>
+                <a:gd name="connsiteX2" fmla="*/ 3805445 w 3805445"/>
+                <a:gd name="connsiteY2" fmla="*/ 1709531 h 1709531"/>
+                <a:gd name="connsiteX0" fmla="*/ 0 w 3817352"/>
+                <a:gd name="connsiteY0" fmla="*/ 0 h 1752393"/>
+                <a:gd name="connsiteX1" fmla="*/ 1951984 w 3817352"/>
+                <a:gd name="connsiteY1" fmla="*/ 823748 h 1752393"/>
+                <a:gd name="connsiteX2" fmla="*/ 3817352 w 3817352"/>
+                <a:gd name="connsiteY2" fmla="*/ 1752393 h 1752393"/>
+                <a:gd name="connsiteX0" fmla="*/ 0 w 3817352"/>
+                <a:gd name="connsiteY0" fmla="*/ 0 h 1735724"/>
+                <a:gd name="connsiteX1" fmla="*/ 1951984 w 3817352"/>
+                <a:gd name="connsiteY1" fmla="*/ 823748 h 1735724"/>
+                <a:gd name="connsiteX2" fmla="*/ 3817352 w 3817352"/>
+                <a:gd name="connsiteY2" fmla="*/ 1735724 h 1735724"/>
+                <a:gd name="connsiteX0" fmla="*/ 0 w 3817352"/>
+                <a:gd name="connsiteY0" fmla="*/ 0 h 1735724"/>
+                <a:gd name="connsiteX1" fmla="*/ 1951984 w 3817352"/>
+                <a:gd name="connsiteY1" fmla="*/ 823748 h 1735724"/>
+                <a:gd name="connsiteX2" fmla="*/ 3817352 w 3817352"/>
+                <a:gd name="connsiteY2" fmla="*/ 1735724 h 1735724"/>
+                <a:gd name="connsiteX0" fmla="*/ 0 w 3793539"/>
+                <a:gd name="connsiteY0" fmla="*/ 0 h 1735724"/>
+                <a:gd name="connsiteX1" fmla="*/ 1951984 w 3793539"/>
+                <a:gd name="connsiteY1" fmla="*/ 823748 h 1735724"/>
+                <a:gd name="connsiteX2" fmla="*/ 3793539 w 3793539"/>
+                <a:gd name="connsiteY2" fmla="*/ 1735724 h 1735724"/>
+                <a:gd name="connsiteX0" fmla="*/ 0 w 3798301"/>
+                <a:gd name="connsiteY0" fmla="*/ 0 h 1728580"/>
+                <a:gd name="connsiteX1" fmla="*/ 1951984 w 3798301"/>
+                <a:gd name="connsiteY1" fmla="*/ 823748 h 1728580"/>
+                <a:gd name="connsiteX2" fmla="*/ 3798301 w 3798301"/>
+                <a:gd name="connsiteY2" fmla="*/ 1728580 h 1728580"/>
+                <a:gd name="connsiteX0" fmla="*/ 0 w 3798301"/>
+                <a:gd name="connsiteY0" fmla="*/ 0 h 1728580"/>
+                <a:gd name="connsiteX1" fmla="*/ 1951984 w 3798301"/>
+                <a:gd name="connsiteY1" fmla="*/ 823748 h 1728580"/>
+                <a:gd name="connsiteX2" fmla="*/ 3798301 w 3798301"/>
+                <a:gd name="connsiteY2" fmla="*/ 1728580 h 1728580"/>
+                <a:gd name="connsiteX0" fmla="*/ 0 w 3798301"/>
+                <a:gd name="connsiteY0" fmla="*/ 0 h 1728580"/>
+                <a:gd name="connsiteX1" fmla="*/ 1951984 w 3798301"/>
+                <a:gd name="connsiteY1" fmla="*/ 823748 h 1728580"/>
+                <a:gd name="connsiteX2" fmla="*/ 3798301 w 3798301"/>
+                <a:gd name="connsiteY2" fmla="*/ 1728580 h 1728580"/>
+                <a:gd name="connsiteX0" fmla="*/ 0 w 3781632"/>
+                <a:gd name="connsiteY0" fmla="*/ 0 h 1700005"/>
+                <a:gd name="connsiteX1" fmla="*/ 1951984 w 3781632"/>
+                <a:gd name="connsiteY1" fmla="*/ 823748 h 1700005"/>
+                <a:gd name="connsiteX2" fmla="*/ 3781632 w 3781632"/>
+                <a:gd name="connsiteY2" fmla="*/ 1700005 h 1700005"/>
+                <a:gd name="connsiteX0" fmla="*/ 0 w 3800682"/>
+                <a:gd name="connsiteY0" fmla="*/ 0 h 1711911"/>
+                <a:gd name="connsiteX1" fmla="*/ 1951984 w 3800682"/>
+                <a:gd name="connsiteY1" fmla="*/ 823748 h 1711911"/>
+                <a:gd name="connsiteX2" fmla="*/ 3800682 w 3800682"/>
+                <a:gd name="connsiteY2" fmla="*/ 1711911 h 1711911"/>
+                <a:gd name="connsiteX0" fmla="*/ 0 w 3743532"/>
+                <a:gd name="connsiteY0" fmla="*/ 0 h 1676193"/>
+                <a:gd name="connsiteX1" fmla="*/ 1951984 w 3743532"/>
+                <a:gd name="connsiteY1" fmla="*/ 823748 h 1676193"/>
+                <a:gd name="connsiteX2" fmla="*/ 3743532 w 3743532"/>
+                <a:gd name="connsiteY2" fmla="*/ 1676193 h 1676193"/>
+                <a:gd name="connsiteX0" fmla="*/ 0 w 3791157"/>
+                <a:gd name="connsiteY0" fmla="*/ 0 h 1702386"/>
+                <a:gd name="connsiteX1" fmla="*/ 1951984 w 3791157"/>
+                <a:gd name="connsiteY1" fmla="*/ 823748 h 1702386"/>
+                <a:gd name="connsiteX2" fmla="*/ 3791157 w 3791157"/>
+                <a:gd name="connsiteY2" fmla="*/ 1702386 h 1702386"/>
+                <a:gd name="connsiteX0" fmla="*/ 0 w 3776869"/>
+                <a:gd name="connsiteY0" fmla="*/ 0 h 1685717"/>
+                <a:gd name="connsiteX1" fmla="*/ 1951984 w 3776869"/>
+                <a:gd name="connsiteY1" fmla="*/ 823748 h 1685717"/>
+                <a:gd name="connsiteX2" fmla="*/ 3776869 w 3776869"/>
+                <a:gd name="connsiteY2" fmla="*/ 1685717 h 1685717"/>
+                <a:gd name="connsiteX0" fmla="*/ 0 w 3776869"/>
+                <a:gd name="connsiteY0" fmla="*/ 0 h 1685717"/>
+                <a:gd name="connsiteX1" fmla="*/ 1951984 w 3776869"/>
+                <a:gd name="connsiteY1" fmla="*/ 823748 h 1685717"/>
+                <a:gd name="connsiteX2" fmla="*/ 3776869 w 3776869"/>
+                <a:gd name="connsiteY2" fmla="*/ 1685717 h 1685717"/>
+                <a:gd name="connsiteX0" fmla="*/ 0 w 3776869"/>
+                <a:gd name="connsiteY0" fmla="*/ 0 h 1685717"/>
+                <a:gd name="connsiteX1" fmla="*/ 1951984 w 3776869"/>
+                <a:gd name="connsiteY1" fmla="*/ 823748 h 1685717"/>
+                <a:gd name="connsiteX2" fmla="*/ 3776869 w 3776869"/>
+                <a:gd name="connsiteY2" fmla="*/ 1685717 h 1685717"/>
+                <a:gd name="connsiteX0" fmla="*/ 0 w 3776869"/>
+                <a:gd name="connsiteY0" fmla="*/ 0 h 1685717"/>
+                <a:gd name="connsiteX1" fmla="*/ 1951984 w 3776869"/>
+                <a:gd name="connsiteY1" fmla="*/ 823748 h 1685717"/>
+                <a:gd name="connsiteX2" fmla="*/ 3776869 w 3776869"/>
+                <a:gd name="connsiteY2" fmla="*/ 1685717 h 1685717"/>
+                <a:gd name="connsiteX0" fmla="*/ 0 w 3767344"/>
+                <a:gd name="connsiteY0" fmla="*/ 0 h 1688098"/>
+                <a:gd name="connsiteX1" fmla="*/ 1951984 w 3767344"/>
+                <a:gd name="connsiteY1" fmla="*/ 823748 h 1688098"/>
+                <a:gd name="connsiteX2" fmla="*/ 3767344 w 3767344"/>
+                <a:gd name="connsiteY2" fmla="*/ 1688098 h 1688098"/>
+                <a:gd name="connsiteX0" fmla="*/ 0 w 3767344"/>
+                <a:gd name="connsiteY0" fmla="*/ 0 h 1688098"/>
+                <a:gd name="connsiteX1" fmla="*/ 1951984 w 3767344"/>
+                <a:gd name="connsiteY1" fmla="*/ 823748 h 1688098"/>
+                <a:gd name="connsiteX2" fmla="*/ 3767344 w 3767344"/>
+                <a:gd name="connsiteY2" fmla="*/ 1688098 h 1688098"/>
+                <a:gd name="connsiteX0" fmla="*/ 0 w 3791157"/>
+                <a:gd name="connsiteY0" fmla="*/ 0 h 1688098"/>
+                <a:gd name="connsiteX1" fmla="*/ 1975797 w 3791157"/>
+                <a:gd name="connsiteY1" fmla="*/ 823748 h 1688098"/>
+                <a:gd name="connsiteX2" fmla="*/ 3791157 w 3791157"/>
+                <a:gd name="connsiteY2" fmla="*/ 1688098 h 1688098"/>
+                <a:gd name="connsiteX0" fmla="*/ 0 w 3779251"/>
+                <a:gd name="connsiteY0" fmla="*/ 0 h 1688098"/>
+                <a:gd name="connsiteX1" fmla="*/ 1963891 w 3779251"/>
+                <a:gd name="connsiteY1" fmla="*/ 823748 h 1688098"/>
+                <a:gd name="connsiteX2" fmla="*/ 3779251 w 3779251"/>
+                <a:gd name="connsiteY2" fmla="*/ 1688098 h 1688098"/>
+                <a:gd name="connsiteX0" fmla="*/ 0 w 3788776"/>
+                <a:gd name="connsiteY0" fmla="*/ 0 h 1700004"/>
+                <a:gd name="connsiteX1" fmla="*/ 1973416 w 3788776"/>
+                <a:gd name="connsiteY1" fmla="*/ 835654 h 1700004"/>
+                <a:gd name="connsiteX2" fmla="*/ 3788776 w 3788776"/>
+                <a:gd name="connsiteY2" fmla="*/ 1700004 h 1700004"/>
+                <a:gd name="connsiteX0" fmla="*/ 0 w 3800683"/>
+                <a:gd name="connsiteY0" fmla="*/ 0 h 1700004"/>
+                <a:gd name="connsiteX1" fmla="*/ 1985323 w 3800683"/>
+                <a:gd name="connsiteY1" fmla="*/ 835654 h 1700004"/>
+                <a:gd name="connsiteX2" fmla="*/ 3800683 w 3800683"/>
+                <a:gd name="connsiteY2" fmla="*/ 1700004 h 1700004"/>
+                <a:gd name="connsiteX0" fmla="*/ 0 w 3800683"/>
+                <a:gd name="connsiteY0" fmla="*/ 0 h 1700004"/>
+                <a:gd name="connsiteX1" fmla="*/ 1985323 w 3800683"/>
+                <a:gd name="connsiteY1" fmla="*/ 835654 h 1700004"/>
+                <a:gd name="connsiteX2" fmla="*/ 3800683 w 3800683"/>
+                <a:gd name="connsiteY2" fmla="*/ 1700004 h 1700004"/>
+                <a:gd name="connsiteX0" fmla="*/ 0 w 3791158"/>
+                <a:gd name="connsiteY0" fmla="*/ 0 h 1697623"/>
+                <a:gd name="connsiteX1" fmla="*/ 1975798 w 3791158"/>
+                <a:gd name="connsiteY1" fmla="*/ 833273 h 1697623"/>
+                <a:gd name="connsiteX2" fmla="*/ 3791158 w 3791158"/>
+                <a:gd name="connsiteY2" fmla="*/ 1697623 h 1697623"/>
+                <a:gd name="connsiteX0" fmla="*/ 0 w 2943433"/>
+                <a:gd name="connsiteY0" fmla="*/ 0 h 1154698"/>
+                <a:gd name="connsiteX1" fmla="*/ 1975798 w 2943433"/>
+                <a:gd name="connsiteY1" fmla="*/ 833273 h 1154698"/>
+                <a:gd name="connsiteX2" fmla="*/ 2943433 w 2943433"/>
+                <a:gd name="connsiteY2" fmla="*/ 1154698 h 1154698"/>
+                <a:gd name="connsiteX0" fmla="*/ 0 w 2943433"/>
+                <a:gd name="connsiteY0" fmla="*/ 0 h 1154698"/>
+                <a:gd name="connsiteX1" fmla="*/ 2943433 w 2943433"/>
+                <a:gd name="connsiteY1" fmla="*/ 1154698 h 1154698"/>
+                <a:gd name="connsiteX0" fmla="*/ 0 w 3172033"/>
+                <a:gd name="connsiteY0" fmla="*/ 0 h 1154698"/>
+                <a:gd name="connsiteX1" fmla="*/ 3172033 w 3172033"/>
+                <a:gd name="connsiteY1" fmla="*/ 1154698 h 1154698"/>
+                <a:gd name="connsiteX0" fmla="*/ 0 w 3423493"/>
+                <a:gd name="connsiteY0" fmla="*/ 0 h 1253758"/>
+                <a:gd name="connsiteX1" fmla="*/ 3423493 w 3423493"/>
+                <a:gd name="connsiteY1" fmla="*/ 1253758 h 1253758"/>
+                <a:gd name="connsiteX0" fmla="*/ 0 w 5724733"/>
+                <a:gd name="connsiteY0" fmla="*/ 0 h 2046238"/>
+                <a:gd name="connsiteX1" fmla="*/ 5724733 w 5724733"/>
+                <a:gd name="connsiteY1" fmla="*/ 2046238 h 2046238"/>
+                <a:gd name="connsiteX0" fmla="*/ 0 w 5778073"/>
+                <a:gd name="connsiteY0" fmla="*/ 0 h 1985278"/>
+                <a:gd name="connsiteX1" fmla="*/ 5778073 w 5778073"/>
+                <a:gd name="connsiteY1" fmla="*/ 1985278 h 1985278"/>
+              </a:gdLst>
+              <a:ahLst/>
+              <a:cxnLst>
+                <a:cxn ang="0">
+                  <a:pos x="connsiteX0" y="connsiteY0"/>
+                </a:cxn>
+                <a:cxn ang="0">
+                  <a:pos x="connsiteX1" y="connsiteY1"/>
+                </a:cxn>
+              </a:cxnLst>
+              <a:rect l="l" t="t" r="r" b="b"/>
+              <a:pathLst>
+                <a:path w="5778073" h="1985278">
+                  <a:moveTo>
+                    <a:pt x="0" y="0"/>
+                  </a:moveTo>
+                  <a:lnTo>
+                    <a:pt x="5778073" y="1985278"/>
+                  </a:lnTo>
+                </a:path>
+              </a:pathLst>
+            </a:custGeom>
+            <a:noFill/>
+            <a:ln w="12700" cap="rnd">
+              <a:solidFill>
+                <a:srgbClr val="F2F2F2"/>
+              </a:solidFill>
+              <a:headEnd type="oval" w="med" len="med"/>
+              <a:tailEnd type="none" w="med" len="med"/>
+            </a:ln>
+          </p:spPr>
+          <p:style>
+            <a:lnRef idx="2">
+              <a:schemeClr val="accent1">
+                <a:shade val="50000"/>
+              </a:schemeClr>
+            </a:lnRef>
+            <a:fillRef idx="1">
+              <a:schemeClr val="accent1"/>
+            </a:fillRef>
+            <a:effectRef idx="0">
+              <a:schemeClr val="accent1"/>
+            </a:effectRef>
+            <a:fontRef idx="minor">
+              <a:schemeClr val="lt1"/>
+            </a:fontRef>
+          </p:style>
+          <p:txBody>
+            <a:bodyPr rtlCol="0" anchor="ctr"/>
+            <a:lstStyle/>
+            <a:p>
+              <a:pPr algn="ctr"/>
+              <a:endParaRPr lang="nl-NL"/>
+            </a:p>
+          </p:txBody>
+        </p:sp>
+        <p:sp>
+          <p:nvSpPr>
+            <p:cNvPr id="31" name="Vrije vorm: vorm 30">
+              <a:extLst>
+                <a:ext uri="{FF2B5EF4-FFF2-40B4-BE49-F238E27FC236}">
+                  <a16:creationId xmlns:a16="http://schemas.microsoft.com/office/drawing/2014/main" id="{7A59B2FF-BB7A-498D-BAD2-20A79F7CC2DF}"/>
+                </a:ext>
+              </a:extLst>
+            </p:cNvPr>
+            <p:cNvSpPr/>
+            <p:nvPr/>
+          </p:nvSpPr>
+          <p:spPr>
+            <a:xfrm>
+              <a:off x="487241" y="1806952"/>
+              <a:ext cx="361266" cy="165467"/>
+            </a:xfrm>
+            <a:custGeom>
+              <a:avLst/>
+              <a:gdLst>
+                <a:gd name="connsiteX0" fmla="*/ 0 w 3776870"/>
+                <a:gd name="connsiteY0" fmla="*/ 0 h 1709531"/>
+                <a:gd name="connsiteX1" fmla="*/ 1916265 w 3776870"/>
+                <a:gd name="connsiteY1" fmla="*/ 818985 h 1709531"/>
+                <a:gd name="connsiteX2" fmla="*/ 3776870 w 3776870"/>
+                <a:gd name="connsiteY2" fmla="*/ 1709531 h 1709531"/>
+                <a:gd name="connsiteX0" fmla="*/ 0 w 3776870"/>
+                <a:gd name="connsiteY0" fmla="*/ 0 h 1709531"/>
+                <a:gd name="connsiteX1" fmla="*/ 1923409 w 3776870"/>
+                <a:gd name="connsiteY1" fmla="*/ 823748 h 1709531"/>
+                <a:gd name="connsiteX2" fmla="*/ 3776870 w 3776870"/>
+                <a:gd name="connsiteY2" fmla="*/ 1709531 h 1709531"/>
+                <a:gd name="connsiteX0" fmla="*/ 0 w 3795920"/>
+                <a:gd name="connsiteY0" fmla="*/ 0 h 1700006"/>
+                <a:gd name="connsiteX1" fmla="*/ 1942459 w 3795920"/>
+                <a:gd name="connsiteY1" fmla="*/ 814223 h 1700006"/>
+                <a:gd name="connsiteX2" fmla="*/ 3795920 w 3795920"/>
+                <a:gd name="connsiteY2" fmla="*/ 1700006 h 1700006"/>
+                <a:gd name="connsiteX0" fmla="*/ 0 w 3805445"/>
+                <a:gd name="connsiteY0" fmla="*/ 0 h 1709531"/>
+                <a:gd name="connsiteX1" fmla="*/ 1951984 w 3805445"/>
+                <a:gd name="connsiteY1" fmla="*/ 823748 h 1709531"/>
+                <a:gd name="connsiteX2" fmla="*/ 3805445 w 3805445"/>
+                <a:gd name="connsiteY2" fmla="*/ 1709531 h 1709531"/>
+                <a:gd name="connsiteX0" fmla="*/ 0 w 3817352"/>
+                <a:gd name="connsiteY0" fmla="*/ 0 h 1752393"/>
+                <a:gd name="connsiteX1" fmla="*/ 1951984 w 3817352"/>
+                <a:gd name="connsiteY1" fmla="*/ 823748 h 1752393"/>
+                <a:gd name="connsiteX2" fmla="*/ 3817352 w 3817352"/>
+                <a:gd name="connsiteY2" fmla="*/ 1752393 h 1752393"/>
+                <a:gd name="connsiteX0" fmla="*/ 0 w 3817352"/>
+                <a:gd name="connsiteY0" fmla="*/ 0 h 1735724"/>
+                <a:gd name="connsiteX1" fmla="*/ 1951984 w 3817352"/>
+                <a:gd name="connsiteY1" fmla="*/ 823748 h 1735724"/>
+                <a:gd name="connsiteX2" fmla="*/ 3817352 w 3817352"/>
+                <a:gd name="connsiteY2" fmla="*/ 1735724 h 1735724"/>
+                <a:gd name="connsiteX0" fmla="*/ 0 w 3817352"/>
+                <a:gd name="connsiteY0" fmla="*/ 0 h 1735724"/>
+                <a:gd name="connsiteX1" fmla="*/ 1951984 w 3817352"/>
+                <a:gd name="connsiteY1" fmla="*/ 823748 h 1735724"/>
+                <a:gd name="connsiteX2" fmla="*/ 3817352 w 3817352"/>
+                <a:gd name="connsiteY2" fmla="*/ 1735724 h 1735724"/>
+                <a:gd name="connsiteX0" fmla="*/ 0 w 3793539"/>
+                <a:gd name="connsiteY0" fmla="*/ 0 h 1735724"/>
+                <a:gd name="connsiteX1" fmla="*/ 1951984 w 3793539"/>
+                <a:gd name="connsiteY1" fmla="*/ 823748 h 1735724"/>
+                <a:gd name="connsiteX2" fmla="*/ 3793539 w 3793539"/>
+                <a:gd name="connsiteY2" fmla="*/ 1735724 h 1735724"/>
+                <a:gd name="connsiteX0" fmla="*/ 0 w 3798301"/>
+                <a:gd name="connsiteY0" fmla="*/ 0 h 1728580"/>
+                <a:gd name="connsiteX1" fmla="*/ 1951984 w 3798301"/>
+                <a:gd name="connsiteY1" fmla="*/ 823748 h 1728580"/>
+                <a:gd name="connsiteX2" fmla="*/ 3798301 w 3798301"/>
+                <a:gd name="connsiteY2" fmla="*/ 1728580 h 1728580"/>
+                <a:gd name="connsiteX0" fmla="*/ 0 w 3798301"/>
+                <a:gd name="connsiteY0" fmla="*/ 0 h 1728580"/>
+                <a:gd name="connsiteX1" fmla="*/ 1951984 w 3798301"/>
+                <a:gd name="connsiteY1" fmla="*/ 823748 h 1728580"/>
+                <a:gd name="connsiteX2" fmla="*/ 3798301 w 3798301"/>
+                <a:gd name="connsiteY2" fmla="*/ 1728580 h 1728580"/>
+                <a:gd name="connsiteX0" fmla="*/ 0 w 3798301"/>
+                <a:gd name="connsiteY0" fmla="*/ 0 h 1728580"/>
+                <a:gd name="connsiteX1" fmla="*/ 1951984 w 3798301"/>
+                <a:gd name="connsiteY1" fmla="*/ 823748 h 1728580"/>
+                <a:gd name="connsiteX2" fmla="*/ 3798301 w 3798301"/>
+                <a:gd name="connsiteY2" fmla="*/ 1728580 h 1728580"/>
+                <a:gd name="connsiteX0" fmla="*/ 0 w 3781632"/>
+                <a:gd name="connsiteY0" fmla="*/ 0 h 1700005"/>
+                <a:gd name="connsiteX1" fmla="*/ 1951984 w 3781632"/>
+                <a:gd name="connsiteY1" fmla="*/ 823748 h 1700005"/>
+                <a:gd name="connsiteX2" fmla="*/ 3781632 w 3781632"/>
+                <a:gd name="connsiteY2" fmla="*/ 1700005 h 1700005"/>
+                <a:gd name="connsiteX0" fmla="*/ 0 w 3800682"/>
+                <a:gd name="connsiteY0" fmla="*/ 0 h 1711911"/>
+                <a:gd name="connsiteX1" fmla="*/ 1951984 w 3800682"/>
+                <a:gd name="connsiteY1" fmla="*/ 823748 h 1711911"/>
+                <a:gd name="connsiteX2" fmla="*/ 3800682 w 3800682"/>
+                <a:gd name="connsiteY2" fmla="*/ 1711911 h 1711911"/>
+                <a:gd name="connsiteX0" fmla="*/ 0 w 3743532"/>
+                <a:gd name="connsiteY0" fmla="*/ 0 h 1676193"/>
+                <a:gd name="connsiteX1" fmla="*/ 1951984 w 3743532"/>
+                <a:gd name="connsiteY1" fmla="*/ 823748 h 1676193"/>
+                <a:gd name="connsiteX2" fmla="*/ 3743532 w 3743532"/>
+                <a:gd name="connsiteY2" fmla="*/ 1676193 h 1676193"/>
+                <a:gd name="connsiteX0" fmla="*/ 0 w 3791157"/>
+                <a:gd name="connsiteY0" fmla="*/ 0 h 1702386"/>
+                <a:gd name="connsiteX1" fmla="*/ 1951984 w 3791157"/>
+                <a:gd name="connsiteY1" fmla="*/ 823748 h 1702386"/>
+                <a:gd name="connsiteX2" fmla="*/ 3791157 w 3791157"/>
+                <a:gd name="connsiteY2" fmla="*/ 1702386 h 1702386"/>
+                <a:gd name="connsiteX0" fmla="*/ 0 w 3776869"/>
+                <a:gd name="connsiteY0" fmla="*/ 0 h 1685717"/>
+                <a:gd name="connsiteX1" fmla="*/ 1951984 w 3776869"/>
+                <a:gd name="connsiteY1" fmla="*/ 823748 h 1685717"/>
+                <a:gd name="connsiteX2" fmla="*/ 3776869 w 3776869"/>
+                <a:gd name="connsiteY2" fmla="*/ 1685717 h 1685717"/>
+                <a:gd name="connsiteX0" fmla="*/ 0 w 3776869"/>
+                <a:gd name="connsiteY0" fmla="*/ 0 h 1685717"/>
+                <a:gd name="connsiteX1" fmla="*/ 1951984 w 3776869"/>
+                <a:gd name="connsiteY1" fmla="*/ 823748 h 1685717"/>
+                <a:gd name="connsiteX2" fmla="*/ 3776869 w 3776869"/>
+                <a:gd name="connsiteY2" fmla="*/ 1685717 h 1685717"/>
+                <a:gd name="connsiteX0" fmla="*/ 0 w 3776869"/>
+                <a:gd name="connsiteY0" fmla="*/ 0 h 1685717"/>
+                <a:gd name="connsiteX1" fmla="*/ 1951984 w 3776869"/>
+                <a:gd name="connsiteY1" fmla="*/ 823748 h 1685717"/>
+                <a:gd name="connsiteX2" fmla="*/ 3776869 w 3776869"/>
+                <a:gd name="connsiteY2" fmla="*/ 1685717 h 1685717"/>
+                <a:gd name="connsiteX0" fmla="*/ 0 w 3776869"/>
+                <a:gd name="connsiteY0" fmla="*/ 0 h 1685717"/>
+                <a:gd name="connsiteX1" fmla="*/ 1951984 w 3776869"/>
+                <a:gd name="connsiteY1" fmla="*/ 823748 h 1685717"/>
+                <a:gd name="connsiteX2" fmla="*/ 3776869 w 3776869"/>
+                <a:gd name="connsiteY2" fmla="*/ 1685717 h 1685717"/>
+                <a:gd name="connsiteX0" fmla="*/ 0 w 3767344"/>
+                <a:gd name="connsiteY0" fmla="*/ 0 h 1688098"/>
+                <a:gd name="connsiteX1" fmla="*/ 1951984 w 3767344"/>
+                <a:gd name="connsiteY1" fmla="*/ 823748 h 1688098"/>
+                <a:gd name="connsiteX2" fmla="*/ 3767344 w 3767344"/>
+                <a:gd name="connsiteY2" fmla="*/ 1688098 h 1688098"/>
+                <a:gd name="connsiteX0" fmla="*/ 0 w 3767344"/>
+                <a:gd name="connsiteY0" fmla="*/ 0 h 1688098"/>
+                <a:gd name="connsiteX1" fmla="*/ 1951984 w 3767344"/>
+                <a:gd name="connsiteY1" fmla="*/ 823748 h 1688098"/>
+                <a:gd name="connsiteX2" fmla="*/ 3767344 w 3767344"/>
+                <a:gd name="connsiteY2" fmla="*/ 1688098 h 1688098"/>
+                <a:gd name="connsiteX0" fmla="*/ 0 w 3791157"/>
+                <a:gd name="connsiteY0" fmla="*/ 0 h 1688098"/>
+                <a:gd name="connsiteX1" fmla="*/ 1975797 w 3791157"/>
+                <a:gd name="connsiteY1" fmla="*/ 823748 h 1688098"/>
+                <a:gd name="connsiteX2" fmla="*/ 3791157 w 3791157"/>
+                <a:gd name="connsiteY2" fmla="*/ 1688098 h 1688098"/>
+                <a:gd name="connsiteX0" fmla="*/ 0 w 3779251"/>
+                <a:gd name="connsiteY0" fmla="*/ 0 h 1688098"/>
+                <a:gd name="connsiteX1" fmla="*/ 1963891 w 3779251"/>
+                <a:gd name="connsiteY1" fmla="*/ 823748 h 1688098"/>
+                <a:gd name="connsiteX2" fmla="*/ 3779251 w 3779251"/>
+                <a:gd name="connsiteY2" fmla="*/ 1688098 h 1688098"/>
+                <a:gd name="connsiteX0" fmla="*/ 0 w 3788776"/>
+                <a:gd name="connsiteY0" fmla="*/ 0 h 1700004"/>
+                <a:gd name="connsiteX1" fmla="*/ 1973416 w 3788776"/>
+                <a:gd name="connsiteY1" fmla="*/ 835654 h 1700004"/>
+                <a:gd name="connsiteX2" fmla="*/ 3788776 w 3788776"/>
+                <a:gd name="connsiteY2" fmla="*/ 1700004 h 1700004"/>
+                <a:gd name="connsiteX0" fmla="*/ 0 w 3800683"/>
+                <a:gd name="connsiteY0" fmla="*/ 0 h 1700004"/>
+                <a:gd name="connsiteX1" fmla="*/ 1985323 w 3800683"/>
+                <a:gd name="connsiteY1" fmla="*/ 835654 h 1700004"/>
+                <a:gd name="connsiteX2" fmla="*/ 3800683 w 3800683"/>
+                <a:gd name="connsiteY2" fmla="*/ 1700004 h 1700004"/>
+                <a:gd name="connsiteX0" fmla="*/ 0 w 3800683"/>
+                <a:gd name="connsiteY0" fmla="*/ 0 h 1700004"/>
+                <a:gd name="connsiteX1" fmla="*/ 1985323 w 3800683"/>
+                <a:gd name="connsiteY1" fmla="*/ 835654 h 1700004"/>
+                <a:gd name="connsiteX2" fmla="*/ 3800683 w 3800683"/>
+                <a:gd name="connsiteY2" fmla="*/ 1700004 h 1700004"/>
+                <a:gd name="connsiteX0" fmla="*/ 0 w 3791158"/>
+                <a:gd name="connsiteY0" fmla="*/ 0 h 1697623"/>
+                <a:gd name="connsiteX1" fmla="*/ 1975798 w 3791158"/>
+                <a:gd name="connsiteY1" fmla="*/ 833273 h 1697623"/>
+                <a:gd name="connsiteX2" fmla="*/ 3791158 w 3791158"/>
+                <a:gd name="connsiteY2" fmla="*/ 1697623 h 1697623"/>
+                <a:gd name="connsiteX0" fmla="*/ 0 w 2943433"/>
+                <a:gd name="connsiteY0" fmla="*/ 0 h 1154698"/>
+                <a:gd name="connsiteX1" fmla="*/ 1975798 w 2943433"/>
+                <a:gd name="connsiteY1" fmla="*/ 833273 h 1154698"/>
+                <a:gd name="connsiteX2" fmla="*/ 2943433 w 2943433"/>
+                <a:gd name="connsiteY2" fmla="*/ 1154698 h 1154698"/>
+                <a:gd name="connsiteX0" fmla="*/ 0 w 2943433"/>
+                <a:gd name="connsiteY0" fmla="*/ 0 h 1154698"/>
+                <a:gd name="connsiteX1" fmla="*/ 2943433 w 2943433"/>
+                <a:gd name="connsiteY1" fmla="*/ 1154698 h 1154698"/>
+                <a:gd name="connsiteX0" fmla="*/ 0 w 3172033"/>
+                <a:gd name="connsiteY0" fmla="*/ 0 h 1154698"/>
+                <a:gd name="connsiteX1" fmla="*/ 3172033 w 3172033"/>
+                <a:gd name="connsiteY1" fmla="*/ 1154698 h 1154698"/>
+                <a:gd name="connsiteX0" fmla="*/ 0 w 3423493"/>
+                <a:gd name="connsiteY0" fmla="*/ 0 h 1253758"/>
+                <a:gd name="connsiteX1" fmla="*/ 3423493 w 3423493"/>
+                <a:gd name="connsiteY1" fmla="*/ 1253758 h 1253758"/>
+                <a:gd name="connsiteX0" fmla="*/ 0 w 5724733"/>
+                <a:gd name="connsiteY0" fmla="*/ 0 h 2046238"/>
+                <a:gd name="connsiteX1" fmla="*/ 5724733 w 5724733"/>
+                <a:gd name="connsiteY1" fmla="*/ 2046238 h 2046238"/>
+                <a:gd name="connsiteX0" fmla="*/ 0 w 5778073"/>
+                <a:gd name="connsiteY0" fmla="*/ 0 h 1985278"/>
+                <a:gd name="connsiteX1" fmla="*/ 5778073 w 5778073"/>
+                <a:gd name="connsiteY1" fmla="*/ 1985278 h 1985278"/>
+                <a:gd name="connsiteX0" fmla="*/ 1102787 w 1102787"/>
+                <a:gd name="connsiteY0" fmla="*/ 0 h 1009918"/>
+                <a:gd name="connsiteX1" fmla="*/ 0 w 1102787"/>
+                <a:gd name="connsiteY1" fmla="*/ 1009918 h 1009918"/>
+                <a:gd name="connsiteX0" fmla="*/ 363647 w 363647"/>
+                <a:gd name="connsiteY0" fmla="*/ 186422 h 186422"/>
+                <a:gd name="connsiteX1" fmla="*/ 0 w 363647"/>
+                <a:gd name="connsiteY1" fmla="*/ 0 h 186422"/>
+                <a:gd name="connsiteX0" fmla="*/ 363647 w 363647"/>
+                <a:gd name="connsiteY0" fmla="*/ 155942 h 155942"/>
+                <a:gd name="connsiteX1" fmla="*/ 0 w 363647"/>
+                <a:gd name="connsiteY1" fmla="*/ 0 h 155942"/>
+                <a:gd name="connsiteX0" fmla="*/ 361266 w 361266"/>
+                <a:gd name="connsiteY0" fmla="*/ 165467 h 165467"/>
+                <a:gd name="connsiteX1" fmla="*/ 0 w 361266"/>
+                <a:gd name="connsiteY1" fmla="*/ 0 h 165467"/>
+              </a:gdLst>
+              <a:ahLst/>
+              <a:cxnLst>
+                <a:cxn ang="0">
+                  <a:pos x="connsiteX0" y="connsiteY0"/>
+                </a:cxn>
+                <a:cxn ang="0">
+                  <a:pos x="connsiteX1" y="connsiteY1"/>
+                </a:cxn>
+              </a:cxnLst>
+              <a:rect l="l" t="t" r="r" b="b"/>
+              <a:pathLst>
+                <a:path w="361266" h="165467">
+                  <a:moveTo>
+                    <a:pt x="361266" y="165467"/>
+                  </a:moveTo>
+                  <a:lnTo>
+                    <a:pt x="0" y="0"/>
+                  </a:lnTo>
+                </a:path>
+              </a:pathLst>
+            </a:custGeom>
+            <a:noFill/>
+            <a:ln w="12700" cap="rnd">
+              <a:solidFill>
+                <a:srgbClr val="F2F2F2"/>
+              </a:solidFill>
+              <a:headEnd type="oval" w="sm" len="sm"/>
+              <a:tailEnd type="none" w="med" len="med"/>
+            </a:ln>
+          </p:spPr>
+          <p:style>
+            <a:lnRef idx="2">
+              <a:schemeClr val="accent1">
+                <a:shade val="50000"/>
+              </a:schemeClr>
+            </a:lnRef>
+            <a:fillRef idx="1">
+              <a:schemeClr val="accent1"/>
+            </a:fillRef>
+            <a:effectRef idx="0">
+              <a:schemeClr val="accent1"/>
+            </a:effectRef>
+            <a:fontRef idx="minor">
+              <a:schemeClr val="lt1"/>
+            </a:fontRef>
+          </p:style>
+          <p:txBody>
+            <a:bodyPr rtlCol="0" anchor="ctr"/>
+            <a:lstStyle/>
+            <a:p>
+              <a:pPr algn="ctr"/>
+              <a:endParaRPr lang="nl-NL"/>
+            </a:p>
+          </p:txBody>
+        </p:sp>
+      </p:grpSp>
+      <p:sp>
+        <p:nvSpPr>
+          <p:cNvPr id="5" name="Pijl: vijfhoek 4">
+            <a:extLst>
+              <a:ext uri="{FF2B5EF4-FFF2-40B4-BE49-F238E27FC236}">
+                <a16:creationId xmlns:a16="http://schemas.microsoft.com/office/drawing/2014/main" id="{B9BAA35E-7E2C-4F7A-A156-4417A236DF1B}"/>
+              </a:ext>
+            </a:extLst>
+          </p:cNvPr>
+          <p:cNvSpPr/>
+          <p:nvPr/>
+        </p:nvSpPr>
+        <p:spPr>
+          <a:xfrm rot="19498422">
+            <a:off x="4404497" y="5416485"/>
+            <a:ext cx="698400" cy="136800"/>
+          </a:xfrm>
+          <a:prstGeom prst="homePlate">
+            <a:avLst/>
+          </a:prstGeom>
+          <a:solidFill>
+            <a:srgbClr val="CC0000"/>
+          </a:solidFill>
+          <a:ln>
+            <a:solidFill>
+              <a:schemeClr val="accent6">
+                <a:lumMod val="75000"/>
+              </a:schemeClr>
+            </a:solidFill>
+          </a:ln>
+        </p:spPr>
+        <p:style>
+          <a:lnRef idx="2">
+            <a:schemeClr val="accent2">
+              <a:shade val="50000"/>
+            </a:schemeClr>
+          </a:lnRef>
+          <a:fillRef idx="1">
+            <a:schemeClr val="accent2"/>
+          </a:fillRef>
+          <a:effectRef idx="0">
+            <a:schemeClr val="accent2"/>
+          </a:effectRef>
+          <a:fontRef idx="minor">
+            <a:schemeClr val="lt1"/>
+          </a:fontRef>
+        </p:style>
+        <p:txBody>
+          <a:bodyPr rtlCol="0" anchor="ctr"/>
+          <a:lstStyle/>
+          <a:p>
+            <a:pPr algn="ctr"/>
+            <a:endParaRPr lang="nl-NL" sz="1600">
+              <a:latin typeface="Arial" panose="020B0604020202020204" pitchFamily="34" charset="0"/>
+              <a:cs typeface="Arial" panose="020B0604020202020204" pitchFamily="34" charset="0"/>
+            </a:endParaRPr>
+          </a:p>
+        </p:txBody>
+      </p:sp>
+      <p:sp>
+        <p:nvSpPr>
+          <p:cNvPr id="13" name="Tekstvak 12">
+            <a:extLst>
+              <a:ext uri="{FF2B5EF4-FFF2-40B4-BE49-F238E27FC236}">
+                <a16:creationId xmlns:a16="http://schemas.microsoft.com/office/drawing/2014/main" id="{E20AFFF8-810A-429C-9DCB-9290C3A5F8C9}"/>
+              </a:ext>
+            </a:extLst>
+          </p:cNvPr>
+          <p:cNvSpPr txBox="1"/>
+          <p:nvPr/>
+        </p:nvSpPr>
+        <p:spPr>
+          <a:xfrm>
+            <a:off x="609600" y="7019925"/>
+            <a:ext cx="3076575" cy="861774"/>
+          </a:xfrm>
+          <a:prstGeom prst="rect">
+            <a:avLst/>
+          </a:prstGeom>
+          <a:noFill/>
+        </p:spPr>
+        <p:txBody>
+          <a:bodyPr wrap="square" rtlCol="0">
+            <a:spAutoFit/>
+          </a:bodyPr>
+          <a:lstStyle/>
+          <a:p>
+            <a:r>
+              <a:rPr lang="nl-NL" sz="1600" dirty="0">
+                <a:latin typeface="Arial" panose="020B0604020202020204" pitchFamily="34" charset="0"/>
+                <a:cs typeface="Arial" panose="020B0604020202020204" pitchFamily="34" charset="0"/>
+              </a:rPr>
+              <a:t>1 cm = 0.255 km</a:t>
+            </a:r>
+          </a:p>
+          <a:p>
+            <a:r>
+              <a:rPr lang="nl-NL" sz="1600" dirty="0">
+                <a:latin typeface="Arial" panose="020B0604020202020204" pitchFamily="34" charset="0"/>
+                <a:cs typeface="Arial" panose="020B0604020202020204" pitchFamily="34" charset="0"/>
+              </a:rPr>
+              <a:t>3.914 cm = 1 km</a:t>
+            </a:r>
+          </a:p>
+          <a:p>
+            <a:r>
+              <a:rPr lang="nl-NL" sz="1600" dirty="0">
+                <a:latin typeface="Arial" panose="020B0604020202020204" pitchFamily="34" charset="0"/>
+                <a:cs typeface="Arial" panose="020B0604020202020204" pitchFamily="34" charset="0"/>
+              </a:rPr>
+              <a:t>Schepen 2x vergroot</a:t>
+            </a:r>
+          </a:p>
+        </p:txBody>
+      </p:sp>
+      <p:sp>
+        <p:nvSpPr>
+          <p:cNvPr id="14" name="Pijl: vijfhoek 13">
+            <a:extLst>
+              <a:ext uri="{FF2B5EF4-FFF2-40B4-BE49-F238E27FC236}">
+                <a16:creationId xmlns:a16="http://schemas.microsoft.com/office/drawing/2014/main" id="{C6978AA4-8ED2-4685-8C27-A80813728B63}"/>
+              </a:ext>
+            </a:extLst>
+          </p:cNvPr>
+          <p:cNvSpPr>
+            <a:spLocks/>
+          </p:cNvSpPr>
+          <p:nvPr/>
+        </p:nvSpPr>
+        <p:spPr>
+          <a:xfrm rot="1296606">
+            <a:off x="1502621" y="1721131"/>
+            <a:ext cx="403200" cy="64800"/>
+          </a:xfrm>
+          <a:prstGeom prst="homePlate">
+            <a:avLst/>
+          </a:prstGeom>
+          <a:solidFill>
+            <a:schemeClr val="accent2">
+              <a:lumMod val="75000"/>
+            </a:schemeClr>
+          </a:solidFill>
+          <a:ln w="6350">
+            <a:solidFill>
+              <a:schemeClr val="accent5">
+                <a:lumMod val="75000"/>
+              </a:schemeClr>
+            </a:solidFill>
+          </a:ln>
+        </p:spPr>
+        <p:style>
+          <a:lnRef idx="2">
+            <a:schemeClr val="accent2">
+              <a:shade val="50000"/>
+            </a:schemeClr>
+          </a:lnRef>
+          <a:fillRef idx="1">
+            <a:schemeClr val="accent2"/>
+          </a:fillRef>
+          <a:effectRef idx="0">
+            <a:schemeClr val="accent2"/>
+          </a:effectRef>
+          <a:fontRef idx="minor">
+            <a:schemeClr val="lt1"/>
+          </a:fontRef>
+        </p:style>
+        <p:txBody>
+          <a:bodyPr rtlCol="0" anchor="ctr"/>
+          <a:lstStyle/>
+          <a:p>
+            <a:pPr algn="ctr"/>
+            <a:endParaRPr lang="nl-NL" sz="1600">
+              <a:latin typeface="Arial" panose="020B0604020202020204" pitchFamily="34" charset="0"/>
+              <a:cs typeface="Arial" panose="020B0604020202020204" pitchFamily="34" charset="0"/>
+            </a:endParaRPr>
+          </a:p>
+        </p:txBody>
+      </p:sp>
+      <p:sp>
+        <p:nvSpPr>
+          <p:cNvPr id="15" name="Pijl: vijfhoek 14">
+            <a:extLst>
+              <a:ext uri="{FF2B5EF4-FFF2-40B4-BE49-F238E27FC236}">
+                <a16:creationId xmlns:a16="http://schemas.microsoft.com/office/drawing/2014/main" id="{25E612E3-412B-43ED-84C9-684E1A818950}"/>
+              </a:ext>
+            </a:extLst>
+          </p:cNvPr>
+          <p:cNvSpPr/>
+          <p:nvPr/>
+        </p:nvSpPr>
+        <p:spPr>
+          <a:xfrm rot="12205911">
+            <a:off x="8199762" y="3593008"/>
+            <a:ext cx="403200" cy="64800"/>
+          </a:xfrm>
+          <a:prstGeom prst="homePlate">
+            <a:avLst/>
+          </a:prstGeom>
+          <a:solidFill>
+            <a:srgbClr val="00B0F0"/>
+          </a:solidFill>
+          <a:ln w="6350">
+            <a:solidFill>
+              <a:schemeClr val="accent5">
+                <a:lumMod val="75000"/>
+              </a:schemeClr>
+            </a:solidFill>
+          </a:ln>
+        </p:spPr>
+        <p:style>
+          <a:lnRef idx="2">
+            <a:schemeClr val="accent2">
+              <a:shade val="50000"/>
+            </a:schemeClr>
+          </a:lnRef>
+          <a:fillRef idx="1">
+            <a:schemeClr val="accent2"/>
+          </a:fillRef>
+          <a:effectRef idx="0">
+            <a:schemeClr val="accent2"/>
+          </a:effectRef>
+          <a:fontRef idx="minor">
+            <a:schemeClr val="lt1"/>
+          </a:fontRef>
+        </p:style>
+        <p:txBody>
+          <a:bodyPr rtlCol="0" anchor="ctr"/>
+          <a:lstStyle/>
+          <a:p>
+            <a:pPr algn="ctr"/>
+            <a:endParaRPr lang="nl-NL" sz="1600">
+              <a:latin typeface="Arial" panose="020B0604020202020204" pitchFamily="34" charset="0"/>
+              <a:cs typeface="Arial" panose="020B0604020202020204" pitchFamily="34" charset="0"/>
+            </a:endParaRPr>
+          </a:p>
+        </p:txBody>
+      </p:sp>
+      <p:sp>
+        <p:nvSpPr>
+          <p:cNvPr id="16" name="Tekstvak 15">
+            <a:extLst>
+              <a:ext uri="{FF2B5EF4-FFF2-40B4-BE49-F238E27FC236}">
+                <a16:creationId xmlns:a16="http://schemas.microsoft.com/office/drawing/2014/main" id="{96BFFAC8-8A38-4393-A4D8-EB7B09418EE2}"/>
+              </a:ext>
+            </a:extLst>
+          </p:cNvPr>
+          <p:cNvSpPr txBox="1"/>
+          <p:nvPr/>
+        </p:nvSpPr>
+        <p:spPr>
+          <a:xfrm>
+            <a:off x="3597677" y="5349737"/>
+            <a:ext cx="1003852" cy="430887"/>
+          </a:xfrm>
+          <a:prstGeom prst="rect">
+            <a:avLst/>
+          </a:prstGeom>
+          <a:noFill/>
+        </p:spPr>
+        <p:txBody>
+          <a:bodyPr wrap="square" rtlCol="0">
+            <a:spAutoFit/>
+          </a:bodyPr>
+          <a:lstStyle/>
+          <a:p>
+            <a:r>
+              <a:rPr lang="nl-NL" sz="1050" dirty="0">
+                <a:latin typeface="Arial" panose="020B0604020202020204" pitchFamily="34" charset="0"/>
+                <a:cs typeface="Arial" panose="020B0604020202020204" pitchFamily="34" charset="0"/>
+              </a:rPr>
+              <a:t>Gulf </a:t>
+            </a:r>
+            <a:r>
+              <a:rPr lang="nl-NL" sz="1050" dirty="0" err="1">
+                <a:latin typeface="Arial" panose="020B0604020202020204" pitchFamily="34" charset="0"/>
+                <a:cs typeface="Arial" panose="020B0604020202020204" pitchFamily="34" charset="0"/>
+              </a:rPr>
+              <a:t>Valour</a:t>
+            </a:r>
+            <a:endParaRPr lang="nl-NL" sz="1050" dirty="0">
+              <a:latin typeface="Arial" panose="020B0604020202020204" pitchFamily="34" charset="0"/>
+              <a:cs typeface="Arial" panose="020B0604020202020204" pitchFamily="34" charset="0"/>
+            </a:endParaRPr>
+          </a:p>
+          <a:p>
+            <a:r>
+              <a:rPr lang="nl-NL" sz="1050" dirty="0">
+                <a:latin typeface="Arial" panose="020B0604020202020204" pitchFamily="34" charset="0"/>
+                <a:cs typeface="Arial" panose="020B0604020202020204" pitchFamily="34" charset="0"/>
+              </a:rPr>
+              <a:t>7.8 </a:t>
+            </a:r>
+            <a:r>
+              <a:rPr lang="nl-NL" sz="1050" dirty="0" err="1">
+                <a:latin typeface="Arial" panose="020B0604020202020204" pitchFamily="34" charset="0"/>
+                <a:cs typeface="Arial" panose="020B0604020202020204" pitchFamily="34" charset="0"/>
+              </a:rPr>
+              <a:t>kn</a:t>
+            </a:r>
+            <a:endParaRPr lang="nl-NL" sz="1050" dirty="0">
+              <a:latin typeface="Arial" panose="020B0604020202020204" pitchFamily="34" charset="0"/>
+              <a:cs typeface="Arial" panose="020B0604020202020204" pitchFamily="34" charset="0"/>
+            </a:endParaRPr>
+          </a:p>
+        </p:txBody>
+      </p:sp>
+      <p:sp>
+        <p:nvSpPr>
+          <p:cNvPr id="17" name="Tekstvak 16">
+            <a:extLst>
+              <a:ext uri="{FF2B5EF4-FFF2-40B4-BE49-F238E27FC236}">
+                <a16:creationId xmlns:a16="http://schemas.microsoft.com/office/drawing/2014/main" id="{A418C49D-0E79-42EC-BE91-307E7E12D908}"/>
+              </a:ext>
+            </a:extLst>
+          </p:cNvPr>
+          <p:cNvSpPr txBox="1"/>
+          <p:nvPr/>
+        </p:nvSpPr>
+        <p:spPr>
+          <a:xfrm>
+            <a:off x="1695285" y="1334825"/>
+            <a:ext cx="1884459" cy="430887"/>
+          </a:xfrm>
+          <a:prstGeom prst="rect">
+            <a:avLst/>
+          </a:prstGeom>
+          <a:noFill/>
+        </p:spPr>
+        <p:txBody>
+          <a:bodyPr wrap="square" rtlCol="0">
+            <a:spAutoFit/>
+          </a:bodyPr>
+          <a:lstStyle/>
+          <a:p>
+            <a:r>
+              <a:rPr lang="nl-NL" sz="1050" dirty="0" err="1">
+                <a:latin typeface="Arial" panose="020B0604020202020204" pitchFamily="34" charset="0"/>
+                <a:cs typeface="Arial" panose="020B0604020202020204" pitchFamily="34" charset="0"/>
+              </a:rPr>
+              <a:t>Astrorunner</a:t>
+            </a:r>
+            <a:endParaRPr lang="nl-NL" sz="1050" dirty="0">
+              <a:latin typeface="Arial" panose="020B0604020202020204" pitchFamily="34" charset="0"/>
+              <a:cs typeface="Arial" panose="020B0604020202020204" pitchFamily="34" charset="0"/>
+            </a:endParaRPr>
+          </a:p>
+          <a:p>
+            <a:r>
               <a:rPr lang="nl-NL" sz="1050">
                 <a:latin typeface="Arial" panose="020B0604020202020204" pitchFamily="34" charset="0"/>
                 <a:cs typeface="Arial" panose="020B0604020202020204" pitchFamily="34" charset="0"/>

</xml_diff>

<commit_message>
Concept 2 versie, mist alleen conclusie MT, final conclusion, samenvatting en voorwoord
</commit_message>
<xml_diff>
--- a/Model/Decision-making/Situation sketch.pptx
+++ b/Model/Decision-making/Situation sketch.pptx
@@ -5,15 +5,18 @@
     <p:sldMasterId id="2147483660" r:id="rId1"/>
   </p:sldMasterIdLst>
   <p:notesMasterIdLst>
-    <p:notesMasterId r:id="rId8"/>
+    <p:notesMasterId r:id="rId11"/>
   </p:notesMasterIdLst>
   <p:sldIdLst>
     <p:sldId id="256" r:id="rId2"/>
     <p:sldId id="261" r:id="rId3"/>
-    <p:sldId id="260" r:id="rId4"/>
-    <p:sldId id="259" r:id="rId5"/>
-    <p:sldId id="257" r:id="rId6"/>
-    <p:sldId id="258" r:id="rId7"/>
+    <p:sldId id="262" r:id="rId4"/>
+    <p:sldId id="263" r:id="rId5"/>
+    <p:sldId id="264" r:id="rId6"/>
+    <p:sldId id="265" r:id="rId7"/>
+    <p:sldId id="259" r:id="rId8"/>
+    <p:sldId id="257" r:id="rId9"/>
+    <p:sldId id="258" r:id="rId10"/>
   </p:sldIdLst>
   <p:sldSz cx="9906000" cy="6858000" type="A4"/>
   <p:notesSz cx="6858000" cy="9144000"/>
@@ -134,7 +137,7 @@
 <file path=ppt/revisionInfo.xml><?xml version="1.0" encoding="utf-8"?>
 <p1510:revInfo xmlns:a="http://schemas.openxmlformats.org/drawingml/2006/main" xmlns:r="http://schemas.openxmlformats.org/officeDocument/2006/relationships" xmlns:p1510="http://schemas.microsoft.com/office/powerpoint/2015/10/main">
   <p1510:revLst>
-    <p1510:client id="{199CEE0D-A3F8-496B-8D55-8DDA2B713DCD}" v="33" dt="2018-10-02T10:36:56.289"/>
+    <p1510:client id="{199CEE0D-A3F8-496B-8D55-8DDA2B713DCD}" v="45" dt="2018-10-02T13:04:32.505"/>
   </p1510:revLst>
 </p1510:revInfo>
 </file>
@@ -147,7 +150,7 @@
   <pc:docChgLst>
     <pc:chgData name="Ingmar Wever" userId="1d4f24f3f093ab16" providerId="LiveId" clId="{199CEE0D-A3F8-496B-8D55-8DDA2B713DCD}"/>
     <pc:docChg chg="custSel addSld delSld modSld sldOrd">
-      <pc:chgData name="Ingmar Wever" userId="1d4f24f3f093ab16" providerId="LiveId" clId="{199CEE0D-A3F8-496B-8D55-8DDA2B713DCD}" dt="2018-10-02T10:36:56.289" v="32" actId="478"/>
+      <pc:chgData name="Ingmar Wever" userId="1d4f24f3f093ab16" providerId="LiveId" clId="{199CEE0D-A3F8-496B-8D55-8DDA2B713DCD}" dt="2018-10-02T13:04:32.505" v="44"/>
       <pc:docMkLst>
         <pc:docMk/>
       </pc:docMkLst>
@@ -166,8 +169,8 @@
           </ac:spMkLst>
         </pc:spChg>
       </pc:sldChg>
-      <pc:sldChg chg="addSp modSp add ord">
-        <pc:chgData name="Ingmar Wever" userId="1d4f24f3f093ab16" providerId="LiveId" clId="{199CEE0D-A3F8-496B-8D55-8DDA2B713DCD}" dt="2018-10-02T10:36:22.747" v="25" actId="1076"/>
+      <pc:sldChg chg="addSp modSp add del ord">
+        <pc:chgData name="Ingmar Wever" userId="1d4f24f3f093ab16" providerId="LiveId" clId="{199CEE0D-A3F8-496B-8D55-8DDA2B713DCD}" dt="2018-10-02T13:03:07.269" v="33" actId="2696"/>
         <pc:sldMkLst>
           <pc:docMk/>
           <pc:sldMk cId="943820103" sldId="260"/>
@@ -190,7 +193,7 @@
         </pc:picChg>
       </pc:sldChg>
       <pc:sldChg chg="addSp delSp modSp add">
-        <pc:chgData name="Ingmar Wever" userId="1d4f24f3f093ab16" providerId="LiveId" clId="{199CEE0D-A3F8-496B-8D55-8DDA2B713DCD}" dt="2018-10-02T10:36:56.289" v="32" actId="478"/>
+        <pc:chgData name="Ingmar Wever" userId="1d4f24f3f093ab16" providerId="LiveId" clId="{199CEE0D-A3F8-496B-8D55-8DDA2B713DCD}" dt="2018-10-02T13:03:31.467" v="36"/>
         <pc:sldMkLst>
           <pc:docMk/>
           <pc:sldMk cId="1797571510" sldId="261"/>
@@ -211,6 +214,22 @@
             <ac:spMk id="3" creationId="{913EDBFA-F2C7-419D-A468-8DF34AF65AC5}"/>
           </ac:spMkLst>
         </pc:spChg>
+        <pc:picChg chg="add mod">
+          <ac:chgData name="Ingmar Wever" userId="1d4f24f3f093ab16" providerId="LiveId" clId="{199CEE0D-A3F8-496B-8D55-8DDA2B713DCD}" dt="2018-10-02T13:03:25.107" v="34"/>
+          <ac:picMkLst>
+            <pc:docMk/>
+            <pc:sldMk cId="1797571510" sldId="261"/>
+            <ac:picMk id="3" creationId="{963ABD7C-5313-427E-8BE6-9FACBA0ED2C5}"/>
+          </ac:picMkLst>
+        </pc:picChg>
+        <pc:picChg chg="add del mod">
+          <ac:chgData name="Ingmar Wever" userId="1d4f24f3f093ab16" providerId="LiveId" clId="{199CEE0D-A3F8-496B-8D55-8DDA2B713DCD}" dt="2018-10-02T13:03:31.467" v="36"/>
+          <ac:picMkLst>
+            <pc:docMk/>
+            <pc:sldMk cId="1797571510" sldId="261"/>
+            <ac:picMk id="5" creationId="{065B42B1-9A29-4332-8439-EACBDAFA6DFF}"/>
+          </ac:picMkLst>
+        </pc:picChg>
         <pc:picChg chg="add del mod modCrop">
           <ac:chgData name="Ingmar Wever" userId="1d4f24f3f093ab16" providerId="LiveId" clId="{199CEE0D-A3F8-496B-8D55-8DDA2B713DCD}" dt="2018-10-02T10:36:54.551" v="31" actId="478"/>
           <ac:picMkLst>
@@ -241,6 +260,74 @@
             <pc:docMk/>
             <pc:sldMk cId="1797571510" sldId="261"/>
             <ac:picMk id="9" creationId="{78F82370-58EB-4669-9249-B9C1CF94C0B7}"/>
+          </ac:picMkLst>
+        </pc:picChg>
+      </pc:sldChg>
+      <pc:sldChg chg="addSp add">
+        <pc:chgData name="Ingmar Wever" userId="1d4f24f3f093ab16" providerId="LiveId" clId="{199CEE0D-A3F8-496B-8D55-8DDA2B713DCD}" dt="2018-10-02T13:03:32.805" v="37"/>
+        <pc:sldMkLst>
+          <pc:docMk/>
+          <pc:sldMk cId="748000684" sldId="262"/>
+        </pc:sldMkLst>
+        <pc:picChg chg="add">
+          <ac:chgData name="Ingmar Wever" userId="1d4f24f3f093ab16" providerId="LiveId" clId="{199CEE0D-A3F8-496B-8D55-8DDA2B713DCD}" dt="2018-10-02T13:03:32.805" v="37"/>
+          <ac:picMkLst>
+            <pc:docMk/>
+            <pc:sldMk cId="748000684" sldId="262"/>
+            <ac:picMk id="2" creationId="{2E6150CD-27F9-4186-8859-CED45E58AFE3}"/>
+          </ac:picMkLst>
+        </pc:picChg>
+      </pc:sldChg>
+      <pc:sldChg chg="addSp delSp modSp add">
+        <pc:chgData name="Ingmar Wever" userId="1d4f24f3f093ab16" providerId="LiveId" clId="{199CEE0D-A3F8-496B-8D55-8DDA2B713DCD}" dt="2018-10-02T13:04:04.691" v="42" actId="478"/>
+        <pc:sldMkLst>
+          <pc:docMk/>
+          <pc:sldMk cId="1248424175" sldId="263"/>
+        </pc:sldMkLst>
+        <pc:picChg chg="add mod">
+          <ac:chgData name="Ingmar Wever" userId="1d4f24f3f093ab16" providerId="LiveId" clId="{199CEE0D-A3F8-496B-8D55-8DDA2B713DCD}" dt="2018-10-02T13:03:56.005" v="39"/>
+          <ac:picMkLst>
+            <pc:docMk/>
+            <pc:sldMk cId="1248424175" sldId="263"/>
+            <ac:picMk id="3" creationId="{DE7277F6-2DDB-4D13-8EA5-385C3B0B647A}"/>
+          </ac:picMkLst>
+        </pc:picChg>
+        <pc:picChg chg="add del mod">
+          <ac:chgData name="Ingmar Wever" userId="1d4f24f3f093ab16" providerId="LiveId" clId="{199CEE0D-A3F8-496B-8D55-8DDA2B713DCD}" dt="2018-10-02T13:04:04.691" v="42" actId="478"/>
+          <ac:picMkLst>
+            <pc:docMk/>
+            <pc:sldMk cId="1248424175" sldId="263"/>
+            <ac:picMk id="5" creationId="{DA96ADD4-B950-4F00-A28A-35CA2EA75107}"/>
+          </ac:picMkLst>
+        </pc:picChg>
+      </pc:sldChg>
+      <pc:sldChg chg="addSp add">
+        <pc:chgData name="Ingmar Wever" userId="1d4f24f3f093ab16" providerId="LiveId" clId="{199CEE0D-A3F8-496B-8D55-8DDA2B713DCD}" dt="2018-10-02T13:04:02.926" v="41"/>
+        <pc:sldMkLst>
+          <pc:docMk/>
+          <pc:sldMk cId="3277754115" sldId="264"/>
+        </pc:sldMkLst>
+        <pc:picChg chg="add">
+          <ac:chgData name="Ingmar Wever" userId="1d4f24f3f093ab16" providerId="LiveId" clId="{199CEE0D-A3F8-496B-8D55-8DDA2B713DCD}" dt="2018-10-02T13:04:02.926" v="41"/>
+          <ac:picMkLst>
+            <pc:docMk/>
+            <pc:sldMk cId="3277754115" sldId="264"/>
+            <ac:picMk id="2" creationId="{7C5EDDF0-F4C9-44FB-A48E-FAFBEAF78DE8}"/>
+          </ac:picMkLst>
+        </pc:picChg>
+      </pc:sldChg>
+      <pc:sldChg chg="addSp modSp add">
+        <pc:chgData name="Ingmar Wever" userId="1d4f24f3f093ab16" providerId="LiveId" clId="{199CEE0D-A3F8-496B-8D55-8DDA2B713DCD}" dt="2018-10-02T13:04:32.505" v="44"/>
+        <pc:sldMkLst>
+          <pc:docMk/>
+          <pc:sldMk cId="553028197" sldId="265"/>
+        </pc:sldMkLst>
+        <pc:picChg chg="add mod">
+          <ac:chgData name="Ingmar Wever" userId="1d4f24f3f093ab16" providerId="LiveId" clId="{199CEE0D-A3F8-496B-8D55-8DDA2B713DCD}" dt="2018-10-02T13:04:32.505" v="44"/>
+          <ac:picMkLst>
+            <pc:docMk/>
+            <pc:sldMk cId="553028197" sldId="265"/>
+            <ac:picMk id="3" creationId="{42227312-72A8-4D9E-9704-ACB1A4225BB0}"/>
           </ac:picMkLst>
         </pc:picChg>
       </pc:sldChg>
@@ -10049,6 +10136,42 @@
           <a:chExt cx="0" cy="0"/>
         </a:xfrm>
       </p:grpSpPr>
+      <p:pic>
+        <p:nvPicPr>
+          <p:cNvPr id="3" name="Afbeelding 2">
+            <a:extLst>
+              <a:ext uri="{FF2B5EF4-FFF2-40B4-BE49-F238E27FC236}">
+                <a16:creationId xmlns:a16="http://schemas.microsoft.com/office/drawing/2014/main" id="{963ABD7C-5313-427E-8BE6-9FACBA0ED2C5}"/>
+              </a:ext>
+            </a:extLst>
+          </p:cNvPr>
+          <p:cNvPicPr>
+            <a:picLocks noChangeAspect="1"/>
+          </p:cNvPicPr>
+          <p:nvPr/>
+        </p:nvPicPr>
+        <p:blipFill>
+          <a:blip r:embed="rId2">
+            <a:extLst>
+              <a:ext uri="{28A0092B-C50C-407E-A947-70E740481C1C}">
+                <a14:useLocalDpi xmlns:a14="http://schemas.microsoft.com/office/drawing/2010/main" val="0"/>
+              </a:ext>
+            </a:extLst>
+          </a:blip>
+          <a:stretch>
+            <a:fillRect/>
+          </a:stretch>
+        </p:blipFill>
+        <p:spPr>
+          <a:xfrm>
+            <a:off x="1051968" y="861654"/>
+            <a:ext cx="7802064" cy="5134692"/>
+          </a:xfrm>
+          <a:prstGeom prst="rect">
+            <a:avLst/>
+          </a:prstGeom>
+        </p:spPr>
+      </p:pic>
     </p:spTree>
     <p:extLst>
       <p:ext uri="{BB962C8B-B14F-4D97-AF65-F5344CB8AC3E}">
@@ -10081,10 +10204,10 @@
       </p:grpSpPr>
       <p:pic>
         <p:nvPicPr>
-          <p:cNvPr id="3" name="Afbeelding 2">
+          <p:cNvPr id="2" name="Afbeelding 1">
             <a:extLst>
               <a:ext uri="{FF2B5EF4-FFF2-40B4-BE49-F238E27FC236}">
-                <a16:creationId xmlns:a16="http://schemas.microsoft.com/office/drawing/2014/main" id="{EEC094FF-A078-40AC-8E8E-9EB7FC68D13A}"/>
+                <a16:creationId xmlns:a16="http://schemas.microsoft.com/office/drawing/2014/main" id="{2E6150CD-27F9-4186-8859-CED45E58AFE3}"/>
               </a:ext>
             </a:extLst>
           </p:cNvPr>
@@ -10107,20 +10230,50 @@
         </p:blipFill>
         <p:spPr>
           <a:xfrm>
-            <a:off x="0" y="0"/>
-            <a:ext cx="9906000" cy="6558505"/>
+            <a:off x="928126" y="847364"/>
+            <a:ext cx="8049748" cy="5163271"/>
           </a:xfrm>
           <a:prstGeom prst="rect">
             <a:avLst/>
           </a:prstGeom>
         </p:spPr>
       </p:pic>
+    </p:spTree>
+    <p:extLst>
+      <p:ext uri="{BB962C8B-B14F-4D97-AF65-F5344CB8AC3E}">
+        <p14:creationId xmlns:p14="http://schemas.microsoft.com/office/powerpoint/2010/main" val="748000684"/>
+      </p:ext>
+    </p:extLst>
+  </p:cSld>
+  <p:clrMapOvr>
+    <a:masterClrMapping/>
+  </p:clrMapOvr>
+</p:sld>
+</file>
+
+<file path=ppt/slides/slide4.xml><?xml version="1.0" encoding="utf-8"?>
+<p:sld xmlns:a="http://schemas.openxmlformats.org/drawingml/2006/main" xmlns:r="http://schemas.openxmlformats.org/officeDocument/2006/relationships" xmlns:p="http://schemas.openxmlformats.org/presentationml/2006/main">
+  <p:cSld>
+    <p:spTree>
+      <p:nvGrpSpPr>
+        <p:cNvPr id="1" name=""/>
+        <p:cNvGrpSpPr/>
+        <p:nvPr/>
+      </p:nvGrpSpPr>
+      <p:grpSpPr>
+        <a:xfrm>
+          <a:off x="0" y="0"/>
+          <a:ext cx="0" cy="0"/>
+          <a:chOff x="0" y="0"/>
+          <a:chExt cx="0" cy="0"/>
+        </a:xfrm>
+      </p:grpSpPr>
       <p:pic>
         <p:nvPicPr>
-          <p:cNvPr id="2" name="Afbeelding 1">
+          <p:cNvPr id="3" name="Afbeelding 2">
             <a:extLst>
               <a:ext uri="{FF2B5EF4-FFF2-40B4-BE49-F238E27FC236}">
-                <a16:creationId xmlns:a16="http://schemas.microsoft.com/office/drawing/2014/main" id="{08AAAB5C-734C-43C8-A342-5AE3EDCE6514}"/>
+                <a16:creationId xmlns:a16="http://schemas.microsoft.com/office/drawing/2014/main" id="{DE7277F6-2DDB-4D13-8EA5-385C3B0B647A}"/>
               </a:ext>
             </a:extLst>
           </p:cNvPr>
@@ -10130,7 +10283,7 @@
           <p:nvPr/>
         </p:nvPicPr>
         <p:blipFill>
-          <a:blip r:embed="rId3">
+          <a:blip r:embed="rId2">
             <a:extLst>
               <a:ext uri="{28A0092B-C50C-407E-A947-70E740481C1C}">
                 <a14:useLocalDpi xmlns:a14="http://schemas.microsoft.com/office/drawing/2010/main" val="0"/>
@@ -10143,8 +10296,8 @@
         </p:blipFill>
         <p:spPr>
           <a:xfrm>
-            <a:off x="0" y="0"/>
-            <a:ext cx="9906000" cy="6501499"/>
+            <a:off x="1923627" y="1761892"/>
+            <a:ext cx="6058746" cy="3334215"/>
           </a:xfrm>
           <a:prstGeom prst="rect">
             <a:avLst/>
@@ -10154,7 +10307,7 @@
     </p:spTree>
     <p:extLst>
       <p:ext uri="{BB962C8B-B14F-4D97-AF65-F5344CB8AC3E}">
-        <p14:creationId xmlns:p14="http://schemas.microsoft.com/office/powerpoint/2010/main" val="943820103"/>
+        <p14:creationId xmlns:p14="http://schemas.microsoft.com/office/powerpoint/2010/main" val="1248424175"/>
       </p:ext>
     </p:extLst>
   </p:cSld>
@@ -10164,7 +10317,139 @@
 </p:sld>
 </file>
 
-<file path=ppt/slides/slide4.xml><?xml version="1.0" encoding="utf-8"?>
+<file path=ppt/slides/slide5.xml><?xml version="1.0" encoding="utf-8"?>
+<p:sld xmlns:a="http://schemas.openxmlformats.org/drawingml/2006/main" xmlns:r="http://schemas.openxmlformats.org/officeDocument/2006/relationships" xmlns:p="http://schemas.openxmlformats.org/presentationml/2006/main">
+  <p:cSld>
+    <p:spTree>
+      <p:nvGrpSpPr>
+        <p:cNvPr id="1" name=""/>
+        <p:cNvGrpSpPr/>
+        <p:nvPr/>
+      </p:nvGrpSpPr>
+      <p:grpSpPr>
+        <a:xfrm>
+          <a:off x="0" y="0"/>
+          <a:ext cx="0" cy="0"/>
+          <a:chOff x="0" y="0"/>
+          <a:chExt cx="0" cy="0"/>
+        </a:xfrm>
+      </p:grpSpPr>
+      <p:pic>
+        <p:nvPicPr>
+          <p:cNvPr id="2" name="Afbeelding 1">
+            <a:extLst>
+              <a:ext uri="{FF2B5EF4-FFF2-40B4-BE49-F238E27FC236}">
+                <a16:creationId xmlns:a16="http://schemas.microsoft.com/office/drawing/2014/main" id="{7C5EDDF0-F4C9-44FB-A48E-FAFBEAF78DE8}"/>
+              </a:ext>
+            </a:extLst>
+          </p:cNvPr>
+          <p:cNvPicPr>
+            <a:picLocks noChangeAspect="1"/>
+          </p:cNvPicPr>
+          <p:nvPr/>
+        </p:nvPicPr>
+        <p:blipFill>
+          <a:blip r:embed="rId2">
+            <a:extLst>
+              <a:ext uri="{28A0092B-C50C-407E-A947-70E740481C1C}">
+                <a14:useLocalDpi xmlns:a14="http://schemas.microsoft.com/office/drawing/2010/main" val="0"/>
+              </a:ext>
+            </a:extLst>
+          </a:blip>
+          <a:stretch>
+            <a:fillRect/>
+          </a:stretch>
+        </p:blipFill>
+        <p:spPr>
+          <a:xfrm>
+            <a:off x="1585442" y="923575"/>
+            <a:ext cx="6735115" cy="5010849"/>
+          </a:xfrm>
+          <a:prstGeom prst="rect">
+            <a:avLst/>
+          </a:prstGeom>
+        </p:spPr>
+      </p:pic>
+    </p:spTree>
+    <p:extLst>
+      <p:ext uri="{BB962C8B-B14F-4D97-AF65-F5344CB8AC3E}">
+        <p14:creationId xmlns:p14="http://schemas.microsoft.com/office/powerpoint/2010/main" val="3277754115"/>
+      </p:ext>
+    </p:extLst>
+  </p:cSld>
+  <p:clrMapOvr>
+    <a:masterClrMapping/>
+  </p:clrMapOvr>
+</p:sld>
+</file>
+
+<file path=ppt/slides/slide6.xml><?xml version="1.0" encoding="utf-8"?>
+<p:sld xmlns:a="http://schemas.openxmlformats.org/drawingml/2006/main" xmlns:r="http://schemas.openxmlformats.org/officeDocument/2006/relationships" xmlns:p="http://schemas.openxmlformats.org/presentationml/2006/main">
+  <p:cSld>
+    <p:spTree>
+      <p:nvGrpSpPr>
+        <p:cNvPr id="1" name=""/>
+        <p:cNvGrpSpPr/>
+        <p:nvPr/>
+      </p:nvGrpSpPr>
+      <p:grpSpPr>
+        <a:xfrm>
+          <a:off x="0" y="0"/>
+          <a:ext cx="0" cy="0"/>
+          <a:chOff x="0" y="0"/>
+          <a:chExt cx="0" cy="0"/>
+        </a:xfrm>
+      </p:grpSpPr>
+      <p:pic>
+        <p:nvPicPr>
+          <p:cNvPr id="3" name="Afbeelding 2">
+            <a:extLst>
+              <a:ext uri="{FF2B5EF4-FFF2-40B4-BE49-F238E27FC236}">
+                <a16:creationId xmlns:a16="http://schemas.microsoft.com/office/drawing/2014/main" id="{42227312-72A8-4D9E-9704-ACB1A4225BB0}"/>
+              </a:ext>
+            </a:extLst>
+          </p:cNvPr>
+          <p:cNvPicPr>
+            <a:picLocks noChangeAspect="1"/>
+          </p:cNvPicPr>
+          <p:nvPr/>
+        </p:nvPicPr>
+        <p:blipFill>
+          <a:blip r:embed="rId2">
+            <a:extLst>
+              <a:ext uri="{28A0092B-C50C-407E-A947-70E740481C1C}">
+                <a14:useLocalDpi xmlns:a14="http://schemas.microsoft.com/office/drawing/2010/main" val="0"/>
+              </a:ext>
+            </a:extLst>
+          </a:blip>
+          <a:stretch>
+            <a:fillRect/>
+          </a:stretch>
+        </p:blipFill>
+        <p:spPr>
+          <a:xfrm>
+            <a:off x="1266310" y="561575"/>
+            <a:ext cx="7373379" cy="5734850"/>
+          </a:xfrm>
+          <a:prstGeom prst="rect">
+            <a:avLst/>
+          </a:prstGeom>
+        </p:spPr>
+      </p:pic>
+    </p:spTree>
+    <p:extLst>
+      <p:ext uri="{BB962C8B-B14F-4D97-AF65-F5344CB8AC3E}">
+        <p14:creationId xmlns:p14="http://schemas.microsoft.com/office/powerpoint/2010/main" val="553028197"/>
+      </p:ext>
+    </p:extLst>
+  </p:cSld>
+  <p:clrMapOvr>
+    <a:masterClrMapping/>
+  </p:clrMapOvr>
+</p:sld>
+</file>
+
+<file path=ppt/slides/slide7.xml><?xml version="1.0" encoding="utf-8"?>
 <p:sld xmlns:a="http://schemas.openxmlformats.org/drawingml/2006/main" xmlns:r="http://schemas.openxmlformats.org/officeDocument/2006/relationships" xmlns:p="http://schemas.openxmlformats.org/presentationml/2006/main">
   <p:cSld>
     <p:spTree>
@@ -11796,7 +12081,7 @@
 </p:sld>
 </file>
 
-<file path=ppt/slides/slide5.xml><?xml version="1.0" encoding="utf-8"?>
+<file path=ppt/slides/slide8.xml><?xml version="1.0" encoding="utf-8"?>
 <p:sld xmlns:a="http://schemas.openxmlformats.org/drawingml/2006/main" xmlns:r="http://schemas.openxmlformats.org/officeDocument/2006/relationships" xmlns:p="http://schemas.openxmlformats.org/presentationml/2006/main">
   <p:cSld>
     <p:spTree>
@@ -13921,7 +14206,7 @@
 </p:sld>
 </file>
 
-<file path=ppt/slides/slide6.xml><?xml version="1.0" encoding="utf-8"?>
+<file path=ppt/slides/slide9.xml><?xml version="1.0" encoding="utf-8"?>
 <p:sld xmlns:a="http://schemas.openxmlformats.org/drawingml/2006/main" xmlns:r="http://schemas.openxmlformats.org/officeDocument/2006/relationships" xmlns:p="http://schemas.openxmlformats.org/presentationml/2006/main">
   <p:cSld>
     <p:spTree>

</xml_diff>